<commit_message>
Added new files to PPt
</commit_message>
<xml_diff>
--- a/Java Course.pptx
+++ b/Java Course.pptx
@@ -15,6 +15,12 @@
     <p:sldId id="263" r:id="rId9"/>
     <p:sldId id="265" r:id="rId10"/>
     <p:sldId id="264" r:id="rId11"/>
+    <p:sldId id="267" r:id="rId12"/>
+    <p:sldId id="268" r:id="rId13"/>
+    <p:sldId id="269" r:id="rId14"/>
+    <p:sldId id="270" r:id="rId15"/>
+    <p:sldId id="271" r:id="rId16"/>
+    <p:sldId id="266" r:id="rId17"/>
   </p:sldIdLst>
   <p:sldSz cx="9144000" cy="6858000" type="screen4x3"/>
   <p:notesSz cx="6858000" cy="9144000"/>
@@ -297,6 +303,7 @@
           <a:p>
             <a:fld id="{E8F965D9-2D0D-450C-B875-BE0C08FDA829}" type="datetimeFigureOut">
               <a:rPr lang="en-US" smtClean="0"/>
+              <a:pPr/>
               <a:t>5/6/2022</a:t>
             </a:fld>
             <a:endParaRPr lang="en-US"/>
@@ -339,6 +346,7 @@
           <a:p>
             <a:fld id="{60FCD084-7468-4157-A5C2-ED6ACB933D16}" type="slidenum">
               <a:rPr lang="en-US" smtClean="0"/>
+              <a:pPr/>
               <a:t>‹#›</a:t>
             </a:fld>
             <a:endParaRPr lang="en-US"/>
@@ -462,6 +470,7 @@
           <a:p>
             <a:fld id="{E8F965D9-2D0D-450C-B875-BE0C08FDA829}" type="datetimeFigureOut">
               <a:rPr lang="en-US" smtClean="0"/>
+              <a:pPr/>
               <a:t>5/6/2022</a:t>
             </a:fld>
             <a:endParaRPr lang="en-US"/>
@@ -504,6 +513,7 @@
           <a:p>
             <a:fld id="{60FCD084-7468-4157-A5C2-ED6ACB933D16}" type="slidenum">
               <a:rPr lang="en-US" smtClean="0"/>
+              <a:pPr/>
               <a:t>‹#›</a:t>
             </a:fld>
             <a:endParaRPr lang="en-US"/>
@@ -637,6 +647,7 @@
           <a:p>
             <a:fld id="{E8F965D9-2D0D-450C-B875-BE0C08FDA829}" type="datetimeFigureOut">
               <a:rPr lang="en-US" smtClean="0"/>
+              <a:pPr/>
               <a:t>5/6/2022</a:t>
             </a:fld>
             <a:endParaRPr lang="en-US"/>
@@ -679,6 +690,7 @@
           <a:p>
             <a:fld id="{60FCD084-7468-4157-A5C2-ED6ACB933D16}" type="slidenum">
               <a:rPr lang="en-US" smtClean="0"/>
+              <a:pPr/>
               <a:t>‹#›</a:t>
             </a:fld>
             <a:endParaRPr lang="en-US"/>
@@ -802,6 +814,7 @@
           <a:p>
             <a:fld id="{E8F965D9-2D0D-450C-B875-BE0C08FDA829}" type="datetimeFigureOut">
               <a:rPr lang="en-US" smtClean="0"/>
+              <a:pPr/>
               <a:t>5/6/2022</a:t>
             </a:fld>
             <a:endParaRPr lang="en-US"/>
@@ -844,6 +857,7 @@
           <a:p>
             <a:fld id="{60FCD084-7468-4157-A5C2-ED6ACB933D16}" type="slidenum">
               <a:rPr lang="en-US" smtClean="0"/>
+              <a:pPr/>
               <a:t>‹#›</a:t>
             </a:fld>
             <a:endParaRPr lang="en-US"/>
@@ -1043,6 +1057,7 @@
           <a:p>
             <a:fld id="{E8F965D9-2D0D-450C-B875-BE0C08FDA829}" type="datetimeFigureOut">
               <a:rPr lang="en-US" smtClean="0"/>
+              <a:pPr/>
               <a:t>5/6/2022</a:t>
             </a:fld>
             <a:endParaRPr lang="en-US"/>
@@ -1085,6 +1100,7 @@
           <a:p>
             <a:fld id="{60FCD084-7468-4157-A5C2-ED6ACB933D16}" type="slidenum">
               <a:rPr lang="en-US" smtClean="0"/>
+              <a:pPr/>
               <a:t>‹#›</a:t>
             </a:fld>
             <a:endParaRPr lang="en-US"/>
@@ -1326,6 +1342,7 @@
           <a:p>
             <a:fld id="{E8F965D9-2D0D-450C-B875-BE0C08FDA829}" type="datetimeFigureOut">
               <a:rPr lang="en-US" smtClean="0"/>
+              <a:pPr/>
               <a:t>5/6/2022</a:t>
             </a:fld>
             <a:endParaRPr lang="en-US"/>
@@ -1368,6 +1385,7 @@
           <a:p>
             <a:fld id="{60FCD084-7468-4157-A5C2-ED6ACB933D16}" type="slidenum">
               <a:rPr lang="en-US" smtClean="0"/>
+              <a:pPr/>
               <a:t>‹#›</a:t>
             </a:fld>
             <a:endParaRPr lang="en-US"/>
@@ -1743,6 +1761,7 @@
           <a:p>
             <a:fld id="{E8F965D9-2D0D-450C-B875-BE0C08FDA829}" type="datetimeFigureOut">
               <a:rPr lang="en-US" smtClean="0"/>
+              <a:pPr/>
               <a:t>5/6/2022</a:t>
             </a:fld>
             <a:endParaRPr lang="en-US"/>
@@ -1785,6 +1804,7 @@
           <a:p>
             <a:fld id="{60FCD084-7468-4157-A5C2-ED6ACB933D16}" type="slidenum">
               <a:rPr lang="en-US" smtClean="0"/>
+              <a:pPr/>
               <a:t>‹#›</a:t>
             </a:fld>
             <a:endParaRPr lang="en-US"/>
@@ -1856,6 +1876,7 @@
           <a:p>
             <a:fld id="{E8F965D9-2D0D-450C-B875-BE0C08FDA829}" type="datetimeFigureOut">
               <a:rPr lang="en-US" smtClean="0"/>
+              <a:pPr/>
               <a:t>5/6/2022</a:t>
             </a:fld>
             <a:endParaRPr lang="en-US"/>
@@ -1898,6 +1919,7 @@
           <a:p>
             <a:fld id="{60FCD084-7468-4157-A5C2-ED6ACB933D16}" type="slidenum">
               <a:rPr lang="en-US" smtClean="0"/>
+              <a:pPr/>
               <a:t>‹#›</a:t>
             </a:fld>
             <a:endParaRPr lang="en-US"/>
@@ -1946,6 +1968,7 @@
           <a:p>
             <a:fld id="{E8F965D9-2D0D-450C-B875-BE0C08FDA829}" type="datetimeFigureOut">
               <a:rPr lang="en-US" smtClean="0"/>
+              <a:pPr/>
               <a:t>5/6/2022</a:t>
             </a:fld>
             <a:endParaRPr lang="en-US"/>
@@ -1988,6 +2011,7 @@
           <a:p>
             <a:fld id="{60FCD084-7468-4157-A5C2-ED6ACB933D16}" type="slidenum">
               <a:rPr lang="en-US" smtClean="0"/>
+              <a:pPr/>
               <a:t>‹#›</a:t>
             </a:fld>
             <a:endParaRPr lang="en-US"/>
@@ -2218,6 +2242,7 @@
           <a:p>
             <a:fld id="{E8F965D9-2D0D-450C-B875-BE0C08FDA829}" type="datetimeFigureOut">
               <a:rPr lang="en-US" smtClean="0"/>
+              <a:pPr/>
               <a:t>5/6/2022</a:t>
             </a:fld>
             <a:endParaRPr lang="en-US"/>
@@ -2260,6 +2285,7 @@
           <a:p>
             <a:fld id="{60FCD084-7468-4157-A5C2-ED6ACB933D16}" type="slidenum">
               <a:rPr lang="en-US" smtClean="0"/>
+              <a:pPr/>
               <a:t>‹#›</a:t>
             </a:fld>
             <a:endParaRPr lang="en-US"/>
@@ -2466,6 +2492,7 @@
           <a:p>
             <a:fld id="{E8F965D9-2D0D-450C-B875-BE0C08FDA829}" type="datetimeFigureOut">
               <a:rPr lang="en-US" smtClean="0"/>
+              <a:pPr/>
               <a:t>5/6/2022</a:t>
             </a:fld>
             <a:endParaRPr lang="en-US"/>
@@ -2508,6 +2535,7 @@
           <a:p>
             <a:fld id="{60FCD084-7468-4157-A5C2-ED6ACB933D16}" type="slidenum">
               <a:rPr lang="en-US" smtClean="0"/>
+              <a:pPr/>
               <a:t>‹#›</a:t>
             </a:fld>
             <a:endParaRPr lang="en-US"/>
@@ -2674,6 +2702,7 @@
           <a:p>
             <a:fld id="{E8F965D9-2D0D-450C-B875-BE0C08FDA829}" type="datetimeFigureOut">
               <a:rPr lang="en-US" smtClean="0"/>
+              <a:pPr/>
               <a:t>5/6/2022</a:t>
             </a:fld>
             <a:endParaRPr lang="en-US"/>
@@ -2752,6 +2781,7 @@
           <a:p>
             <a:fld id="{60FCD084-7468-4157-A5C2-ED6ACB933D16}" type="slidenum">
               <a:rPr lang="en-US" smtClean="0"/>
+              <a:pPr/>
               <a:t>‹#›</a:t>
             </a:fld>
             <a:endParaRPr lang="en-US"/>
@@ -3182,6 +3212,491 @@
               <a:rPr lang="en-US" dirty="0"/>
               <a:t>compiled directly into machine code and therefore, can only run on the same platform in which it was compiled</a:t>
             </a:r>
+          </a:p>
+        </p:txBody>
+      </p:sp>
+    </p:spTree>
+  </p:cSld>
+  <p:clrMapOvr>
+    <a:masterClrMapping/>
+  </p:clrMapOvr>
+</p:sld>
+</file>
+
+<file path=ppt/slides/slide11.xml><?xml version="1.0" encoding="utf-8"?>
+<p:sld xmlns:a="http://schemas.openxmlformats.org/drawingml/2006/main" xmlns:r="http://schemas.openxmlformats.org/officeDocument/2006/relationships" xmlns:p="http://schemas.openxmlformats.org/presentationml/2006/main">
+  <p:cSld>
+    <p:spTree>
+      <p:nvGrpSpPr>
+        <p:cNvPr id="1" name=""/>
+        <p:cNvGrpSpPr/>
+        <p:nvPr/>
+      </p:nvGrpSpPr>
+      <p:grpSpPr>
+        <a:xfrm>
+          <a:off x="0" y="0"/>
+          <a:ext cx="0" cy="0"/>
+          <a:chOff x="0" y="0"/>
+          <a:chExt cx="0" cy="0"/>
+        </a:xfrm>
+      </p:grpSpPr>
+      <p:sp>
+        <p:nvSpPr>
+          <p:cNvPr id="2" name="Title 1"/>
+          <p:cNvSpPr>
+            <a:spLocks noGrp="1"/>
+          </p:cNvSpPr>
+          <p:nvPr>
+            <p:ph type="title"/>
+          </p:nvPr>
+        </p:nvSpPr>
+        <p:spPr/>
+        <p:txBody>
+          <a:bodyPr/>
+          <a:lstStyle/>
+          <a:p>
+            <a:r>
+              <a:rPr lang="en-US" dirty="0" smtClean="0"/>
+              <a:t>JDK Installation Path</a:t>
+            </a:r>
+            <a:endParaRPr lang="en-US" dirty="0"/>
+          </a:p>
+        </p:txBody>
+      </p:sp>
+      <p:sp>
+        <p:nvSpPr>
+          <p:cNvPr id="3" name="Content Placeholder 2"/>
+          <p:cNvSpPr>
+            <a:spLocks noGrp="1"/>
+          </p:cNvSpPr>
+          <p:nvPr>
+            <p:ph idx="1"/>
+          </p:nvPr>
+        </p:nvSpPr>
+        <p:spPr/>
+        <p:txBody>
+          <a:bodyPr/>
+          <a:lstStyle/>
+          <a:p>
+            <a:r>
+              <a:rPr lang="en-US" dirty="0" smtClean="0"/>
+              <a:t>https://www.oracle.com/in/java/technologies/javase/javase8-archive-downloads.html</a:t>
+            </a:r>
+            <a:endParaRPr lang="en-US" dirty="0"/>
+          </a:p>
+        </p:txBody>
+      </p:sp>
+    </p:spTree>
+  </p:cSld>
+  <p:clrMapOvr>
+    <a:masterClrMapping/>
+  </p:clrMapOvr>
+</p:sld>
+</file>
+
+<file path=ppt/slides/slide12.xml><?xml version="1.0" encoding="utf-8"?>
+<p:sld xmlns:a="http://schemas.openxmlformats.org/drawingml/2006/main" xmlns:r="http://schemas.openxmlformats.org/officeDocument/2006/relationships" xmlns:p="http://schemas.openxmlformats.org/presentationml/2006/main">
+  <p:cSld>
+    <p:spTree>
+      <p:nvGrpSpPr>
+        <p:cNvPr id="1" name=""/>
+        <p:cNvGrpSpPr/>
+        <p:nvPr/>
+      </p:nvGrpSpPr>
+      <p:grpSpPr>
+        <a:xfrm>
+          <a:off x="0" y="0"/>
+          <a:ext cx="0" cy="0"/>
+          <a:chOff x="0" y="0"/>
+          <a:chExt cx="0" cy="0"/>
+        </a:xfrm>
+      </p:grpSpPr>
+      <p:sp>
+        <p:nvSpPr>
+          <p:cNvPr id="2" name="Title 1"/>
+          <p:cNvSpPr>
+            <a:spLocks noGrp="1"/>
+          </p:cNvSpPr>
+          <p:nvPr>
+            <p:ph type="title"/>
+          </p:nvPr>
+        </p:nvSpPr>
+        <p:spPr/>
+        <p:txBody>
+          <a:bodyPr/>
+          <a:lstStyle/>
+          <a:p>
+            <a:r>
+              <a:rPr lang="en-US" dirty="0" smtClean="0"/>
+              <a:t>Set up </a:t>
+            </a:r>
+            <a:endParaRPr lang="en-US" dirty="0"/>
+          </a:p>
+        </p:txBody>
+      </p:sp>
+      <p:pic>
+        <p:nvPicPr>
+          <p:cNvPr id="1026" name="Picture 2"/>
+          <p:cNvPicPr>
+            <a:picLocks noGrp="1" noChangeAspect="1" noChangeArrowheads="1"/>
+          </p:cNvPicPr>
+          <p:nvPr>
+            <p:ph idx="1"/>
+          </p:nvPr>
+        </p:nvPicPr>
+        <p:blipFill>
+          <a:blip r:embed="rId2"/>
+          <a:srcRect/>
+          <a:stretch>
+            <a:fillRect/>
+          </a:stretch>
+        </p:blipFill>
+        <p:spPr bwMode="auto">
+          <a:xfrm>
+            <a:off x="1752600" y="1371600"/>
+            <a:ext cx="5600700" cy="1885950"/>
+          </a:xfrm>
+          <a:prstGeom prst="rect">
+            <a:avLst/>
+          </a:prstGeom>
+          <a:noFill/>
+          <a:ln w="9525">
+            <a:noFill/>
+            <a:miter lim="800000"/>
+            <a:headEnd/>
+            <a:tailEnd/>
+          </a:ln>
+          <a:effectLst/>
+        </p:spPr>
+      </p:pic>
+    </p:spTree>
+  </p:cSld>
+  <p:clrMapOvr>
+    <a:masterClrMapping/>
+  </p:clrMapOvr>
+</p:sld>
+</file>
+
+<file path=ppt/slides/slide13.xml><?xml version="1.0" encoding="utf-8"?>
+<p:sld xmlns:a="http://schemas.openxmlformats.org/drawingml/2006/main" xmlns:r="http://schemas.openxmlformats.org/officeDocument/2006/relationships" xmlns:p="http://schemas.openxmlformats.org/presentationml/2006/main">
+  <p:cSld>
+    <p:spTree>
+      <p:nvGrpSpPr>
+        <p:cNvPr id="1" name=""/>
+        <p:cNvGrpSpPr/>
+        <p:nvPr/>
+      </p:nvGrpSpPr>
+      <p:grpSpPr>
+        <a:xfrm>
+          <a:off x="0" y="0"/>
+          <a:ext cx="0" cy="0"/>
+          <a:chOff x="0" y="0"/>
+          <a:chExt cx="0" cy="0"/>
+        </a:xfrm>
+      </p:grpSpPr>
+      <p:sp>
+        <p:nvSpPr>
+          <p:cNvPr id="2" name="Title 1"/>
+          <p:cNvSpPr>
+            <a:spLocks noGrp="1"/>
+          </p:cNvSpPr>
+          <p:nvPr>
+            <p:ph type="title"/>
+          </p:nvPr>
+        </p:nvSpPr>
+        <p:spPr/>
+        <p:txBody>
+          <a:bodyPr/>
+          <a:lstStyle/>
+          <a:p>
+            <a:endParaRPr lang="en-US"/>
+          </a:p>
+        </p:txBody>
+      </p:sp>
+      <p:pic>
+        <p:nvPicPr>
+          <p:cNvPr id="2050" name="Picture 2"/>
+          <p:cNvPicPr>
+            <a:picLocks noChangeAspect="1" noChangeArrowheads="1"/>
+          </p:cNvPicPr>
+          <p:nvPr/>
+        </p:nvPicPr>
+        <p:blipFill>
+          <a:blip r:embed="rId2"/>
+          <a:srcRect/>
+          <a:stretch>
+            <a:fillRect/>
+          </a:stretch>
+        </p:blipFill>
+        <p:spPr bwMode="auto">
+          <a:xfrm>
+            <a:off x="1371600" y="1905000"/>
+            <a:ext cx="3543300" cy="257175"/>
+          </a:xfrm>
+          <a:prstGeom prst="rect">
+            <a:avLst/>
+          </a:prstGeom>
+          <a:noFill/>
+          <a:ln w="9525">
+            <a:noFill/>
+            <a:miter lim="800000"/>
+            <a:headEnd/>
+            <a:tailEnd/>
+          </a:ln>
+          <a:effectLst/>
+        </p:spPr>
+      </p:pic>
+      <p:pic>
+        <p:nvPicPr>
+          <p:cNvPr id="2051" name="Picture 3"/>
+          <p:cNvPicPr>
+            <a:picLocks noChangeAspect="1" noChangeArrowheads="1"/>
+          </p:cNvPicPr>
+          <p:nvPr/>
+        </p:nvPicPr>
+        <p:blipFill>
+          <a:blip r:embed="rId3"/>
+          <a:srcRect/>
+          <a:stretch>
+            <a:fillRect/>
+          </a:stretch>
+        </p:blipFill>
+        <p:spPr bwMode="auto">
+          <a:xfrm>
+            <a:off x="381000" y="3733800"/>
+            <a:ext cx="8401050" cy="2505075"/>
+          </a:xfrm>
+          <a:prstGeom prst="rect">
+            <a:avLst/>
+          </a:prstGeom>
+          <a:noFill/>
+          <a:ln w="9525">
+            <a:noFill/>
+            <a:miter lim="800000"/>
+            <a:headEnd/>
+            <a:tailEnd/>
+          </a:ln>
+          <a:effectLst/>
+        </p:spPr>
+      </p:pic>
+    </p:spTree>
+  </p:cSld>
+  <p:clrMapOvr>
+    <a:masterClrMapping/>
+  </p:clrMapOvr>
+</p:sld>
+</file>
+
+<file path=ppt/slides/slide14.xml><?xml version="1.0" encoding="utf-8"?>
+<p:sld xmlns:a="http://schemas.openxmlformats.org/drawingml/2006/main" xmlns:r="http://schemas.openxmlformats.org/officeDocument/2006/relationships" xmlns:p="http://schemas.openxmlformats.org/presentationml/2006/main">
+  <p:cSld>
+    <p:spTree>
+      <p:nvGrpSpPr>
+        <p:cNvPr id="1" name=""/>
+        <p:cNvGrpSpPr/>
+        <p:nvPr/>
+      </p:nvGrpSpPr>
+      <p:grpSpPr>
+        <a:xfrm>
+          <a:off x="0" y="0"/>
+          <a:ext cx="0" cy="0"/>
+          <a:chOff x="0" y="0"/>
+          <a:chExt cx="0" cy="0"/>
+        </a:xfrm>
+      </p:grpSpPr>
+      <p:sp>
+        <p:nvSpPr>
+          <p:cNvPr id="2" name="Title 1"/>
+          <p:cNvSpPr>
+            <a:spLocks noGrp="1"/>
+          </p:cNvSpPr>
+          <p:nvPr>
+            <p:ph type="title"/>
+          </p:nvPr>
+        </p:nvSpPr>
+        <p:spPr/>
+        <p:txBody>
+          <a:bodyPr/>
+          <a:lstStyle/>
+          <a:p>
+            <a:endParaRPr lang="en-US"/>
+          </a:p>
+        </p:txBody>
+      </p:sp>
+      <p:pic>
+        <p:nvPicPr>
+          <p:cNvPr id="3074" name="Picture 2"/>
+          <p:cNvPicPr>
+            <a:picLocks noGrp="1" noChangeAspect="1" noChangeArrowheads="1"/>
+          </p:cNvPicPr>
+          <p:nvPr>
+            <p:ph idx="1"/>
+          </p:nvPr>
+        </p:nvPicPr>
+        <p:blipFill>
+          <a:blip r:embed="rId2"/>
+          <a:srcRect/>
+          <a:stretch>
+            <a:fillRect/>
+          </a:stretch>
+        </p:blipFill>
+        <p:spPr bwMode="auto">
+          <a:xfrm>
+            <a:off x="3438525" y="2901156"/>
+            <a:ext cx="2266950" cy="1924050"/>
+          </a:xfrm>
+          <a:prstGeom prst="rect">
+            <a:avLst/>
+          </a:prstGeom>
+          <a:noFill/>
+          <a:ln w="9525">
+            <a:noFill/>
+            <a:miter lim="800000"/>
+            <a:headEnd/>
+            <a:tailEnd/>
+          </a:ln>
+          <a:effectLst/>
+        </p:spPr>
+      </p:pic>
+    </p:spTree>
+  </p:cSld>
+  <p:clrMapOvr>
+    <a:masterClrMapping/>
+  </p:clrMapOvr>
+</p:sld>
+</file>
+
+<file path=ppt/slides/slide15.xml><?xml version="1.0" encoding="utf-8"?>
+<p:sld xmlns:a="http://schemas.openxmlformats.org/drawingml/2006/main" xmlns:r="http://schemas.openxmlformats.org/officeDocument/2006/relationships" xmlns:p="http://schemas.openxmlformats.org/presentationml/2006/main">
+  <p:cSld>
+    <p:spTree>
+      <p:nvGrpSpPr>
+        <p:cNvPr id="1" name=""/>
+        <p:cNvGrpSpPr/>
+        <p:nvPr/>
+      </p:nvGrpSpPr>
+      <p:grpSpPr>
+        <a:xfrm>
+          <a:off x="0" y="0"/>
+          <a:ext cx="0" cy="0"/>
+          <a:chOff x="0" y="0"/>
+          <a:chExt cx="0" cy="0"/>
+        </a:xfrm>
+      </p:grpSpPr>
+      <p:sp>
+        <p:nvSpPr>
+          <p:cNvPr id="2" name="Title 1"/>
+          <p:cNvSpPr>
+            <a:spLocks noGrp="1"/>
+          </p:cNvSpPr>
+          <p:nvPr>
+            <p:ph type="title"/>
+          </p:nvPr>
+        </p:nvSpPr>
+        <p:spPr/>
+        <p:txBody>
+          <a:bodyPr/>
+          <a:lstStyle/>
+          <a:p>
+            <a:r>
+              <a:rPr lang="en-US" dirty="0" smtClean="0"/>
+              <a:t>End Of Session 1</a:t>
+            </a:r>
+            <a:endParaRPr lang="en-US" dirty="0"/>
+          </a:p>
+        </p:txBody>
+      </p:sp>
+      <p:sp>
+        <p:nvSpPr>
+          <p:cNvPr id="3" name="Content Placeholder 2"/>
+          <p:cNvSpPr>
+            <a:spLocks noGrp="1"/>
+          </p:cNvSpPr>
+          <p:nvPr>
+            <p:ph idx="1"/>
+          </p:nvPr>
+        </p:nvSpPr>
+        <p:spPr/>
+        <p:txBody>
+          <a:bodyPr/>
+          <a:lstStyle/>
+          <a:p>
+            <a:r>
+              <a:rPr lang="en-US" dirty="0" smtClean="0"/>
+              <a:t>Thank You</a:t>
+            </a:r>
+            <a:endParaRPr lang="en-US" dirty="0"/>
+          </a:p>
+        </p:txBody>
+      </p:sp>
+    </p:spTree>
+  </p:cSld>
+  <p:clrMapOvr>
+    <a:masterClrMapping/>
+  </p:clrMapOvr>
+</p:sld>
+</file>
+
+<file path=ppt/slides/slide16.xml><?xml version="1.0" encoding="utf-8"?>
+<p:sld xmlns:a="http://schemas.openxmlformats.org/drawingml/2006/main" xmlns:r="http://schemas.openxmlformats.org/officeDocument/2006/relationships" xmlns:p="http://schemas.openxmlformats.org/presentationml/2006/main">
+  <p:cSld>
+    <p:spTree>
+      <p:nvGrpSpPr>
+        <p:cNvPr id="1" name=""/>
+        <p:cNvGrpSpPr/>
+        <p:nvPr/>
+      </p:nvGrpSpPr>
+      <p:grpSpPr>
+        <a:xfrm>
+          <a:off x="0" y="0"/>
+          <a:ext cx="0" cy="0"/>
+          <a:chOff x="0" y="0"/>
+          <a:chExt cx="0" cy="0"/>
+        </a:xfrm>
+      </p:grpSpPr>
+      <p:sp>
+        <p:nvSpPr>
+          <p:cNvPr id="2" name="Title 1"/>
+          <p:cNvSpPr>
+            <a:spLocks noGrp="1"/>
+          </p:cNvSpPr>
+          <p:nvPr>
+            <p:ph type="title"/>
+          </p:nvPr>
+        </p:nvSpPr>
+        <p:spPr/>
+        <p:txBody>
+          <a:bodyPr/>
+          <a:lstStyle/>
+          <a:p>
+            <a:r>
+              <a:rPr lang="en-US" dirty="0" smtClean="0"/>
+              <a:t>End Of Session 1</a:t>
+            </a:r>
+            <a:endParaRPr lang="en-US" dirty="0"/>
+          </a:p>
+        </p:txBody>
+      </p:sp>
+      <p:sp>
+        <p:nvSpPr>
+          <p:cNvPr id="3" name="Content Placeholder 2"/>
+          <p:cNvSpPr>
+            <a:spLocks noGrp="1"/>
+          </p:cNvSpPr>
+          <p:nvPr>
+            <p:ph idx="1"/>
+          </p:nvPr>
+        </p:nvSpPr>
+        <p:spPr/>
+        <p:txBody>
+          <a:bodyPr/>
+          <a:lstStyle/>
+          <a:p>
+            <a:r>
+              <a:rPr lang="en-US" dirty="0" smtClean="0"/>
+              <a:t>Thank You</a:t>
+            </a:r>
+            <a:endParaRPr lang="en-US" dirty="0"/>
           </a:p>
         </p:txBody>
       </p:sp>

</xml_diff>

<commit_message>
Added ppt for Tools page to install
</commit_message>
<xml_diff>
--- a/Java Course.pptx
+++ b/Java Course.pptx
@@ -21,6 +21,7 @@
     <p:sldId id="270" r:id="rId15"/>
     <p:sldId id="271" r:id="rId16"/>
     <p:sldId id="266" r:id="rId17"/>
+    <p:sldId id="272" r:id="rId18"/>
   </p:sldIdLst>
   <p:sldSz cx="9144000" cy="6858000" type="screen4x3"/>
   <p:notesSz cx="6858000" cy="9144000"/>
@@ -3697,6 +3698,132 @@
               <a:t>Thank You</a:t>
             </a:r>
             <a:endParaRPr lang="en-US" dirty="0"/>
+          </a:p>
+        </p:txBody>
+      </p:sp>
+    </p:spTree>
+  </p:cSld>
+  <p:clrMapOvr>
+    <a:masterClrMapping/>
+  </p:clrMapOvr>
+</p:sld>
+</file>
+
+<file path=ppt/slides/slide17.xml><?xml version="1.0" encoding="utf-8"?>
+<p:sld xmlns:a="http://schemas.openxmlformats.org/drawingml/2006/main" xmlns:r="http://schemas.openxmlformats.org/officeDocument/2006/relationships" xmlns:p="http://schemas.openxmlformats.org/presentationml/2006/main">
+  <p:cSld>
+    <p:spTree>
+      <p:nvGrpSpPr>
+        <p:cNvPr id="1" name=""/>
+        <p:cNvGrpSpPr/>
+        <p:nvPr/>
+      </p:nvGrpSpPr>
+      <p:grpSpPr>
+        <a:xfrm>
+          <a:off x="0" y="0"/>
+          <a:ext cx="0" cy="0"/>
+          <a:chOff x="0" y="0"/>
+          <a:chExt cx="0" cy="0"/>
+        </a:xfrm>
+      </p:grpSpPr>
+      <p:sp>
+        <p:nvSpPr>
+          <p:cNvPr id="2" name="Title 1"/>
+          <p:cNvSpPr>
+            <a:spLocks noGrp="1"/>
+          </p:cNvSpPr>
+          <p:nvPr>
+            <p:ph type="title"/>
+          </p:nvPr>
+        </p:nvSpPr>
+        <p:spPr/>
+        <p:txBody>
+          <a:bodyPr/>
+          <a:lstStyle/>
+          <a:p>
+            <a:endParaRPr lang="en-US"/>
+          </a:p>
+        </p:txBody>
+      </p:sp>
+      <p:sp>
+        <p:nvSpPr>
+          <p:cNvPr id="3" name="Content Placeholder 2"/>
+          <p:cNvSpPr>
+            <a:spLocks noGrp="1"/>
+          </p:cNvSpPr>
+          <p:nvPr>
+            <p:ph idx="1"/>
+          </p:nvPr>
+        </p:nvSpPr>
+        <p:spPr/>
+        <p:txBody>
+          <a:bodyPr>
+            <a:normAutofit fontScale="92500"/>
+          </a:bodyPr>
+          <a:lstStyle/>
+          <a:p>
+            <a:r>
+              <a:rPr lang="en-US" dirty="0" smtClean="0"/>
+              <a:t>Install Eclipse IDE Corresponding to Java 8 Version</a:t>
+            </a:r>
+          </a:p>
+          <a:p>
+            <a:r>
+              <a:rPr lang="en-US" dirty="0" smtClean="0"/>
+              <a:t>https://www.eclipse.org/downloads/packages/release/neon/3/eclipse-ide-java-ee-developers</a:t>
+            </a:r>
+            <a:endParaRPr lang="en-US" dirty="0" smtClean="0"/>
+          </a:p>
+          <a:p>
+            <a:r>
+              <a:rPr lang="en-US" dirty="0" err="1" smtClean="0"/>
+              <a:t>Git</a:t>
+            </a:r>
+            <a:r>
+              <a:rPr lang="en-US" dirty="0" smtClean="0"/>
+              <a:t>-https://git-scm.com/</a:t>
+            </a:r>
+            <a:endParaRPr lang="en-US" dirty="0" smtClean="0"/>
+          </a:p>
+          <a:p>
+            <a:r>
+              <a:rPr lang="en-US" dirty="0" smtClean="0"/>
+              <a:t>Tortoise </a:t>
+            </a:r>
+            <a:r>
+              <a:rPr lang="en-US" dirty="0" err="1" smtClean="0"/>
+              <a:t>Git</a:t>
+            </a:r>
+            <a:r>
+              <a:rPr lang="en-US" dirty="0" smtClean="0"/>
+              <a:t> -https://tortoisegit.org/download/</a:t>
+            </a:r>
+            <a:endParaRPr lang="en-US" dirty="0" smtClean="0"/>
+          </a:p>
+          <a:p>
+            <a:r>
+              <a:rPr lang="en-US" dirty="0" err="1" smtClean="0"/>
+              <a:t>Sighn</a:t>
+            </a:r>
+            <a:r>
+              <a:rPr lang="en-US" dirty="0" smtClean="0"/>
+              <a:t> up an account in </a:t>
+            </a:r>
+            <a:r>
+              <a:rPr lang="en-US" dirty="0" err="1" smtClean="0"/>
+              <a:t>git</a:t>
+            </a:r>
+            <a:r>
+              <a:rPr lang="en-US" smtClean="0"/>
+              <a:t>-&gt; https://github.com/</a:t>
+            </a:r>
+            <a:endParaRPr lang="en-US" dirty="0" smtClean="0"/>
+          </a:p>
+          <a:p>
+            <a:pPr>
+              <a:buNone/>
+            </a:pPr>
+            <a:endParaRPr lang="en-US" dirty="0" smtClean="0"/>
           </a:p>
         </p:txBody>
       </p:sp>

</xml_diff>

<commit_message>
Updated pLATFORM DEPENDENCY Session 1 & Session 2 Reference materials
</commit_message>
<xml_diff>
--- a/Java Course.pptx
+++ b/Java Course.pptx
@@ -13,15 +13,21 @@
     <p:sldId id="261" r:id="rId7"/>
     <p:sldId id="262" r:id="rId8"/>
     <p:sldId id="263" r:id="rId9"/>
-    <p:sldId id="265" r:id="rId10"/>
-    <p:sldId id="264" r:id="rId11"/>
-    <p:sldId id="267" r:id="rId12"/>
-    <p:sldId id="268" r:id="rId13"/>
-    <p:sldId id="269" r:id="rId14"/>
-    <p:sldId id="270" r:id="rId15"/>
-    <p:sldId id="271" r:id="rId16"/>
-    <p:sldId id="266" r:id="rId17"/>
-    <p:sldId id="272" r:id="rId18"/>
+    <p:sldId id="264" r:id="rId10"/>
+    <p:sldId id="273" r:id="rId11"/>
+    <p:sldId id="275" r:id="rId12"/>
+    <p:sldId id="276" r:id="rId13"/>
+    <p:sldId id="274" r:id="rId14"/>
+    <p:sldId id="265" r:id="rId15"/>
+    <p:sldId id="267" r:id="rId16"/>
+    <p:sldId id="268" r:id="rId17"/>
+    <p:sldId id="269" r:id="rId18"/>
+    <p:sldId id="270" r:id="rId19"/>
+    <p:sldId id="277" r:id="rId20"/>
+    <p:sldId id="278" r:id="rId21"/>
+    <p:sldId id="279" r:id="rId22"/>
+    <p:sldId id="272" r:id="rId23"/>
+    <p:sldId id="271" r:id="rId24"/>
   </p:sldIdLst>
   <p:sldSz cx="9144000" cy="6858000" type="screen4x3"/>
   <p:notesSz cx="6858000" cy="9144000"/>
@@ -305,7 +311,7 @@
             <a:fld id="{E8F965D9-2D0D-450C-B875-BE0C08FDA829}" type="datetimeFigureOut">
               <a:rPr lang="en-US" smtClean="0"/>
               <a:pPr/>
-              <a:t>5/6/2022</a:t>
+              <a:t>5/11/2022</a:t>
             </a:fld>
             <a:endParaRPr lang="en-US"/>
           </a:p>
@@ -472,7 +478,7 @@
             <a:fld id="{E8F965D9-2D0D-450C-B875-BE0C08FDA829}" type="datetimeFigureOut">
               <a:rPr lang="en-US" smtClean="0"/>
               <a:pPr/>
-              <a:t>5/6/2022</a:t>
+              <a:t>5/11/2022</a:t>
             </a:fld>
             <a:endParaRPr lang="en-US"/>
           </a:p>
@@ -649,7 +655,7 @@
             <a:fld id="{E8F965D9-2D0D-450C-B875-BE0C08FDA829}" type="datetimeFigureOut">
               <a:rPr lang="en-US" smtClean="0"/>
               <a:pPr/>
-              <a:t>5/6/2022</a:t>
+              <a:t>5/11/2022</a:t>
             </a:fld>
             <a:endParaRPr lang="en-US"/>
           </a:p>
@@ -816,7 +822,7 @@
             <a:fld id="{E8F965D9-2D0D-450C-B875-BE0C08FDA829}" type="datetimeFigureOut">
               <a:rPr lang="en-US" smtClean="0"/>
               <a:pPr/>
-              <a:t>5/6/2022</a:t>
+              <a:t>5/11/2022</a:t>
             </a:fld>
             <a:endParaRPr lang="en-US"/>
           </a:p>
@@ -1059,7 +1065,7 @@
             <a:fld id="{E8F965D9-2D0D-450C-B875-BE0C08FDA829}" type="datetimeFigureOut">
               <a:rPr lang="en-US" smtClean="0"/>
               <a:pPr/>
-              <a:t>5/6/2022</a:t>
+              <a:t>5/11/2022</a:t>
             </a:fld>
             <a:endParaRPr lang="en-US"/>
           </a:p>
@@ -1344,7 +1350,7 @@
             <a:fld id="{E8F965D9-2D0D-450C-B875-BE0C08FDA829}" type="datetimeFigureOut">
               <a:rPr lang="en-US" smtClean="0"/>
               <a:pPr/>
-              <a:t>5/6/2022</a:t>
+              <a:t>5/11/2022</a:t>
             </a:fld>
             <a:endParaRPr lang="en-US"/>
           </a:p>
@@ -1763,7 +1769,7 @@
             <a:fld id="{E8F965D9-2D0D-450C-B875-BE0C08FDA829}" type="datetimeFigureOut">
               <a:rPr lang="en-US" smtClean="0"/>
               <a:pPr/>
-              <a:t>5/6/2022</a:t>
+              <a:t>5/11/2022</a:t>
             </a:fld>
             <a:endParaRPr lang="en-US"/>
           </a:p>
@@ -1878,7 +1884,7 @@
             <a:fld id="{E8F965D9-2D0D-450C-B875-BE0C08FDA829}" type="datetimeFigureOut">
               <a:rPr lang="en-US" smtClean="0"/>
               <a:pPr/>
-              <a:t>5/6/2022</a:t>
+              <a:t>5/11/2022</a:t>
             </a:fld>
             <a:endParaRPr lang="en-US"/>
           </a:p>
@@ -1970,7 +1976,7 @@
             <a:fld id="{E8F965D9-2D0D-450C-B875-BE0C08FDA829}" type="datetimeFigureOut">
               <a:rPr lang="en-US" smtClean="0"/>
               <a:pPr/>
-              <a:t>5/6/2022</a:t>
+              <a:t>5/11/2022</a:t>
             </a:fld>
             <a:endParaRPr lang="en-US"/>
           </a:p>
@@ -2244,7 +2250,7 @@
             <a:fld id="{E8F965D9-2D0D-450C-B875-BE0C08FDA829}" type="datetimeFigureOut">
               <a:rPr lang="en-US" smtClean="0"/>
               <a:pPr/>
-              <a:t>5/6/2022</a:t>
+              <a:t>5/11/2022</a:t>
             </a:fld>
             <a:endParaRPr lang="en-US"/>
           </a:p>
@@ -2494,7 +2500,7 @@
             <a:fld id="{E8F965D9-2D0D-450C-B875-BE0C08FDA829}" type="datetimeFigureOut">
               <a:rPr lang="en-US" smtClean="0"/>
               <a:pPr/>
-              <a:t>5/6/2022</a:t>
+              <a:t>5/11/2022</a:t>
             </a:fld>
             <a:endParaRPr lang="en-US"/>
           </a:p>
@@ -2704,7 +2710,7 @@
             <a:fld id="{E8F965D9-2D0D-450C-B875-BE0C08FDA829}" type="datetimeFigureOut">
               <a:rPr lang="en-US" smtClean="0"/>
               <a:pPr/>
-              <a:t>5/6/2022</a:t>
+              <a:t>5/11/2022</a:t>
             </a:fld>
             <a:endParaRPr lang="en-US"/>
           </a:p>
@@ -3160,59 +3166,108 @@
         </p:nvSpPr>
         <p:spPr/>
         <p:txBody>
+          <a:bodyPr>
+            <a:normAutofit fontScale="90000"/>
+          </a:bodyPr>
+          <a:lstStyle/>
+          <a:p>
+            <a:r>
+              <a:rPr lang="en-US" dirty="0" smtClean="0"/>
+              <a:t>Platform Independent</a:t>
+            </a:r>
+            <a:br>
+              <a:rPr lang="en-US" dirty="0" smtClean="0"/>
+            </a:br>
+            <a:endParaRPr lang="en-US" dirty="0"/>
+          </a:p>
+        </p:txBody>
+      </p:sp>
+      <p:sp>
+        <p:nvSpPr>
+          <p:cNvPr id="3" name="Content Placeholder 2"/>
+          <p:cNvSpPr>
+            <a:spLocks noGrp="1"/>
+          </p:cNvSpPr>
+          <p:nvPr>
+            <p:ph idx="1"/>
+          </p:nvPr>
+        </p:nvSpPr>
+        <p:spPr/>
+        <p:txBody>
           <a:bodyPr/>
           <a:lstStyle/>
           <a:p>
             <a:r>
               <a:rPr lang="en-US" dirty="0" smtClean="0"/>
-              <a:t>Different from Other Technology</a:t>
-            </a:r>
+              <a:t>Java </a:t>
+            </a:r>
+            <a:r>
+              <a:rPr lang="en-US" dirty="0" smtClean="0"/>
+              <a:t>is </a:t>
+            </a:r>
+            <a:r>
+              <a:rPr lang="en-US" dirty="0" smtClean="0"/>
+              <a:t>a write once, run anywhere </a:t>
+            </a:r>
+            <a:r>
+              <a:rPr lang="en-US" dirty="0" smtClean="0"/>
+              <a:t>language</a:t>
+            </a:r>
+          </a:p>
+          <a:p>
+            <a:r>
+              <a:rPr lang="en-US" dirty="0" smtClean="0"/>
+              <a:t>Java </a:t>
+            </a:r>
+            <a:r>
+              <a:rPr lang="en-US" dirty="0" smtClean="0"/>
+              <a:t>provides a software-based platform</a:t>
+            </a:r>
+            <a:r>
+              <a:rPr lang="en-US" dirty="0" smtClean="0"/>
+              <a:t>.</a:t>
+            </a:r>
+          </a:p>
+          <a:p>
+            <a:r>
+              <a:rPr lang="en-US" dirty="0" smtClean="0"/>
+              <a:t>Runs </a:t>
+            </a:r>
+            <a:r>
+              <a:rPr lang="en-US" dirty="0" smtClean="0"/>
+              <a:t>on top of other hardware-based platforms. </a:t>
+            </a:r>
+            <a:endParaRPr lang="en-US" dirty="0" smtClean="0"/>
+          </a:p>
+          <a:p>
+            <a:r>
+              <a:rPr lang="en-US" dirty="0" smtClean="0"/>
+              <a:t>It </a:t>
+            </a:r>
+            <a:r>
+              <a:rPr lang="en-US" dirty="0" smtClean="0"/>
+              <a:t>has two components:</a:t>
+            </a:r>
+          </a:p>
+          <a:p>
+            <a:r>
+              <a:rPr lang="en-US" dirty="0" smtClean="0"/>
+              <a:t>   Runtime Environment</a:t>
+            </a:r>
+            <a:endParaRPr lang="en-US" dirty="0" smtClean="0"/>
+          </a:p>
+          <a:p>
+            <a:r>
+              <a:rPr lang="en-US" dirty="0" smtClean="0"/>
+              <a:t>    API(Application </a:t>
+            </a:r>
+            <a:r>
+              <a:rPr lang="en-US" dirty="0" smtClean="0"/>
+              <a:t>Programming Interface)</a:t>
+            </a:r>
+          </a:p>
+          <a:p>
             <a:endParaRPr lang="en-US" dirty="0"/>
-          </a:p>
-        </p:txBody>
-      </p:sp>
-      <p:sp>
-        <p:nvSpPr>
-          <p:cNvPr id="3" name="Content Placeholder 2"/>
-          <p:cNvSpPr>
-            <a:spLocks noGrp="1"/>
-          </p:cNvSpPr>
-          <p:nvPr>
-            <p:ph idx="1"/>
-          </p:nvPr>
-        </p:nvSpPr>
-        <p:spPr/>
-        <p:txBody>
-          <a:bodyPr/>
-          <a:lstStyle/>
-          <a:p>
-            <a:r>
-              <a:rPr lang="en-US" dirty="0" smtClean="0"/>
-              <a:t>Java is compiled into </a:t>
-            </a:r>
-            <a:r>
-              <a:rPr lang="en-US" dirty="0" err="1" smtClean="0"/>
-              <a:t>bytecode</a:t>
-            </a:r>
-            <a:r>
-              <a:rPr lang="en-US" dirty="0" smtClean="0"/>
-              <a:t> which can run on any device with the Java Virtual Machine (JVM)</a:t>
-            </a:r>
-            <a:r>
-              <a:rPr lang="en-US" dirty="0"/>
-              <a:t> </a:t>
-            </a:r>
-            <a:endParaRPr lang="en-US" dirty="0" smtClean="0"/>
-          </a:p>
-          <a:p>
-            <a:r>
-              <a:rPr lang="en-US" smtClean="0"/>
-              <a:t>C++ is </a:t>
-            </a:r>
-            <a:r>
-              <a:rPr lang="en-US" dirty="0"/>
-              <a:t>compiled directly into machine code and therefore, can only run on the same platform in which it was compiled</a:t>
-            </a:r>
           </a:p>
         </p:txBody>
       </p:sp>
@@ -3258,7 +3313,11 @@
           <a:p>
             <a:r>
               <a:rPr lang="en-US" dirty="0" smtClean="0"/>
-              <a:t>JDK Installation Path</a:t>
+              <a:t>Flow of Java </a:t>
+            </a:r>
+            <a:r>
+              <a:rPr lang="en-US" dirty="0" err="1" smtClean="0"/>
+              <a:t>programe</a:t>
             </a:r>
             <a:endParaRPr lang="en-US" dirty="0"/>
           </a:p>
@@ -3281,12 +3340,354 @@
           <a:p>
             <a:r>
               <a:rPr lang="en-US" dirty="0" smtClean="0"/>
-              <a:t>https://www.oracle.com/in/java/technologies/javase/javase8-archive-downloads.html</a:t>
+              <a:t>Java compiler converts the source code into byte code.</a:t>
             </a:r>
             <a:endParaRPr lang="en-US" dirty="0"/>
           </a:p>
         </p:txBody>
       </p:sp>
+      <p:sp>
+        <p:nvSpPr>
+          <p:cNvPr id="4" name="Rectangle 3"/>
+          <p:cNvSpPr/>
+          <p:nvPr/>
+        </p:nvSpPr>
+        <p:spPr>
+          <a:xfrm>
+            <a:off x="1371600" y="3657600"/>
+            <a:ext cx="1371600" cy="914400"/>
+          </a:xfrm>
+          <a:prstGeom prst="rect">
+            <a:avLst/>
+          </a:prstGeom>
+        </p:spPr>
+        <p:style>
+          <a:lnRef idx="2">
+            <a:schemeClr val="accent1">
+              <a:shade val="50000"/>
+            </a:schemeClr>
+          </a:lnRef>
+          <a:fillRef idx="1">
+            <a:schemeClr val="accent1"/>
+          </a:fillRef>
+          <a:effectRef idx="0">
+            <a:schemeClr val="accent1"/>
+          </a:effectRef>
+          <a:fontRef idx="minor">
+            <a:schemeClr val="lt1"/>
+          </a:fontRef>
+        </p:style>
+        <p:txBody>
+          <a:bodyPr rtlCol="0" anchor="ctr"/>
+          <a:lstStyle/>
+          <a:p>
+            <a:pPr algn="ctr"/>
+            <a:endParaRPr lang="en-US"/>
+          </a:p>
+        </p:txBody>
+      </p:sp>
+      <p:sp>
+        <p:nvSpPr>
+          <p:cNvPr id="5" name="Oval 4"/>
+          <p:cNvSpPr/>
+          <p:nvPr/>
+        </p:nvSpPr>
+        <p:spPr>
+          <a:xfrm>
+            <a:off x="3429000" y="3581400"/>
+            <a:ext cx="1828800" cy="1143000"/>
+          </a:xfrm>
+          <a:prstGeom prst="ellipse">
+            <a:avLst/>
+          </a:prstGeom>
+        </p:spPr>
+        <p:style>
+          <a:lnRef idx="2">
+            <a:schemeClr val="accent1">
+              <a:shade val="50000"/>
+            </a:schemeClr>
+          </a:lnRef>
+          <a:fillRef idx="1">
+            <a:schemeClr val="accent1"/>
+          </a:fillRef>
+          <a:effectRef idx="0">
+            <a:schemeClr val="accent1"/>
+          </a:effectRef>
+          <a:fontRef idx="minor">
+            <a:schemeClr val="lt1"/>
+          </a:fontRef>
+        </p:style>
+        <p:txBody>
+          <a:bodyPr rtlCol="0" anchor="ctr"/>
+          <a:lstStyle/>
+          <a:p>
+            <a:pPr algn="ctr"/>
+            <a:endParaRPr lang="en-US"/>
+          </a:p>
+        </p:txBody>
+      </p:sp>
+      <p:sp>
+        <p:nvSpPr>
+          <p:cNvPr id="6" name="Rounded Rectangle 5"/>
+          <p:cNvSpPr/>
+          <p:nvPr/>
+        </p:nvSpPr>
+        <p:spPr>
+          <a:xfrm>
+            <a:off x="6324600" y="3733800"/>
+            <a:ext cx="1447800" cy="762000"/>
+          </a:xfrm>
+          <a:prstGeom prst="roundRect">
+            <a:avLst/>
+          </a:prstGeom>
+        </p:spPr>
+        <p:style>
+          <a:lnRef idx="2">
+            <a:schemeClr val="accent1">
+              <a:shade val="50000"/>
+            </a:schemeClr>
+          </a:lnRef>
+          <a:fillRef idx="1">
+            <a:schemeClr val="accent1"/>
+          </a:fillRef>
+          <a:effectRef idx="0">
+            <a:schemeClr val="accent1"/>
+          </a:effectRef>
+          <a:fontRef idx="minor">
+            <a:schemeClr val="lt1"/>
+          </a:fontRef>
+        </p:style>
+        <p:txBody>
+          <a:bodyPr rtlCol="0" anchor="ctr"/>
+          <a:lstStyle/>
+          <a:p>
+            <a:pPr algn="ctr"/>
+            <a:endParaRPr lang="en-US"/>
+          </a:p>
+        </p:txBody>
+      </p:sp>
+      <p:sp>
+        <p:nvSpPr>
+          <p:cNvPr id="7" name="TextBox 6"/>
+          <p:cNvSpPr txBox="1"/>
+          <p:nvPr/>
+        </p:nvSpPr>
+        <p:spPr>
+          <a:xfrm>
+            <a:off x="1524000" y="4953000"/>
+            <a:ext cx="1066800" cy="369332"/>
+          </a:xfrm>
+          <a:prstGeom prst="rect">
+            <a:avLst/>
+          </a:prstGeom>
+          <a:noFill/>
+        </p:spPr>
+        <p:txBody>
+          <a:bodyPr wrap="square" rtlCol="0">
+            <a:spAutoFit/>
+          </a:bodyPr>
+          <a:lstStyle/>
+          <a:p>
+            <a:r>
+              <a:rPr lang="en-US" dirty="0" smtClean="0"/>
+              <a:t>.java</a:t>
+            </a:r>
+            <a:endParaRPr lang="en-US" dirty="0"/>
+          </a:p>
+        </p:txBody>
+      </p:sp>
+      <p:sp>
+        <p:nvSpPr>
+          <p:cNvPr id="8" name="TextBox 7"/>
+          <p:cNvSpPr txBox="1"/>
+          <p:nvPr/>
+        </p:nvSpPr>
+        <p:spPr>
+          <a:xfrm>
+            <a:off x="6477000" y="4876800"/>
+            <a:ext cx="1066800" cy="369332"/>
+          </a:xfrm>
+          <a:prstGeom prst="rect">
+            <a:avLst/>
+          </a:prstGeom>
+          <a:noFill/>
+        </p:spPr>
+        <p:txBody>
+          <a:bodyPr wrap="square" rtlCol="0">
+            <a:spAutoFit/>
+          </a:bodyPr>
+          <a:lstStyle/>
+          <a:p>
+            <a:r>
+              <a:rPr lang="en-US" dirty="0" smtClean="0"/>
+              <a:t>.class</a:t>
+            </a:r>
+            <a:endParaRPr lang="en-US" dirty="0"/>
+          </a:p>
+        </p:txBody>
+      </p:sp>
+      <p:sp>
+        <p:nvSpPr>
+          <p:cNvPr id="9" name="TextBox 8"/>
+          <p:cNvSpPr txBox="1"/>
+          <p:nvPr/>
+        </p:nvSpPr>
+        <p:spPr>
+          <a:xfrm>
+            <a:off x="1524000" y="3810000"/>
+            <a:ext cx="1143000" cy="369332"/>
+          </a:xfrm>
+          <a:prstGeom prst="rect">
+            <a:avLst/>
+          </a:prstGeom>
+          <a:noFill/>
+        </p:spPr>
+        <p:txBody>
+          <a:bodyPr wrap="square" rtlCol="0">
+            <a:spAutoFit/>
+          </a:bodyPr>
+          <a:lstStyle/>
+          <a:p>
+            <a:r>
+              <a:rPr lang="en-US" dirty="0" smtClean="0"/>
+              <a:t>Java code</a:t>
+            </a:r>
+            <a:endParaRPr lang="en-US" dirty="0"/>
+          </a:p>
+        </p:txBody>
+      </p:sp>
+      <p:sp>
+        <p:nvSpPr>
+          <p:cNvPr id="10" name="TextBox 9"/>
+          <p:cNvSpPr txBox="1"/>
+          <p:nvPr/>
+        </p:nvSpPr>
+        <p:spPr>
+          <a:xfrm>
+            <a:off x="6400800" y="3886200"/>
+            <a:ext cx="1143000" cy="369332"/>
+          </a:xfrm>
+          <a:prstGeom prst="rect">
+            <a:avLst/>
+          </a:prstGeom>
+          <a:noFill/>
+        </p:spPr>
+        <p:txBody>
+          <a:bodyPr wrap="square" rtlCol="0">
+            <a:spAutoFit/>
+          </a:bodyPr>
+          <a:lstStyle/>
+          <a:p>
+            <a:r>
+              <a:rPr lang="en-US" dirty="0" err="1" smtClean="0"/>
+              <a:t>Bytecode</a:t>
+            </a:r>
+            <a:endParaRPr lang="en-US" dirty="0"/>
+          </a:p>
+        </p:txBody>
+      </p:sp>
+      <p:sp>
+        <p:nvSpPr>
+          <p:cNvPr id="11" name="TextBox 10"/>
+          <p:cNvSpPr txBox="1"/>
+          <p:nvPr/>
+        </p:nvSpPr>
+        <p:spPr>
+          <a:xfrm>
+            <a:off x="3810000" y="3962400"/>
+            <a:ext cx="1295400" cy="369332"/>
+          </a:xfrm>
+          <a:prstGeom prst="rect">
+            <a:avLst/>
+          </a:prstGeom>
+          <a:noFill/>
+        </p:spPr>
+        <p:txBody>
+          <a:bodyPr wrap="square" rtlCol="0">
+            <a:spAutoFit/>
+          </a:bodyPr>
+          <a:lstStyle/>
+          <a:p>
+            <a:r>
+              <a:rPr lang="en-US" dirty="0" smtClean="0"/>
+              <a:t>Compiler</a:t>
+            </a:r>
+            <a:endParaRPr lang="en-US" dirty="0"/>
+          </a:p>
+        </p:txBody>
+      </p:sp>
+      <p:cxnSp>
+        <p:nvCxnSpPr>
+          <p:cNvPr id="13" name="Straight Arrow Connector 12"/>
+          <p:cNvCxnSpPr>
+            <a:stCxn id="4" idx="3"/>
+            <a:endCxn id="5" idx="2"/>
+          </p:cNvCxnSpPr>
+          <p:nvPr/>
+        </p:nvCxnSpPr>
+        <p:spPr>
+          <a:xfrm>
+            <a:off x="2743200" y="4114800"/>
+            <a:ext cx="685800" cy="38100"/>
+          </a:xfrm>
+          <a:prstGeom prst="straightConnector1">
+            <a:avLst/>
+          </a:prstGeom>
+          <a:ln>
+            <a:tailEnd type="arrow"/>
+          </a:ln>
+        </p:spPr>
+        <p:style>
+          <a:lnRef idx="1">
+            <a:schemeClr val="accent1"/>
+          </a:lnRef>
+          <a:fillRef idx="0">
+            <a:schemeClr val="accent1"/>
+          </a:fillRef>
+          <a:effectRef idx="0">
+            <a:schemeClr val="accent1"/>
+          </a:effectRef>
+          <a:fontRef idx="minor">
+            <a:schemeClr val="tx1"/>
+          </a:fontRef>
+        </p:style>
+      </p:cxnSp>
+      <p:cxnSp>
+        <p:nvCxnSpPr>
+          <p:cNvPr id="15" name="Straight Arrow Connector 14"/>
+          <p:cNvCxnSpPr>
+            <a:stCxn id="5" idx="6"/>
+            <a:endCxn id="6" idx="1"/>
+          </p:cNvCxnSpPr>
+          <p:nvPr/>
+        </p:nvCxnSpPr>
+        <p:spPr>
+          <a:xfrm flipV="1">
+            <a:off x="5257800" y="4114800"/>
+            <a:ext cx="1066800" cy="38100"/>
+          </a:xfrm>
+          <a:prstGeom prst="straightConnector1">
+            <a:avLst/>
+          </a:prstGeom>
+          <a:ln>
+            <a:tailEnd type="arrow"/>
+          </a:ln>
+        </p:spPr>
+        <p:style>
+          <a:lnRef idx="1">
+            <a:schemeClr val="accent1"/>
+          </a:lnRef>
+          <a:fillRef idx="0">
+            <a:schemeClr val="accent1"/>
+          </a:fillRef>
+          <a:effectRef idx="0">
+            <a:schemeClr val="accent1"/>
+          </a:effectRef>
+          <a:fontRef idx="minor">
+            <a:schemeClr val="tx1"/>
+          </a:fontRef>
+        </p:style>
+      </p:cxnSp>
     </p:spTree>
   </p:cSld>
   <p:clrMapOvr>
@@ -3296,6 +3697,2771 @@
 </file>
 
 <file path=ppt/slides/slide12.xml><?xml version="1.0" encoding="utf-8"?>
+<p:sld xmlns:a="http://schemas.openxmlformats.org/drawingml/2006/main" xmlns:r="http://schemas.openxmlformats.org/officeDocument/2006/relationships" xmlns:p="http://schemas.openxmlformats.org/presentationml/2006/main">
+  <p:cSld>
+    <p:spTree>
+      <p:nvGrpSpPr>
+        <p:cNvPr id="1" name=""/>
+        <p:cNvGrpSpPr/>
+        <p:nvPr/>
+      </p:nvGrpSpPr>
+      <p:grpSpPr>
+        <a:xfrm>
+          <a:off x="0" y="0"/>
+          <a:ext cx="0" cy="0"/>
+          <a:chOff x="0" y="0"/>
+          <a:chExt cx="0" cy="0"/>
+        </a:xfrm>
+      </p:grpSpPr>
+      <p:sp>
+        <p:nvSpPr>
+          <p:cNvPr id="2" name="Title 1"/>
+          <p:cNvSpPr>
+            <a:spLocks noGrp="1"/>
+          </p:cNvSpPr>
+          <p:nvPr>
+            <p:ph type="title"/>
+          </p:nvPr>
+        </p:nvSpPr>
+        <p:spPr/>
+        <p:txBody>
+          <a:bodyPr/>
+          <a:lstStyle/>
+          <a:p>
+            <a:endParaRPr lang="en-US"/>
+          </a:p>
+        </p:txBody>
+      </p:sp>
+      <p:sp>
+        <p:nvSpPr>
+          <p:cNvPr id="3" name="Content Placeholder 2"/>
+          <p:cNvSpPr>
+            <a:spLocks noGrp="1"/>
+          </p:cNvSpPr>
+          <p:nvPr>
+            <p:ph idx="1"/>
+          </p:nvPr>
+        </p:nvSpPr>
+        <p:spPr/>
+        <p:txBody>
+          <a:bodyPr>
+            <a:normAutofit/>
+          </a:bodyPr>
+          <a:lstStyle/>
+          <a:p>
+            <a:r>
+              <a:rPr lang="en-US" sz="1400" b="1" dirty="0" smtClean="0"/>
+              <a:t>class</a:t>
+            </a:r>
+            <a:r>
+              <a:rPr lang="en-US" sz="1400" dirty="0" smtClean="0"/>
+              <a:t> keyword is used to declare a class in Java.</a:t>
+            </a:r>
+          </a:p>
+          <a:p>
+            <a:r>
+              <a:rPr lang="en-US" sz="1400" b="1" dirty="0" smtClean="0"/>
+              <a:t>public</a:t>
+            </a:r>
+            <a:r>
+              <a:rPr lang="en-US" sz="1400" dirty="0" smtClean="0"/>
+              <a:t> keyword is an access modifier that represents visibility. It means it is visible to </a:t>
+            </a:r>
+            <a:r>
+              <a:rPr lang="en-US" sz="1400" dirty="0" smtClean="0"/>
+              <a:t>all</a:t>
+            </a:r>
+          </a:p>
+          <a:p>
+            <a:r>
+              <a:rPr lang="en-US" sz="1400" b="1" dirty="0" smtClean="0"/>
+              <a:t>static</a:t>
+            </a:r>
+            <a:r>
+              <a:rPr lang="en-US" sz="1400" dirty="0" smtClean="0"/>
+              <a:t> is a keyword. If we declare any method as static, it is known as the static method. The core advantage of the static method is that there is no need to create an object to invoke the static method. The main() method is executed by the JVM, so it doesn't require creating an object to invoke the main() method. So, it saves </a:t>
+            </a:r>
+            <a:r>
+              <a:rPr lang="en-US" sz="1400" dirty="0" smtClean="0"/>
+              <a:t>memory</a:t>
+            </a:r>
+          </a:p>
+          <a:p>
+            <a:r>
+              <a:rPr lang="en-US" sz="1400" b="1" dirty="0" smtClean="0"/>
+              <a:t>void</a:t>
+            </a:r>
+            <a:r>
+              <a:rPr lang="en-US" sz="1400" dirty="0" smtClean="0"/>
+              <a:t> is the return </a:t>
+            </a:r>
+            <a:r>
+              <a:rPr lang="en-US" sz="1400" dirty="0" smtClean="0"/>
+              <a:t>type </a:t>
+            </a:r>
+            <a:r>
+              <a:rPr lang="en-US" sz="1400" dirty="0" smtClean="0"/>
+              <a:t>of the method. It means it doesn't return any </a:t>
+            </a:r>
+            <a:r>
+              <a:rPr lang="en-US" sz="1400" dirty="0" smtClean="0"/>
+              <a:t>value</a:t>
+            </a:r>
+          </a:p>
+          <a:p>
+            <a:r>
+              <a:rPr lang="en-US" sz="1400" b="1" dirty="0" smtClean="0"/>
+              <a:t>main</a:t>
+            </a:r>
+            <a:r>
+              <a:rPr lang="en-US" sz="1400" dirty="0" smtClean="0"/>
+              <a:t> represents the starting point of the </a:t>
+            </a:r>
+            <a:r>
+              <a:rPr lang="en-US" sz="1400" dirty="0" smtClean="0"/>
+              <a:t>program</a:t>
+            </a:r>
+          </a:p>
+          <a:p>
+            <a:r>
+              <a:rPr lang="en-US" sz="1400" b="1" dirty="0" smtClean="0"/>
+              <a:t>String[] </a:t>
+            </a:r>
+            <a:r>
+              <a:rPr lang="en-US" sz="1400" b="1" dirty="0" err="1" smtClean="0"/>
+              <a:t>args</a:t>
+            </a:r>
+            <a:r>
+              <a:rPr lang="en-US" sz="1400" dirty="0" smtClean="0"/>
+              <a:t> or </a:t>
+            </a:r>
+            <a:r>
+              <a:rPr lang="en-US" sz="1400" b="1" dirty="0" smtClean="0"/>
+              <a:t>String </a:t>
+            </a:r>
+            <a:r>
+              <a:rPr lang="en-US" sz="1400" b="1" dirty="0" err="1" smtClean="0"/>
+              <a:t>args</a:t>
+            </a:r>
+            <a:r>
+              <a:rPr lang="en-US" sz="1400" b="1" dirty="0" smtClean="0"/>
+              <a:t>[]</a:t>
+            </a:r>
+            <a:r>
+              <a:rPr lang="en-US" sz="1400" dirty="0" smtClean="0"/>
+              <a:t> is used for </a:t>
+            </a:r>
+            <a:r>
+              <a:rPr lang="en-US" sz="1400" dirty="0" smtClean="0">
+                <a:hlinkClick r:id="rId2"/>
+              </a:rPr>
+              <a:t>command line argument</a:t>
+            </a:r>
+            <a:r>
+              <a:rPr lang="en-US" sz="1400" dirty="0" smtClean="0"/>
+              <a:t>. </a:t>
+            </a:r>
+            <a:endParaRPr lang="en-US" sz="1400" dirty="0" smtClean="0"/>
+          </a:p>
+          <a:p>
+            <a:r>
+              <a:rPr lang="en-US" sz="1400" b="1" dirty="0" err="1" smtClean="0"/>
+              <a:t>System.out.println</a:t>
+            </a:r>
+            <a:r>
+              <a:rPr lang="en-US" sz="1400" b="1" dirty="0" smtClean="0"/>
+              <a:t>()</a:t>
+            </a:r>
+            <a:r>
+              <a:rPr lang="en-US" sz="1400" dirty="0" smtClean="0"/>
+              <a:t> is used to print statement. Here, System is a class, out is an object of the </a:t>
+            </a:r>
+            <a:r>
+              <a:rPr lang="en-US" sz="1400" dirty="0" err="1" smtClean="0"/>
+              <a:t>PrintStream</a:t>
+            </a:r>
+            <a:r>
+              <a:rPr lang="en-US" sz="1400" dirty="0" smtClean="0"/>
+              <a:t> class, </a:t>
+            </a:r>
+            <a:r>
+              <a:rPr lang="en-US" sz="1400" dirty="0" err="1" smtClean="0"/>
+              <a:t>println</a:t>
+            </a:r>
+            <a:r>
+              <a:rPr lang="en-US" sz="1400" dirty="0" smtClean="0"/>
+              <a:t>() is a method of the </a:t>
+            </a:r>
+            <a:r>
+              <a:rPr lang="en-US" sz="1400" dirty="0" err="1" smtClean="0"/>
+              <a:t>PrintStream</a:t>
+            </a:r>
+            <a:r>
+              <a:rPr lang="en-US" sz="1400" dirty="0" smtClean="0"/>
+              <a:t> class</a:t>
+            </a:r>
+            <a:endParaRPr lang="en-US" sz="1400" dirty="0"/>
+          </a:p>
+        </p:txBody>
+      </p:sp>
+    </p:spTree>
+  </p:cSld>
+  <p:clrMapOvr>
+    <a:masterClrMapping/>
+  </p:clrMapOvr>
+</p:sld>
+</file>
+
+<file path=ppt/slides/slide13.xml><?xml version="1.0" encoding="utf-8"?>
+<p:sld xmlns:a="http://schemas.openxmlformats.org/drawingml/2006/main" xmlns:r="http://schemas.openxmlformats.org/officeDocument/2006/relationships" xmlns:p="http://schemas.openxmlformats.org/presentationml/2006/main">
+  <p:cSld>
+    <p:spTree>
+      <p:nvGrpSpPr>
+        <p:cNvPr id="1" name=""/>
+        <p:cNvGrpSpPr/>
+        <p:nvPr/>
+      </p:nvGrpSpPr>
+      <p:grpSpPr>
+        <a:xfrm>
+          <a:off x="0" y="0"/>
+          <a:ext cx="0" cy="0"/>
+          <a:chOff x="0" y="0"/>
+          <a:chExt cx="0" cy="0"/>
+        </a:xfrm>
+      </p:grpSpPr>
+      <p:sp>
+        <p:nvSpPr>
+          <p:cNvPr id="2" name="Title 1"/>
+          <p:cNvSpPr>
+            <a:spLocks noGrp="1"/>
+          </p:cNvSpPr>
+          <p:nvPr>
+            <p:ph type="title"/>
+          </p:nvPr>
+        </p:nvSpPr>
+        <p:spPr/>
+        <p:txBody>
+          <a:bodyPr/>
+          <a:lstStyle/>
+          <a:p>
+            <a:r>
+              <a:rPr lang="en-US" dirty="0" smtClean="0"/>
+              <a:t>Diff between C++ &amp; Java</a:t>
+            </a:r>
+            <a:endParaRPr lang="en-US" dirty="0"/>
+          </a:p>
+        </p:txBody>
+      </p:sp>
+      <p:graphicFrame>
+        <p:nvGraphicFramePr>
+          <p:cNvPr id="4" name="Table 3"/>
+          <p:cNvGraphicFramePr>
+            <a:graphicFrameLocks noGrp="1"/>
+          </p:cNvGraphicFramePr>
+          <p:nvPr/>
+        </p:nvGraphicFramePr>
+        <p:xfrm>
+          <a:off x="1142999" y="1397000"/>
+          <a:ext cx="7315200" cy="4764294"/>
+        </p:xfrm>
+        <a:graphic>
+          <a:graphicData uri="http://schemas.openxmlformats.org/drawingml/2006/table">
+            <a:tbl>
+              <a:tblPr/>
+              <a:tblGrid>
+                <a:gridCol w="990601"/>
+                <a:gridCol w="2286000"/>
+                <a:gridCol w="4038599"/>
+              </a:tblGrid>
+              <a:tr h="191911">
+                <a:tc>
+                  <a:txBody>
+                    <a:bodyPr/>
+                    <a:lstStyle/>
+                    <a:p>
+                      <a:pPr marL="0" marR="0" algn="just">
+                        <a:lnSpc>
+                          <a:spcPct val="115000"/>
+                        </a:lnSpc>
+                        <a:spcBef>
+                          <a:spcPts val="0"/>
+                        </a:spcBef>
+                        <a:spcAft>
+                          <a:spcPts val="0"/>
+                        </a:spcAft>
+                      </a:pPr>
+                      <a:r>
+                        <a:rPr lang="en-US" sz="1000" b="1" u="none" dirty="0">
+                          <a:solidFill>
+                            <a:srgbClr val="333333"/>
+                          </a:solidFill>
+                          <a:latin typeface="Times New Roman" pitchFamily="18" charset="0"/>
+                          <a:ea typeface="Times New Roman"/>
+                          <a:cs typeface="Times New Roman" pitchFamily="18" charset="0"/>
+                        </a:rPr>
+                        <a:t>Platform-independent</a:t>
+                      </a:r>
+                      <a:endParaRPr lang="en-US" sz="1000" u="none" dirty="0">
+                        <a:latin typeface="Times New Roman" pitchFamily="18" charset="0"/>
+                        <a:ea typeface="Calibri"/>
+                        <a:cs typeface="Times New Roman" pitchFamily="18" charset="0"/>
+                      </a:endParaRPr>
+                    </a:p>
+                  </a:txBody>
+                  <a:tcPr marL="40317" marR="40317" marT="40317" marB="40317">
+                    <a:lnL w="12700" cap="flat" cmpd="sng" algn="ctr">
+                      <a:solidFill>
+                        <a:srgbClr val="C7CCBE"/>
+                      </a:solidFill>
+                      <a:prstDash val="solid"/>
+                      <a:round/>
+                      <a:headEnd type="none" w="med" len="med"/>
+                      <a:tailEnd type="none" w="med" len="med"/>
+                    </a:lnL>
+                    <a:lnR w="12700" cap="flat" cmpd="sng" algn="ctr">
+                      <a:solidFill>
+                        <a:srgbClr val="C7CCBE"/>
+                      </a:solidFill>
+                      <a:prstDash val="solid"/>
+                      <a:round/>
+                      <a:headEnd type="none" w="med" len="med"/>
+                      <a:tailEnd type="none" w="med" len="med"/>
+                    </a:lnR>
+                    <a:lnT w="12700" cap="flat" cmpd="sng" algn="ctr">
+                      <a:solidFill>
+                        <a:srgbClr val="C7CCBE"/>
+                      </a:solidFill>
+                      <a:prstDash val="solid"/>
+                      <a:round/>
+                      <a:headEnd type="none" w="med" len="med"/>
+                      <a:tailEnd type="none" w="med" len="med"/>
+                    </a:lnT>
+                    <a:lnB w="12700" cap="flat" cmpd="sng" algn="ctr">
+                      <a:solidFill>
+                        <a:srgbClr val="C7CCBE"/>
+                      </a:solidFill>
+                      <a:prstDash val="solid"/>
+                      <a:round/>
+                      <a:headEnd type="none" w="med" len="med"/>
+                      <a:tailEnd type="none" w="med" len="med"/>
+                    </a:lnB>
+                    <a:solidFill>
+                      <a:srgbClr val="FFFFFF"/>
+                    </a:solidFill>
+                  </a:tcPr>
+                </a:tc>
+                <a:tc>
+                  <a:txBody>
+                    <a:bodyPr/>
+                    <a:lstStyle/>
+                    <a:p>
+                      <a:pPr marL="0" marR="0" algn="just">
+                        <a:lnSpc>
+                          <a:spcPct val="115000"/>
+                        </a:lnSpc>
+                        <a:spcBef>
+                          <a:spcPts val="0"/>
+                        </a:spcBef>
+                        <a:spcAft>
+                          <a:spcPts val="0"/>
+                        </a:spcAft>
+                      </a:pPr>
+                      <a:r>
+                        <a:rPr lang="en-US" sz="1000" u="none" dirty="0" smtClean="0">
+                          <a:solidFill>
+                            <a:srgbClr val="333333"/>
+                          </a:solidFill>
+                          <a:latin typeface="Times New Roman" pitchFamily="18" charset="0"/>
+                          <a:ea typeface="Times New Roman"/>
+                          <a:cs typeface="Times New Roman" pitchFamily="18" charset="0"/>
+                        </a:rPr>
+                        <a:t>platform-dependent</a:t>
+                      </a:r>
+                      <a:r>
+                        <a:rPr lang="en-US" sz="1000" u="none" dirty="0">
+                          <a:solidFill>
+                            <a:srgbClr val="333333"/>
+                          </a:solidFill>
+                          <a:latin typeface="Times New Roman" pitchFamily="18" charset="0"/>
+                          <a:ea typeface="Times New Roman"/>
+                          <a:cs typeface="Times New Roman" pitchFamily="18" charset="0"/>
+                        </a:rPr>
+                        <a:t>.</a:t>
+                      </a:r>
+                      <a:endParaRPr lang="en-US" sz="1000" u="none" dirty="0">
+                        <a:latin typeface="Times New Roman" pitchFamily="18" charset="0"/>
+                        <a:ea typeface="Calibri"/>
+                        <a:cs typeface="Times New Roman" pitchFamily="18" charset="0"/>
+                      </a:endParaRPr>
+                    </a:p>
+                  </a:txBody>
+                  <a:tcPr marL="40317" marR="40317" marT="40317" marB="40317">
+                    <a:lnL w="12700" cap="flat" cmpd="sng" algn="ctr">
+                      <a:solidFill>
+                        <a:srgbClr val="C7CCBE"/>
+                      </a:solidFill>
+                      <a:prstDash val="solid"/>
+                      <a:round/>
+                      <a:headEnd type="none" w="med" len="med"/>
+                      <a:tailEnd type="none" w="med" len="med"/>
+                    </a:lnL>
+                    <a:lnR w="12700" cap="flat" cmpd="sng" algn="ctr">
+                      <a:solidFill>
+                        <a:srgbClr val="C7CCBE"/>
+                      </a:solidFill>
+                      <a:prstDash val="solid"/>
+                      <a:round/>
+                      <a:headEnd type="none" w="med" len="med"/>
+                      <a:tailEnd type="none" w="med" len="med"/>
+                    </a:lnR>
+                    <a:lnT w="12700" cap="flat" cmpd="sng" algn="ctr">
+                      <a:solidFill>
+                        <a:srgbClr val="C7CCBE"/>
+                      </a:solidFill>
+                      <a:prstDash val="solid"/>
+                      <a:round/>
+                      <a:headEnd type="none" w="med" len="med"/>
+                      <a:tailEnd type="none" w="med" len="med"/>
+                    </a:lnT>
+                    <a:lnB w="12700" cap="flat" cmpd="sng" algn="ctr">
+                      <a:solidFill>
+                        <a:srgbClr val="C7CCBE"/>
+                      </a:solidFill>
+                      <a:prstDash val="solid"/>
+                      <a:round/>
+                      <a:headEnd type="none" w="med" len="med"/>
+                      <a:tailEnd type="none" w="med" len="med"/>
+                    </a:lnB>
+                    <a:solidFill>
+                      <a:srgbClr val="FFFFFF"/>
+                    </a:solidFill>
+                  </a:tcPr>
+                </a:tc>
+                <a:tc>
+                  <a:txBody>
+                    <a:bodyPr/>
+                    <a:lstStyle/>
+                    <a:p>
+                      <a:pPr marL="0" marR="0" algn="just">
+                        <a:lnSpc>
+                          <a:spcPct val="115000"/>
+                        </a:lnSpc>
+                        <a:spcBef>
+                          <a:spcPts val="0"/>
+                        </a:spcBef>
+                        <a:spcAft>
+                          <a:spcPts val="0"/>
+                        </a:spcAft>
+                      </a:pPr>
+                      <a:r>
+                        <a:rPr lang="en-US" sz="1000" u="none" dirty="0">
+                          <a:solidFill>
+                            <a:srgbClr val="333333"/>
+                          </a:solidFill>
+                          <a:latin typeface="Times New Roman" pitchFamily="18" charset="0"/>
+                          <a:ea typeface="Times New Roman"/>
+                          <a:cs typeface="Times New Roman" pitchFamily="18" charset="0"/>
+                        </a:rPr>
+                        <a:t>Java is platform-independent.</a:t>
+                      </a:r>
+                      <a:endParaRPr lang="en-US" sz="1000" u="none" dirty="0">
+                        <a:latin typeface="Times New Roman" pitchFamily="18" charset="0"/>
+                        <a:ea typeface="Calibri"/>
+                        <a:cs typeface="Times New Roman" pitchFamily="18" charset="0"/>
+                      </a:endParaRPr>
+                    </a:p>
+                  </a:txBody>
+                  <a:tcPr marL="40317" marR="40317" marT="40317" marB="40317">
+                    <a:lnL w="12700" cap="flat" cmpd="sng" algn="ctr">
+                      <a:solidFill>
+                        <a:srgbClr val="C7CCBE"/>
+                      </a:solidFill>
+                      <a:prstDash val="solid"/>
+                      <a:round/>
+                      <a:headEnd type="none" w="med" len="med"/>
+                      <a:tailEnd type="none" w="med" len="med"/>
+                    </a:lnL>
+                    <a:lnR w="12700" cap="flat" cmpd="sng" algn="ctr">
+                      <a:solidFill>
+                        <a:srgbClr val="C7CCBE"/>
+                      </a:solidFill>
+                      <a:prstDash val="solid"/>
+                      <a:round/>
+                      <a:headEnd type="none" w="med" len="med"/>
+                      <a:tailEnd type="none" w="med" len="med"/>
+                    </a:lnR>
+                    <a:lnT w="12700" cap="flat" cmpd="sng" algn="ctr">
+                      <a:solidFill>
+                        <a:srgbClr val="C7CCBE"/>
+                      </a:solidFill>
+                      <a:prstDash val="solid"/>
+                      <a:round/>
+                      <a:headEnd type="none" w="med" len="med"/>
+                      <a:tailEnd type="none" w="med" len="med"/>
+                    </a:lnT>
+                    <a:lnB w="12700" cap="flat" cmpd="sng" algn="ctr">
+                      <a:solidFill>
+                        <a:srgbClr val="C7CCBE"/>
+                      </a:solidFill>
+                      <a:prstDash val="solid"/>
+                      <a:round/>
+                      <a:headEnd type="none" w="med" len="med"/>
+                      <a:tailEnd type="none" w="med" len="med"/>
+                    </a:lnB>
+                    <a:solidFill>
+                      <a:srgbClr val="FFFFFF"/>
+                    </a:solidFill>
+                  </a:tcPr>
+                </a:tc>
+              </a:tr>
+              <a:tr h="303187">
+                <a:tc>
+                  <a:txBody>
+                    <a:bodyPr/>
+                    <a:lstStyle/>
+                    <a:p>
+                      <a:pPr marL="0" marR="0" algn="just">
+                        <a:lnSpc>
+                          <a:spcPct val="115000"/>
+                        </a:lnSpc>
+                        <a:spcBef>
+                          <a:spcPts val="0"/>
+                        </a:spcBef>
+                        <a:spcAft>
+                          <a:spcPts val="0"/>
+                        </a:spcAft>
+                      </a:pPr>
+                      <a:r>
+                        <a:rPr lang="en-US" sz="1000" b="1" u="none">
+                          <a:solidFill>
+                            <a:srgbClr val="333333"/>
+                          </a:solidFill>
+                          <a:latin typeface="Times New Roman" pitchFamily="18" charset="0"/>
+                          <a:ea typeface="Times New Roman"/>
+                          <a:cs typeface="Times New Roman" pitchFamily="18" charset="0"/>
+                        </a:rPr>
+                        <a:t>Goto</a:t>
+                      </a:r>
+                      <a:endParaRPr lang="en-US" sz="1000" u="none">
+                        <a:latin typeface="Times New Roman" pitchFamily="18" charset="0"/>
+                        <a:ea typeface="Calibri"/>
+                        <a:cs typeface="Times New Roman" pitchFamily="18" charset="0"/>
+                      </a:endParaRPr>
+                    </a:p>
+                  </a:txBody>
+                  <a:tcPr marL="40317" marR="40317" marT="40317" marB="40317">
+                    <a:lnL w="12700" cap="flat" cmpd="sng" algn="ctr">
+                      <a:solidFill>
+                        <a:srgbClr val="C7CCBE"/>
+                      </a:solidFill>
+                      <a:prstDash val="solid"/>
+                      <a:round/>
+                      <a:headEnd type="none" w="med" len="med"/>
+                      <a:tailEnd type="none" w="med" len="med"/>
+                    </a:lnL>
+                    <a:lnR w="12700" cap="flat" cmpd="sng" algn="ctr">
+                      <a:solidFill>
+                        <a:srgbClr val="C7CCBE"/>
+                      </a:solidFill>
+                      <a:prstDash val="solid"/>
+                      <a:round/>
+                      <a:headEnd type="none" w="med" len="med"/>
+                      <a:tailEnd type="none" w="med" len="med"/>
+                    </a:lnR>
+                    <a:lnT w="12700" cap="flat" cmpd="sng" algn="ctr">
+                      <a:solidFill>
+                        <a:srgbClr val="C7CCBE"/>
+                      </a:solidFill>
+                      <a:prstDash val="solid"/>
+                      <a:round/>
+                      <a:headEnd type="none" w="med" len="med"/>
+                      <a:tailEnd type="none" w="med" len="med"/>
+                    </a:lnT>
+                    <a:lnB w="12700" cap="flat" cmpd="sng" algn="ctr">
+                      <a:solidFill>
+                        <a:srgbClr val="C7CCBE"/>
+                      </a:solidFill>
+                      <a:prstDash val="solid"/>
+                      <a:round/>
+                      <a:headEnd type="none" w="med" len="med"/>
+                      <a:tailEnd type="none" w="med" len="med"/>
+                    </a:lnB>
+                    <a:solidFill>
+                      <a:srgbClr val="EFF1EB"/>
+                    </a:solidFill>
+                  </a:tcPr>
+                </a:tc>
+                <a:tc>
+                  <a:txBody>
+                    <a:bodyPr/>
+                    <a:lstStyle/>
+                    <a:p>
+                      <a:pPr marL="0" marR="0" algn="just">
+                        <a:lnSpc>
+                          <a:spcPct val="115000"/>
+                        </a:lnSpc>
+                        <a:spcBef>
+                          <a:spcPts val="0"/>
+                        </a:spcBef>
+                        <a:spcAft>
+                          <a:spcPts val="0"/>
+                        </a:spcAft>
+                      </a:pPr>
+                      <a:r>
+                        <a:rPr lang="en-US" sz="1000" u="none" dirty="0" smtClean="0">
+                          <a:solidFill>
+                            <a:srgbClr val="333333"/>
+                          </a:solidFill>
+                          <a:latin typeface="Times New Roman" pitchFamily="18" charset="0"/>
+                          <a:ea typeface="Times New Roman"/>
+                          <a:cs typeface="Times New Roman" pitchFamily="18" charset="0"/>
+                        </a:rPr>
+                        <a:t>supports </a:t>
+                      </a:r>
+                      <a:r>
+                        <a:rPr lang="en-US" sz="1000" u="none" dirty="0">
+                          <a:solidFill>
+                            <a:srgbClr val="333333"/>
+                          </a:solidFill>
+                          <a:latin typeface="Times New Roman" pitchFamily="18" charset="0"/>
+                          <a:ea typeface="Times New Roman"/>
+                          <a:cs typeface="Times New Roman" pitchFamily="18" charset="0"/>
+                        </a:rPr>
+                        <a:t>the </a:t>
+                      </a:r>
+                      <a:r>
+                        <a:rPr lang="en-US" sz="1000" u="none" strike="noStrike" dirty="0" err="1">
+                          <a:solidFill>
+                            <a:srgbClr val="008000"/>
+                          </a:solidFill>
+                          <a:latin typeface="Times New Roman" pitchFamily="18" charset="0"/>
+                          <a:ea typeface="Times New Roman"/>
+                          <a:cs typeface="Times New Roman" pitchFamily="18" charset="0"/>
+                          <a:hlinkClick r:id="rId2"/>
+                        </a:rPr>
+                        <a:t>goto</a:t>
+                      </a:r>
+                      <a:r>
+                        <a:rPr lang="en-US" sz="1000" u="none" dirty="0">
+                          <a:solidFill>
+                            <a:srgbClr val="333333"/>
+                          </a:solidFill>
+                          <a:latin typeface="Times New Roman" pitchFamily="18" charset="0"/>
+                          <a:ea typeface="Times New Roman"/>
+                          <a:cs typeface="Times New Roman" pitchFamily="18" charset="0"/>
+                        </a:rPr>
+                        <a:t> statement.</a:t>
+                      </a:r>
+                      <a:endParaRPr lang="en-US" sz="1000" u="none" dirty="0">
+                        <a:latin typeface="Times New Roman" pitchFamily="18" charset="0"/>
+                        <a:ea typeface="Calibri"/>
+                        <a:cs typeface="Times New Roman" pitchFamily="18" charset="0"/>
+                      </a:endParaRPr>
+                    </a:p>
+                  </a:txBody>
+                  <a:tcPr marL="40317" marR="40317" marT="40317" marB="40317">
+                    <a:lnL w="12700" cap="flat" cmpd="sng" algn="ctr">
+                      <a:solidFill>
+                        <a:srgbClr val="C7CCBE"/>
+                      </a:solidFill>
+                      <a:prstDash val="solid"/>
+                      <a:round/>
+                      <a:headEnd type="none" w="med" len="med"/>
+                      <a:tailEnd type="none" w="med" len="med"/>
+                    </a:lnL>
+                    <a:lnR w="12700" cap="flat" cmpd="sng" algn="ctr">
+                      <a:solidFill>
+                        <a:srgbClr val="C7CCBE"/>
+                      </a:solidFill>
+                      <a:prstDash val="solid"/>
+                      <a:round/>
+                      <a:headEnd type="none" w="med" len="med"/>
+                      <a:tailEnd type="none" w="med" len="med"/>
+                    </a:lnR>
+                    <a:lnT w="12700" cap="flat" cmpd="sng" algn="ctr">
+                      <a:solidFill>
+                        <a:srgbClr val="C7CCBE"/>
+                      </a:solidFill>
+                      <a:prstDash val="solid"/>
+                      <a:round/>
+                      <a:headEnd type="none" w="med" len="med"/>
+                      <a:tailEnd type="none" w="med" len="med"/>
+                    </a:lnT>
+                    <a:lnB w="12700" cap="flat" cmpd="sng" algn="ctr">
+                      <a:solidFill>
+                        <a:srgbClr val="C7CCBE"/>
+                      </a:solidFill>
+                      <a:prstDash val="solid"/>
+                      <a:round/>
+                      <a:headEnd type="none" w="med" len="med"/>
+                      <a:tailEnd type="none" w="med" len="med"/>
+                    </a:lnB>
+                    <a:solidFill>
+                      <a:srgbClr val="EFF1EB"/>
+                    </a:solidFill>
+                  </a:tcPr>
+                </a:tc>
+                <a:tc>
+                  <a:txBody>
+                    <a:bodyPr/>
+                    <a:lstStyle/>
+                    <a:p>
+                      <a:pPr marL="0" marR="0" algn="just">
+                        <a:lnSpc>
+                          <a:spcPct val="115000"/>
+                        </a:lnSpc>
+                        <a:spcBef>
+                          <a:spcPts val="0"/>
+                        </a:spcBef>
+                        <a:spcAft>
+                          <a:spcPts val="0"/>
+                        </a:spcAft>
+                      </a:pPr>
+                      <a:r>
+                        <a:rPr lang="en-US" sz="1000" u="none">
+                          <a:solidFill>
+                            <a:srgbClr val="333333"/>
+                          </a:solidFill>
+                          <a:latin typeface="Times New Roman" pitchFamily="18" charset="0"/>
+                          <a:ea typeface="Times New Roman"/>
+                          <a:cs typeface="Times New Roman" pitchFamily="18" charset="0"/>
+                        </a:rPr>
+                        <a:t>Java doesn't support the goto statement.</a:t>
+                      </a:r>
+                      <a:endParaRPr lang="en-US" sz="1000" u="none">
+                        <a:latin typeface="Times New Roman" pitchFamily="18" charset="0"/>
+                        <a:ea typeface="Calibri"/>
+                        <a:cs typeface="Times New Roman" pitchFamily="18" charset="0"/>
+                      </a:endParaRPr>
+                    </a:p>
+                  </a:txBody>
+                  <a:tcPr marL="40317" marR="40317" marT="40317" marB="40317">
+                    <a:lnL w="12700" cap="flat" cmpd="sng" algn="ctr">
+                      <a:solidFill>
+                        <a:srgbClr val="C7CCBE"/>
+                      </a:solidFill>
+                      <a:prstDash val="solid"/>
+                      <a:round/>
+                      <a:headEnd type="none" w="med" len="med"/>
+                      <a:tailEnd type="none" w="med" len="med"/>
+                    </a:lnL>
+                    <a:lnR w="12700" cap="flat" cmpd="sng" algn="ctr">
+                      <a:solidFill>
+                        <a:srgbClr val="C7CCBE"/>
+                      </a:solidFill>
+                      <a:prstDash val="solid"/>
+                      <a:round/>
+                      <a:headEnd type="none" w="med" len="med"/>
+                      <a:tailEnd type="none" w="med" len="med"/>
+                    </a:lnR>
+                    <a:lnT w="12700" cap="flat" cmpd="sng" algn="ctr">
+                      <a:solidFill>
+                        <a:srgbClr val="C7CCBE"/>
+                      </a:solidFill>
+                      <a:prstDash val="solid"/>
+                      <a:round/>
+                      <a:headEnd type="none" w="med" len="med"/>
+                      <a:tailEnd type="none" w="med" len="med"/>
+                    </a:lnT>
+                    <a:lnB w="12700" cap="flat" cmpd="sng" algn="ctr">
+                      <a:solidFill>
+                        <a:srgbClr val="C7CCBE"/>
+                      </a:solidFill>
+                      <a:prstDash val="solid"/>
+                      <a:round/>
+                      <a:headEnd type="none" w="med" len="med"/>
+                      <a:tailEnd type="none" w="med" len="med"/>
+                    </a:lnB>
+                    <a:solidFill>
+                      <a:srgbClr val="EFF1EB"/>
+                    </a:solidFill>
+                  </a:tcPr>
+                </a:tc>
+              </a:tr>
+              <a:tr h="525740">
+                <a:tc>
+                  <a:txBody>
+                    <a:bodyPr/>
+                    <a:lstStyle/>
+                    <a:p>
+                      <a:pPr marL="0" marR="0" algn="just">
+                        <a:lnSpc>
+                          <a:spcPct val="115000"/>
+                        </a:lnSpc>
+                        <a:spcBef>
+                          <a:spcPts val="0"/>
+                        </a:spcBef>
+                        <a:spcAft>
+                          <a:spcPts val="0"/>
+                        </a:spcAft>
+                      </a:pPr>
+                      <a:r>
+                        <a:rPr lang="en-US" sz="1000" b="1" u="none" dirty="0">
+                          <a:solidFill>
+                            <a:srgbClr val="333333"/>
+                          </a:solidFill>
+                          <a:latin typeface="Times New Roman" pitchFamily="18" charset="0"/>
+                          <a:ea typeface="Times New Roman"/>
+                          <a:cs typeface="Times New Roman" pitchFamily="18" charset="0"/>
+                        </a:rPr>
+                        <a:t>Multiple inheritance</a:t>
+                      </a:r>
+                      <a:endParaRPr lang="en-US" sz="1000" u="none" dirty="0">
+                        <a:latin typeface="Times New Roman" pitchFamily="18" charset="0"/>
+                        <a:ea typeface="Calibri"/>
+                        <a:cs typeface="Times New Roman" pitchFamily="18" charset="0"/>
+                      </a:endParaRPr>
+                    </a:p>
+                  </a:txBody>
+                  <a:tcPr marL="40317" marR="40317" marT="40317" marB="40317">
+                    <a:lnL w="12700" cap="flat" cmpd="sng" algn="ctr">
+                      <a:solidFill>
+                        <a:srgbClr val="C7CCBE"/>
+                      </a:solidFill>
+                      <a:prstDash val="solid"/>
+                      <a:round/>
+                      <a:headEnd type="none" w="med" len="med"/>
+                      <a:tailEnd type="none" w="med" len="med"/>
+                    </a:lnL>
+                    <a:lnR w="12700" cap="flat" cmpd="sng" algn="ctr">
+                      <a:solidFill>
+                        <a:srgbClr val="C7CCBE"/>
+                      </a:solidFill>
+                      <a:prstDash val="solid"/>
+                      <a:round/>
+                      <a:headEnd type="none" w="med" len="med"/>
+                      <a:tailEnd type="none" w="med" len="med"/>
+                    </a:lnR>
+                    <a:lnT w="12700" cap="flat" cmpd="sng" algn="ctr">
+                      <a:solidFill>
+                        <a:srgbClr val="C7CCBE"/>
+                      </a:solidFill>
+                      <a:prstDash val="solid"/>
+                      <a:round/>
+                      <a:headEnd type="none" w="med" len="med"/>
+                      <a:tailEnd type="none" w="med" len="med"/>
+                    </a:lnT>
+                    <a:lnB w="12700" cap="flat" cmpd="sng" algn="ctr">
+                      <a:solidFill>
+                        <a:srgbClr val="C7CCBE"/>
+                      </a:solidFill>
+                      <a:prstDash val="solid"/>
+                      <a:round/>
+                      <a:headEnd type="none" w="med" len="med"/>
+                      <a:tailEnd type="none" w="med" len="med"/>
+                    </a:lnB>
+                    <a:solidFill>
+                      <a:srgbClr val="FFFFFF"/>
+                    </a:solidFill>
+                  </a:tcPr>
+                </a:tc>
+                <a:tc>
+                  <a:txBody>
+                    <a:bodyPr/>
+                    <a:lstStyle/>
+                    <a:p>
+                      <a:pPr marL="0" marR="0" algn="just">
+                        <a:lnSpc>
+                          <a:spcPct val="115000"/>
+                        </a:lnSpc>
+                        <a:spcBef>
+                          <a:spcPts val="0"/>
+                        </a:spcBef>
+                        <a:spcAft>
+                          <a:spcPts val="0"/>
+                        </a:spcAft>
+                      </a:pPr>
+                      <a:r>
+                        <a:rPr lang="en-US" sz="1000" u="none" dirty="0" smtClean="0">
+                          <a:solidFill>
+                            <a:srgbClr val="333333"/>
+                          </a:solidFill>
+                          <a:latin typeface="Times New Roman" pitchFamily="18" charset="0"/>
+                          <a:ea typeface="Times New Roman"/>
+                          <a:cs typeface="Times New Roman" pitchFamily="18" charset="0"/>
+                        </a:rPr>
+                        <a:t>supports </a:t>
+                      </a:r>
+                      <a:r>
+                        <a:rPr lang="en-US" sz="1000" u="none" dirty="0">
+                          <a:solidFill>
+                            <a:srgbClr val="333333"/>
+                          </a:solidFill>
+                          <a:latin typeface="Times New Roman" pitchFamily="18" charset="0"/>
+                          <a:ea typeface="Times New Roman"/>
+                          <a:cs typeface="Times New Roman" pitchFamily="18" charset="0"/>
+                        </a:rPr>
+                        <a:t>multiple inheritance.</a:t>
+                      </a:r>
+                      <a:endParaRPr lang="en-US" sz="1000" u="none" dirty="0">
+                        <a:latin typeface="Times New Roman" pitchFamily="18" charset="0"/>
+                        <a:ea typeface="Calibri"/>
+                        <a:cs typeface="Times New Roman" pitchFamily="18" charset="0"/>
+                      </a:endParaRPr>
+                    </a:p>
+                  </a:txBody>
+                  <a:tcPr marL="40317" marR="40317" marT="40317" marB="40317">
+                    <a:lnL w="12700" cap="flat" cmpd="sng" algn="ctr">
+                      <a:solidFill>
+                        <a:srgbClr val="C7CCBE"/>
+                      </a:solidFill>
+                      <a:prstDash val="solid"/>
+                      <a:round/>
+                      <a:headEnd type="none" w="med" len="med"/>
+                      <a:tailEnd type="none" w="med" len="med"/>
+                    </a:lnL>
+                    <a:lnR w="12700" cap="flat" cmpd="sng" algn="ctr">
+                      <a:solidFill>
+                        <a:srgbClr val="C7CCBE"/>
+                      </a:solidFill>
+                      <a:prstDash val="solid"/>
+                      <a:round/>
+                      <a:headEnd type="none" w="med" len="med"/>
+                      <a:tailEnd type="none" w="med" len="med"/>
+                    </a:lnR>
+                    <a:lnT w="12700" cap="flat" cmpd="sng" algn="ctr">
+                      <a:solidFill>
+                        <a:srgbClr val="C7CCBE"/>
+                      </a:solidFill>
+                      <a:prstDash val="solid"/>
+                      <a:round/>
+                      <a:headEnd type="none" w="med" len="med"/>
+                      <a:tailEnd type="none" w="med" len="med"/>
+                    </a:lnT>
+                    <a:lnB w="12700" cap="flat" cmpd="sng" algn="ctr">
+                      <a:solidFill>
+                        <a:srgbClr val="C7CCBE"/>
+                      </a:solidFill>
+                      <a:prstDash val="solid"/>
+                      <a:round/>
+                      <a:headEnd type="none" w="med" len="med"/>
+                      <a:tailEnd type="none" w="med" len="med"/>
+                    </a:lnB>
+                    <a:solidFill>
+                      <a:srgbClr val="FFFFFF"/>
+                    </a:solidFill>
+                  </a:tcPr>
+                </a:tc>
+                <a:tc>
+                  <a:txBody>
+                    <a:bodyPr/>
+                    <a:lstStyle/>
+                    <a:p>
+                      <a:pPr marL="0" marR="0" algn="just">
+                        <a:lnSpc>
+                          <a:spcPct val="115000"/>
+                        </a:lnSpc>
+                        <a:spcBef>
+                          <a:spcPts val="0"/>
+                        </a:spcBef>
+                        <a:spcAft>
+                          <a:spcPts val="0"/>
+                        </a:spcAft>
+                      </a:pPr>
+                      <a:r>
+                        <a:rPr lang="en-US" sz="1000" u="none" dirty="0">
+                          <a:solidFill>
+                            <a:srgbClr val="333333"/>
+                          </a:solidFill>
+                          <a:latin typeface="Times New Roman" pitchFamily="18" charset="0"/>
+                          <a:ea typeface="Times New Roman"/>
+                          <a:cs typeface="Times New Roman" pitchFamily="18" charset="0"/>
+                        </a:rPr>
+                        <a:t>Java doesn't support multiple inheritance through class. It can be achieved by using </a:t>
+                      </a:r>
+                      <a:r>
+                        <a:rPr lang="en-US" sz="1000" u="none" strike="noStrike" dirty="0" smtClean="0">
+                          <a:solidFill>
+                            <a:srgbClr val="008000"/>
+                          </a:solidFill>
+                          <a:latin typeface="Times New Roman" pitchFamily="18" charset="0"/>
+                          <a:ea typeface="Times New Roman"/>
+                          <a:cs typeface="Times New Roman" pitchFamily="18" charset="0"/>
+                        </a:rPr>
+                        <a:t>interface</a:t>
+                      </a:r>
+                      <a:r>
+                        <a:rPr lang="en-US" sz="1000" u="none" strike="noStrike" baseline="0" dirty="0" smtClean="0">
+                          <a:solidFill>
+                            <a:srgbClr val="008000"/>
+                          </a:solidFill>
+                          <a:latin typeface="Times New Roman" pitchFamily="18" charset="0"/>
+                          <a:ea typeface="Times New Roman"/>
+                          <a:cs typeface="Times New Roman" pitchFamily="18" charset="0"/>
+                        </a:rPr>
+                        <a:t> in java</a:t>
+                      </a:r>
+                      <a:endParaRPr lang="en-US" sz="1000" u="none" dirty="0">
+                        <a:latin typeface="Times New Roman" pitchFamily="18" charset="0"/>
+                        <a:ea typeface="Calibri"/>
+                        <a:cs typeface="Times New Roman" pitchFamily="18" charset="0"/>
+                      </a:endParaRPr>
+                    </a:p>
+                  </a:txBody>
+                  <a:tcPr marL="40317" marR="40317" marT="40317" marB="40317">
+                    <a:lnL w="12700" cap="flat" cmpd="sng" algn="ctr">
+                      <a:solidFill>
+                        <a:srgbClr val="C7CCBE"/>
+                      </a:solidFill>
+                      <a:prstDash val="solid"/>
+                      <a:round/>
+                      <a:headEnd type="none" w="med" len="med"/>
+                      <a:tailEnd type="none" w="med" len="med"/>
+                    </a:lnL>
+                    <a:lnR w="12700" cap="flat" cmpd="sng" algn="ctr">
+                      <a:solidFill>
+                        <a:srgbClr val="C7CCBE"/>
+                      </a:solidFill>
+                      <a:prstDash val="solid"/>
+                      <a:round/>
+                      <a:headEnd type="none" w="med" len="med"/>
+                      <a:tailEnd type="none" w="med" len="med"/>
+                    </a:lnR>
+                    <a:lnT w="12700" cap="flat" cmpd="sng" algn="ctr">
+                      <a:solidFill>
+                        <a:srgbClr val="C7CCBE"/>
+                      </a:solidFill>
+                      <a:prstDash val="solid"/>
+                      <a:round/>
+                      <a:headEnd type="none" w="med" len="med"/>
+                      <a:tailEnd type="none" w="med" len="med"/>
+                    </a:lnT>
+                    <a:lnB w="12700" cap="flat" cmpd="sng" algn="ctr">
+                      <a:solidFill>
+                        <a:srgbClr val="C7CCBE"/>
+                      </a:solidFill>
+                      <a:prstDash val="solid"/>
+                      <a:round/>
+                      <a:headEnd type="none" w="med" len="med"/>
+                      <a:tailEnd type="none" w="med" len="med"/>
+                    </a:lnB>
+                    <a:solidFill>
+                      <a:srgbClr val="FFFFFF"/>
+                    </a:solidFill>
+                  </a:tcPr>
+                </a:tc>
+              </a:tr>
+              <a:tr h="303187">
+                <a:tc>
+                  <a:txBody>
+                    <a:bodyPr/>
+                    <a:lstStyle/>
+                    <a:p>
+                      <a:pPr marL="0" marR="0" algn="just">
+                        <a:lnSpc>
+                          <a:spcPct val="115000"/>
+                        </a:lnSpc>
+                        <a:spcBef>
+                          <a:spcPts val="0"/>
+                        </a:spcBef>
+                        <a:spcAft>
+                          <a:spcPts val="0"/>
+                        </a:spcAft>
+                      </a:pPr>
+                      <a:r>
+                        <a:rPr lang="en-US" sz="1000" b="1" u="none">
+                          <a:solidFill>
+                            <a:srgbClr val="333333"/>
+                          </a:solidFill>
+                          <a:latin typeface="Times New Roman" pitchFamily="18" charset="0"/>
+                          <a:ea typeface="Times New Roman"/>
+                          <a:cs typeface="Times New Roman" pitchFamily="18" charset="0"/>
+                        </a:rPr>
+                        <a:t>Operator Overloading</a:t>
+                      </a:r>
+                      <a:endParaRPr lang="en-US" sz="1000" u="none">
+                        <a:latin typeface="Times New Roman" pitchFamily="18" charset="0"/>
+                        <a:ea typeface="Calibri"/>
+                        <a:cs typeface="Times New Roman" pitchFamily="18" charset="0"/>
+                      </a:endParaRPr>
+                    </a:p>
+                  </a:txBody>
+                  <a:tcPr marL="40317" marR="40317" marT="40317" marB="40317">
+                    <a:lnL w="12700" cap="flat" cmpd="sng" algn="ctr">
+                      <a:solidFill>
+                        <a:srgbClr val="C7CCBE"/>
+                      </a:solidFill>
+                      <a:prstDash val="solid"/>
+                      <a:round/>
+                      <a:headEnd type="none" w="med" len="med"/>
+                      <a:tailEnd type="none" w="med" len="med"/>
+                    </a:lnL>
+                    <a:lnR w="12700" cap="flat" cmpd="sng" algn="ctr">
+                      <a:solidFill>
+                        <a:srgbClr val="C7CCBE"/>
+                      </a:solidFill>
+                      <a:prstDash val="solid"/>
+                      <a:round/>
+                      <a:headEnd type="none" w="med" len="med"/>
+                      <a:tailEnd type="none" w="med" len="med"/>
+                    </a:lnR>
+                    <a:lnT w="12700" cap="flat" cmpd="sng" algn="ctr">
+                      <a:solidFill>
+                        <a:srgbClr val="C7CCBE"/>
+                      </a:solidFill>
+                      <a:prstDash val="solid"/>
+                      <a:round/>
+                      <a:headEnd type="none" w="med" len="med"/>
+                      <a:tailEnd type="none" w="med" len="med"/>
+                    </a:lnT>
+                    <a:lnB w="12700" cap="flat" cmpd="sng" algn="ctr">
+                      <a:solidFill>
+                        <a:srgbClr val="C7CCBE"/>
+                      </a:solidFill>
+                      <a:prstDash val="solid"/>
+                      <a:round/>
+                      <a:headEnd type="none" w="med" len="med"/>
+                      <a:tailEnd type="none" w="med" len="med"/>
+                    </a:lnB>
+                    <a:solidFill>
+                      <a:srgbClr val="EFF1EB"/>
+                    </a:solidFill>
+                  </a:tcPr>
+                </a:tc>
+                <a:tc>
+                  <a:txBody>
+                    <a:bodyPr/>
+                    <a:lstStyle/>
+                    <a:p>
+                      <a:pPr marL="0" marR="0" algn="just">
+                        <a:lnSpc>
+                          <a:spcPct val="115000"/>
+                        </a:lnSpc>
+                        <a:spcBef>
+                          <a:spcPts val="0"/>
+                        </a:spcBef>
+                        <a:spcAft>
+                          <a:spcPts val="0"/>
+                        </a:spcAft>
+                      </a:pPr>
+                      <a:r>
+                        <a:rPr lang="en-US" sz="1000" u="none" dirty="0" smtClean="0">
+                          <a:solidFill>
+                            <a:srgbClr val="333333"/>
+                          </a:solidFill>
+                          <a:latin typeface="Times New Roman" pitchFamily="18" charset="0"/>
+                          <a:ea typeface="Times New Roman"/>
+                          <a:cs typeface="Times New Roman" pitchFamily="18" charset="0"/>
+                        </a:rPr>
+                        <a:t>supports</a:t>
+                      </a:r>
+                      <a:r>
+                        <a:rPr lang="en-US" sz="1000" u="none" dirty="0">
+                          <a:solidFill>
+                            <a:srgbClr val="333333"/>
+                          </a:solidFill>
+                          <a:latin typeface="Times New Roman" pitchFamily="18" charset="0"/>
+                          <a:ea typeface="Times New Roman"/>
+                          <a:cs typeface="Times New Roman" pitchFamily="18" charset="0"/>
+                        </a:rPr>
+                        <a:t> </a:t>
+                      </a:r>
+                      <a:r>
+                        <a:rPr lang="en-US" sz="1000" u="none" strike="noStrike" dirty="0" smtClean="0">
+                          <a:solidFill>
+                            <a:srgbClr val="008000"/>
+                          </a:solidFill>
+                          <a:latin typeface="Times New Roman" pitchFamily="18" charset="0"/>
+                          <a:ea typeface="Times New Roman"/>
+                          <a:cs typeface="Times New Roman" pitchFamily="18" charset="0"/>
+                        </a:rPr>
+                        <a:t>operator</a:t>
+                      </a:r>
+                      <a:r>
+                        <a:rPr lang="en-US" sz="1000" u="none" strike="noStrike" baseline="0" dirty="0" smtClean="0">
+                          <a:solidFill>
+                            <a:srgbClr val="008000"/>
+                          </a:solidFill>
+                          <a:latin typeface="Times New Roman" pitchFamily="18" charset="0"/>
+                          <a:ea typeface="Times New Roman"/>
+                          <a:cs typeface="Times New Roman" pitchFamily="18" charset="0"/>
+                        </a:rPr>
+                        <a:t> overloading</a:t>
+                      </a:r>
+                      <a:endParaRPr lang="en-US" sz="1000" u="none" dirty="0">
+                        <a:latin typeface="Times New Roman" pitchFamily="18" charset="0"/>
+                        <a:ea typeface="Calibri"/>
+                        <a:cs typeface="Times New Roman" pitchFamily="18" charset="0"/>
+                      </a:endParaRPr>
+                    </a:p>
+                  </a:txBody>
+                  <a:tcPr marL="40317" marR="40317" marT="40317" marB="40317">
+                    <a:lnL w="12700" cap="flat" cmpd="sng" algn="ctr">
+                      <a:solidFill>
+                        <a:srgbClr val="C7CCBE"/>
+                      </a:solidFill>
+                      <a:prstDash val="solid"/>
+                      <a:round/>
+                      <a:headEnd type="none" w="med" len="med"/>
+                      <a:tailEnd type="none" w="med" len="med"/>
+                    </a:lnL>
+                    <a:lnR w="12700" cap="flat" cmpd="sng" algn="ctr">
+                      <a:solidFill>
+                        <a:srgbClr val="C7CCBE"/>
+                      </a:solidFill>
+                      <a:prstDash val="solid"/>
+                      <a:round/>
+                      <a:headEnd type="none" w="med" len="med"/>
+                      <a:tailEnd type="none" w="med" len="med"/>
+                    </a:lnR>
+                    <a:lnT w="12700" cap="flat" cmpd="sng" algn="ctr">
+                      <a:solidFill>
+                        <a:srgbClr val="C7CCBE"/>
+                      </a:solidFill>
+                      <a:prstDash val="solid"/>
+                      <a:round/>
+                      <a:headEnd type="none" w="med" len="med"/>
+                      <a:tailEnd type="none" w="med" len="med"/>
+                    </a:lnT>
+                    <a:lnB w="12700" cap="flat" cmpd="sng" algn="ctr">
+                      <a:solidFill>
+                        <a:srgbClr val="C7CCBE"/>
+                      </a:solidFill>
+                      <a:prstDash val="solid"/>
+                      <a:round/>
+                      <a:headEnd type="none" w="med" len="med"/>
+                      <a:tailEnd type="none" w="med" len="med"/>
+                    </a:lnB>
+                    <a:solidFill>
+                      <a:srgbClr val="EFF1EB"/>
+                    </a:solidFill>
+                  </a:tcPr>
+                </a:tc>
+                <a:tc>
+                  <a:txBody>
+                    <a:bodyPr/>
+                    <a:lstStyle/>
+                    <a:p>
+                      <a:pPr marL="0" marR="0" algn="just">
+                        <a:lnSpc>
+                          <a:spcPct val="115000"/>
+                        </a:lnSpc>
+                        <a:spcBef>
+                          <a:spcPts val="0"/>
+                        </a:spcBef>
+                        <a:spcAft>
+                          <a:spcPts val="0"/>
+                        </a:spcAft>
+                      </a:pPr>
+                      <a:r>
+                        <a:rPr lang="en-US" sz="1000" u="none">
+                          <a:solidFill>
+                            <a:srgbClr val="333333"/>
+                          </a:solidFill>
+                          <a:latin typeface="Times New Roman" pitchFamily="18" charset="0"/>
+                          <a:ea typeface="Times New Roman"/>
+                          <a:cs typeface="Times New Roman" pitchFamily="18" charset="0"/>
+                        </a:rPr>
+                        <a:t>Java doesn't support operator overloading.</a:t>
+                      </a:r>
+                      <a:endParaRPr lang="en-US" sz="1000" u="none">
+                        <a:latin typeface="Times New Roman" pitchFamily="18" charset="0"/>
+                        <a:ea typeface="Calibri"/>
+                        <a:cs typeface="Times New Roman" pitchFamily="18" charset="0"/>
+                      </a:endParaRPr>
+                    </a:p>
+                  </a:txBody>
+                  <a:tcPr marL="40317" marR="40317" marT="40317" marB="40317">
+                    <a:lnL w="12700" cap="flat" cmpd="sng" algn="ctr">
+                      <a:solidFill>
+                        <a:srgbClr val="C7CCBE"/>
+                      </a:solidFill>
+                      <a:prstDash val="solid"/>
+                      <a:round/>
+                      <a:headEnd type="none" w="med" len="med"/>
+                      <a:tailEnd type="none" w="med" len="med"/>
+                    </a:lnL>
+                    <a:lnR w="12700" cap="flat" cmpd="sng" algn="ctr">
+                      <a:solidFill>
+                        <a:srgbClr val="C7CCBE"/>
+                      </a:solidFill>
+                      <a:prstDash val="solid"/>
+                      <a:round/>
+                      <a:headEnd type="none" w="med" len="med"/>
+                      <a:tailEnd type="none" w="med" len="med"/>
+                    </a:lnR>
+                    <a:lnT w="12700" cap="flat" cmpd="sng" algn="ctr">
+                      <a:solidFill>
+                        <a:srgbClr val="C7CCBE"/>
+                      </a:solidFill>
+                      <a:prstDash val="solid"/>
+                      <a:round/>
+                      <a:headEnd type="none" w="med" len="med"/>
+                      <a:tailEnd type="none" w="med" len="med"/>
+                    </a:lnT>
+                    <a:lnB w="12700" cap="flat" cmpd="sng" algn="ctr">
+                      <a:solidFill>
+                        <a:srgbClr val="C7CCBE"/>
+                      </a:solidFill>
+                      <a:prstDash val="solid"/>
+                      <a:round/>
+                      <a:headEnd type="none" w="med" len="med"/>
+                      <a:tailEnd type="none" w="med" len="med"/>
+                    </a:lnB>
+                    <a:solidFill>
+                      <a:srgbClr val="EFF1EB"/>
+                    </a:solidFill>
+                  </a:tcPr>
+                </a:tc>
+              </a:tr>
+              <a:tr h="414463">
+                <a:tc>
+                  <a:txBody>
+                    <a:bodyPr/>
+                    <a:lstStyle/>
+                    <a:p>
+                      <a:pPr marL="0" marR="0" algn="just">
+                        <a:lnSpc>
+                          <a:spcPct val="115000"/>
+                        </a:lnSpc>
+                        <a:spcBef>
+                          <a:spcPts val="0"/>
+                        </a:spcBef>
+                        <a:spcAft>
+                          <a:spcPts val="0"/>
+                        </a:spcAft>
+                      </a:pPr>
+                      <a:r>
+                        <a:rPr lang="en-US" sz="1000" b="1" u="none">
+                          <a:solidFill>
+                            <a:srgbClr val="333333"/>
+                          </a:solidFill>
+                          <a:latin typeface="Times New Roman" pitchFamily="18" charset="0"/>
+                          <a:ea typeface="Times New Roman"/>
+                          <a:cs typeface="Times New Roman" pitchFamily="18" charset="0"/>
+                        </a:rPr>
+                        <a:t>Pointers</a:t>
+                      </a:r>
+                      <a:endParaRPr lang="en-US" sz="1000" u="none">
+                        <a:latin typeface="Times New Roman" pitchFamily="18" charset="0"/>
+                        <a:ea typeface="Calibri"/>
+                        <a:cs typeface="Times New Roman" pitchFamily="18" charset="0"/>
+                      </a:endParaRPr>
+                    </a:p>
+                  </a:txBody>
+                  <a:tcPr marL="40317" marR="40317" marT="40317" marB="40317">
+                    <a:lnL w="12700" cap="flat" cmpd="sng" algn="ctr">
+                      <a:solidFill>
+                        <a:srgbClr val="C7CCBE"/>
+                      </a:solidFill>
+                      <a:prstDash val="solid"/>
+                      <a:round/>
+                      <a:headEnd type="none" w="med" len="med"/>
+                      <a:tailEnd type="none" w="med" len="med"/>
+                    </a:lnL>
+                    <a:lnR w="12700" cap="flat" cmpd="sng" algn="ctr">
+                      <a:solidFill>
+                        <a:srgbClr val="C7CCBE"/>
+                      </a:solidFill>
+                      <a:prstDash val="solid"/>
+                      <a:round/>
+                      <a:headEnd type="none" w="med" len="med"/>
+                      <a:tailEnd type="none" w="med" len="med"/>
+                    </a:lnR>
+                    <a:lnT w="12700" cap="flat" cmpd="sng" algn="ctr">
+                      <a:solidFill>
+                        <a:srgbClr val="C7CCBE"/>
+                      </a:solidFill>
+                      <a:prstDash val="solid"/>
+                      <a:round/>
+                      <a:headEnd type="none" w="med" len="med"/>
+                      <a:tailEnd type="none" w="med" len="med"/>
+                    </a:lnT>
+                    <a:lnB w="12700" cap="flat" cmpd="sng" algn="ctr">
+                      <a:solidFill>
+                        <a:srgbClr val="C7CCBE"/>
+                      </a:solidFill>
+                      <a:prstDash val="solid"/>
+                      <a:round/>
+                      <a:headEnd type="none" w="med" len="med"/>
+                      <a:tailEnd type="none" w="med" len="med"/>
+                    </a:lnB>
+                    <a:solidFill>
+                      <a:srgbClr val="FFFFFF"/>
+                    </a:solidFill>
+                  </a:tcPr>
+                </a:tc>
+                <a:tc>
+                  <a:txBody>
+                    <a:bodyPr/>
+                    <a:lstStyle/>
+                    <a:p>
+                      <a:pPr marL="0" marR="0" algn="just">
+                        <a:lnSpc>
+                          <a:spcPct val="115000"/>
+                        </a:lnSpc>
+                        <a:spcBef>
+                          <a:spcPts val="0"/>
+                        </a:spcBef>
+                        <a:spcAft>
+                          <a:spcPts val="0"/>
+                        </a:spcAft>
+                      </a:pPr>
+                      <a:r>
+                        <a:rPr lang="en-US" sz="1000" u="none" dirty="0" smtClean="0">
+                          <a:solidFill>
+                            <a:srgbClr val="333333"/>
+                          </a:solidFill>
+                          <a:latin typeface="Times New Roman" pitchFamily="18" charset="0"/>
+                          <a:ea typeface="Times New Roman"/>
+                          <a:cs typeface="Times New Roman" pitchFamily="18" charset="0"/>
+                        </a:rPr>
+                        <a:t>Supports</a:t>
+                      </a:r>
+                      <a:r>
+                        <a:rPr lang="en-US" sz="1000" u="none" dirty="0">
+                          <a:solidFill>
+                            <a:srgbClr val="333333"/>
+                          </a:solidFill>
+                          <a:latin typeface="Times New Roman" pitchFamily="18" charset="0"/>
+                          <a:ea typeface="Times New Roman"/>
+                          <a:cs typeface="Times New Roman" pitchFamily="18" charset="0"/>
+                        </a:rPr>
+                        <a:t> </a:t>
+                      </a:r>
+                      <a:r>
+                        <a:rPr lang="en-US" sz="1000" u="none" strike="noStrike" baseline="0" dirty="0" smtClean="0">
+                          <a:solidFill>
+                            <a:srgbClr val="008000"/>
+                          </a:solidFill>
+                          <a:latin typeface="Times New Roman" pitchFamily="18" charset="0"/>
+                          <a:ea typeface="Times New Roman"/>
+                          <a:cs typeface="Times New Roman" pitchFamily="18" charset="0"/>
+                        </a:rPr>
+                        <a:t> pointer</a:t>
+                      </a:r>
+                      <a:r>
+                        <a:rPr lang="en-US" sz="1000" u="none" dirty="0" smtClean="0">
+                          <a:solidFill>
+                            <a:srgbClr val="333333"/>
+                          </a:solidFill>
+                          <a:latin typeface="Times New Roman" pitchFamily="18" charset="0"/>
+                          <a:ea typeface="Times New Roman"/>
+                          <a:cs typeface="Times New Roman" pitchFamily="18" charset="0"/>
+                        </a:rPr>
+                        <a:t> </a:t>
+                      </a:r>
+                      <a:endParaRPr lang="en-US" sz="1000" u="none" dirty="0">
+                        <a:latin typeface="Times New Roman" pitchFamily="18" charset="0"/>
+                        <a:ea typeface="Calibri"/>
+                        <a:cs typeface="Times New Roman" pitchFamily="18" charset="0"/>
+                      </a:endParaRPr>
+                    </a:p>
+                  </a:txBody>
+                  <a:tcPr marL="40317" marR="40317" marT="40317" marB="40317">
+                    <a:lnL w="12700" cap="flat" cmpd="sng" algn="ctr">
+                      <a:solidFill>
+                        <a:srgbClr val="C7CCBE"/>
+                      </a:solidFill>
+                      <a:prstDash val="solid"/>
+                      <a:round/>
+                      <a:headEnd type="none" w="med" len="med"/>
+                      <a:tailEnd type="none" w="med" len="med"/>
+                    </a:lnL>
+                    <a:lnR w="12700" cap="flat" cmpd="sng" algn="ctr">
+                      <a:solidFill>
+                        <a:srgbClr val="C7CCBE"/>
+                      </a:solidFill>
+                      <a:prstDash val="solid"/>
+                      <a:round/>
+                      <a:headEnd type="none" w="med" len="med"/>
+                      <a:tailEnd type="none" w="med" len="med"/>
+                    </a:lnR>
+                    <a:lnT w="12700" cap="flat" cmpd="sng" algn="ctr">
+                      <a:solidFill>
+                        <a:srgbClr val="C7CCBE"/>
+                      </a:solidFill>
+                      <a:prstDash val="solid"/>
+                      <a:round/>
+                      <a:headEnd type="none" w="med" len="med"/>
+                      <a:tailEnd type="none" w="med" len="med"/>
+                    </a:lnT>
+                    <a:lnB w="12700" cap="flat" cmpd="sng" algn="ctr">
+                      <a:solidFill>
+                        <a:srgbClr val="C7CCBE"/>
+                      </a:solidFill>
+                      <a:prstDash val="solid"/>
+                      <a:round/>
+                      <a:headEnd type="none" w="med" len="med"/>
+                      <a:tailEnd type="none" w="med" len="med"/>
+                    </a:lnB>
+                    <a:solidFill>
+                      <a:srgbClr val="FFFFFF"/>
+                    </a:solidFill>
+                  </a:tcPr>
+                </a:tc>
+                <a:tc>
+                  <a:txBody>
+                    <a:bodyPr/>
+                    <a:lstStyle/>
+                    <a:p>
+                      <a:pPr marL="0" marR="0" algn="just">
+                        <a:lnSpc>
+                          <a:spcPct val="115000"/>
+                        </a:lnSpc>
+                        <a:spcBef>
+                          <a:spcPts val="0"/>
+                        </a:spcBef>
+                        <a:spcAft>
+                          <a:spcPts val="0"/>
+                        </a:spcAft>
+                      </a:pPr>
+                      <a:r>
+                        <a:rPr lang="en-US" sz="1000" u="none">
+                          <a:solidFill>
+                            <a:srgbClr val="333333"/>
+                          </a:solidFill>
+                          <a:latin typeface="Times New Roman" pitchFamily="18" charset="0"/>
+                          <a:ea typeface="Times New Roman"/>
+                          <a:cs typeface="Times New Roman" pitchFamily="18" charset="0"/>
+                        </a:rPr>
+                        <a:t>Java supports pointer internally. However, you can't write the pointer program in java. </a:t>
+                      </a:r>
+                      <a:endParaRPr lang="en-US" sz="1000" u="none">
+                        <a:latin typeface="Times New Roman" pitchFamily="18" charset="0"/>
+                        <a:ea typeface="Calibri"/>
+                        <a:cs typeface="Times New Roman" pitchFamily="18" charset="0"/>
+                      </a:endParaRPr>
+                    </a:p>
+                  </a:txBody>
+                  <a:tcPr marL="40317" marR="40317" marT="40317" marB="40317">
+                    <a:lnL w="12700" cap="flat" cmpd="sng" algn="ctr">
+                      <a:solidFill>
+                        <a:srgbClr val="C7CCBE"/>
+                      </a:solidFill>
+                      <a:prstDash val="solid"/>
+                      <a:round/>
+                      <a:headEnd type="none" w="med" len="med"/>
+                      <a:tailEnd type="none" w="med" len="med"/>
+                    </a:lnL>
+                    <a:lnR w="12700" cap="flat" cmpd="sng" algn="ctr">
+                      <a:solidFill>
+                        <a:srgbClr val="C7CCBE"/>
+                      </a:solidFill>
+                      <a:prstDash val="solid"/>
+                      <a:round/>
+                      <a:headEnd type="none" w="med" len="med"/>
+                      <a:tailEnd type="none" w="med" len="med"/>
+                    </a:lnR>
+                    <a:lnT w="12700" cap="flat" cmpd="sng" algn="ctr">
+                      <a:solidFill>
+                        <a:srgbClr val="C7CCBE"/>
+                      </a:solidFill>
+                      <a:prstDash val="solid"/>
+                      <a:round/>
+                      <a:headEnd type="none" w="med" len="med"/>
+                      <a:tailEnd type="none" w="med" len="med"/>
+                    </a:lnT>
+                    <a:lnB w="12700" cap="flat" cmpd="sng" algn="ctr">
+                      <a:solidFill>
+                        <a:srgbClr val="C7CCBE"/>
+                      </a:solidFill>
+                      <a:prstDash val="solid"/>
+                      <a:round/>
+                      <a:headEnd type="none" w="med" len="med"/>
+                      <a:tailEnd type="none" w="med" len="med"/>
+                    </a:lnB>
+                    <a:solidFill>
+                      <a:srgbClr val="FFFFFF"/>
+                    </a:solidFill>
+                  </a:tcPr>
+                </a:tc>
+              </a:tr>
+              <a:tr h="1082121">
+                <a:tc>
+                  <a:txBody>
+                    <a:bodyPr/>
+                    <a:lstStyle/>
+                    <a:p>
+                      <a:pPr marL="0" marR="0" algn="just">
+                        <a:lnSpc>
+                          <a:spcPct val="115000"/>
+                        </a:lnSpc>
+                        <a:spcBef>
+                          <a:spcPts val="0"/>
+                        </a:spcBef>
+                        <a:spcAft>
+                          <a:spcPts val="0"/>
+                        </a:spcAft>
+                      </a:pPr>
+                      <a:r>
+                        <a:rPr lang="en-US" sz="1000" b="1" u="none">
+                          <a:solidFill>
+                            <a:srgbClr val="333333"/>
+                          </a:solidFill>
+                          <a:latin typeface="Times New Roman" pitchFamily="18" charset="0"/>
+                          <a:ea typeface="Times New Roman"/>
+                          <a:cs typeface="Times New Roman" pitchFamily="18" charset="0"/>
+                        </a:rPr>
+                        <a:t>Compiler and Interpreter</a:t>
+                      </a:r>
+                      <a:endParaRPr lang="en-US" sz="1000" u="none">
+                        <a:latin typeface="Times New Roman" pitchFamily="18" charset="0"/>
+                        <a:ea typeface="Calibri"/>
+                        <a:cs typeface="Times New Roman" pitchFamily="18" charset="0"/>
+                      </a:endParaRPr>
+                    </a:p>
+                  </a:txBody>
+                  <a:tcPr marL="40317" marR="40317" marT="40317" marB="40317">
+                    <a:lnL w="12700" cap="flat" cmpd="sng" algn="ctr">
+                      <a:solidFill>
+                        <a:srgbClr val="C7CCBE"/>
+                      </a:solidFill>
+                      <a:prstDash val="solid"/>
+                      <a:round/>
+                      <a:headEnd type="none" w="med" len="med"/>
+                      <a:tailEnd type="none" w="med" len="med"/>
+                    </a:lnL>
+                    <a:lnR w="12700" cap="flat" cmpd="sng" algn="ctr">
+                      <a:solidFill>
+                        <a:srgbClr val="C7CCBE"/>
+                      </a:solidFill>
+                      <a:prstDash val="solid"/>
+                      <a:round/>
+                      <a:headEnd type="none" w="med" len="med"/>
+                      <a:tailEnd type="none" w="med" len="med"/>
+                    </a:lnR>
+                    <a:lnT w="12700" cap="flat" cmpd="sng" algn="ctr">
+                      <a:solidFill>
+                        <a:srgbClr val="C7CCBE"/>
+                      </a:solidFill>
+                      <a:prstDash val="solid"/>
+                      <a:round/>
+                      <a:headEnd type="none" w="med" len="med"/>
+                      <a:tailEnd type="none" w="med" len="med"/>
+                    </a:lnT>
+                    <a:lnB w="12700" cap="flat" cmpd="sng" algn="ctr">
+                      <a:solidFill>
+                        <a:srgbClr val="C7CCBE"/>
+                      </a:solidFill>
+                      <a:prstDash val="solid"/>
+                      <a:round/>
+                      <a:headEnd type="none" w="med" len="med"/>
+                      <a:tailEnd type="none" w="med" len="med"/>
+                    </a:lnB>
+                    <a:solidFill>
+                      <a:srgbClr val="EFF1EB"/>
+                    </a:solidFill>
+                  </a:tcPr>
+                </a:tc>
+                <a:tc>
+                  <a:txBody>
+                    <a:bodyPr/>
+                    <a:lstStyle/>
+                    <a:p>
+                      <a:pPr marL="0" marR="0" algn="just">
+                        <a:lnSpc>
+                          <a:spcPct val="115000"/>
+                        </a:lnSpc>
+                        <a:spcBef>
+                          <a:spcPts val="0"/>
+                        </a:spcBef>
+                        <a:spcAft>
+                          <a:spcPts val="0"/>
+                        </a:spcAft>
+                      </a:pPr>
+                      <a:r>
+                        <a:rPr lang="en-US" sz="1000" u="none">
+                          <a:solidFill>
+                            <a:srgbClr val="333333"/>
+                          </a:solidFill>
+                          <a:latin typeface="Times New Roman" pitchFamily="18" charset="0"/>
+                          <a:ea typeface="Times New Roman"/>
+                          <a:cs typeface="Times New Roman" pitchFamily="18" charset="0"/>
+                        </a:rPr>
+                        <a:t>C++ uses compiler only. C++ is compiled and run using the compiler which converts source code into machine code so, C++ is platform dependent.</a:t>
+                      </a:r>
+                      <a:endParaRPr lang="en-US" sz="1000" u="none">
+                        <a:latin typeface="Times New Roman" pitchFamily="18" charset="0"/>
+                        <a:ea typeface="Calibri"/>
+                        <a:cs typeface="Times New Roman" pitchFamily="18" charset="0"/>
+                      </a:endParaRPr>
+                    </a:p>
+                  </a:txBody>
+                  <a:tcPr marL="40317" marR="40317" marT="40317" marB="40317">
+                    <a:lnL w="12700" cap="flat" cmpd="sng" algn="ctr">
+                      <a:solidFill>
+                        <a:srgbClr val="C7CCBE"/>
+                      </a:solidFill>
+                      <a:prstDash val="solid"/>
+                      <a:round/>
+                      <a:headEnd type="none" w="med" len="med"/>
+                      <a:tailEnd type="none" w="med" len="med"/>
+                    </a:lnL>
+                    <a:lnR w="12700" cap="flat" cmpd="sng" algn="ctr">
+                      <a:solidFill>
+                        <a:srgbClr val="C7CCBE"/>
+                      </a:solidFill>
+                      <a:prstDash val="solid"/>
+                      <a:round/>
+                      <a:headEnd type="none" w="med" len="med"/>
+                      <a:tailEnd type="none" w="med" len="med"/>
+                    </a:lnR>
+                    <a:lnT w="12700" cap="flat" cmpd="sng" algn="ctr">
+                      <a:solidFill>
+                        <a:srgbClr val="C7CCBE"/>
+                      </a:solidFill>
+                      <a:prstDash val="solid"/>
+                      <a:round/>
+                      <a:headEnd type="none" w="med" len="med"/>
+                      <a:tailEnd type="none" w="med" len="med"/>
+                    </a:lnT>
+                    <a:lnB w="12700" cap="flat" cmpd="sng" algn="ctr">
+                      <a:solidFill>
+                        <a:srgbClr val="C7CCBE"/>
+                      </a:solidFill>
+                      <a:prstDash val="solid"/>
+                      <a:round/>
+                      <a:headEnd type="none" w="med" len="med"/>
+                      <a:tailEnd type="none" w="med" len="med"/>
+                    </a:lnB>
+                    <a:solidFill>
+                      <a:srgbClr val="EFF1EB"/>
+                    </a:solidFill>
+                  </a:tcPr>
+                </a:tc>
+                <a:tc>
+                  <a:txBody>
+                    <a:bodyPr/>
+                    <a:lstStyle/>
+                    <a:p>
+                      <a:pPr marL="0" marR="0" algn="just">
+                        <a:lnSpc>
+                          <a:spcPct val="115000"/>
+                        </a:lnSpc>
+                        <a:spcBef>
+                          <a:spcPts val="0"/>
+                        </a:spcBef>
+                        <a:spcAft>
+                          <a:spcPts val="0"/>
+                        </a:spcAft>
+                      </a:pPr>
+                      <a:r>
+                        <a:rPr lang="en-US" sz="1000" u="none">
+                          <a:solidFill>
+                            <a:srgbClr val="333333"/>
+                          </a:solidFill>
+                          <a:latin typeface="Times New Roman" pitchFamily="18" charset="0"/>
+                          <a:ea typeface="Times New Roman"/>
+                          <a:cs typeface="Times New Roman" pitchFamily="18" charset="0"/>
+                        </a:rPr>
+                        <a:t>Java uses both compiler and interpreter. Java source code is converted into bytecode at compilation time. The interpreter executes this bytecode at runtime and produces output. Java is interpreted that is why it is platform-independent.</a:t>
+                      </a:r>
+                      <a:endParaRPr lang="en-US" sz="1000" u="none">
+                        <a:latin typeface="Times New Roman" pitchFamily="18" charset="0"/>
+                        <a:ea typeface="Calibri"/>
+                        <a:cs typeface="Times New Roman" pitchFamily="18" charset="0"/>
+                      </a:endParaRPr>
+                    </a:p>
+                  </a:txBody>
+                  <a:tcPr marL="40317" marR="40317" marT="40317" marB="40317">
+                    <a:lnL w="12700" cap="flat" cmpd="sng" algn="ctr">
+                      <a:solidFill>
+                        <a:srgbClr val="C7CCBE"/>
+                      </a:solidFill>
+                      <a:prstDash val="solid"/>
+                      <a:round/>
+                      <a:headEnd type="none" w="med" len="med"/>
+                      <a:tailEnd type="none" w="med" len="med"/>
+                    </a:lnL>
+                    <a:lnR w="12700" cap="flat" cmpd="sng" algn="ctr">
+                      <a:solidFill>
+                        <a:srgbClr val="C7CCBE"/>
+                      </a:solidFill>
+                      <a:prstDash val="solid"/>
+                      <a:round/>
+                      <a:headEnd type="none" w="med" len="med"/>
+                      <a:tailEnd type="none" w="med" len="med"/>
+                    </a:lnR>
+                    <a:lnT w="12700" cap="flat" cmpd="sng" algn="ctr">
+                      <a:solidFill>
+                        <a:srgbClr val="C7CCBE"/>
+                      </a:solidFill>
+                      <a:prstDash val="solid"/>
+                      <a:round/>
+                      <a:headEnd type="none" w="med" len="med"/>
+                      <a:tailEnd type="none" w="med" len="med"/>
+                    </a:lnT>
+                    <a:lnB w="12700" cap="flat" cmpd="sng" algn="ctr">
+                      <a:solidFill>
+                        <a:srgbClr val="C7CCBE"/>
+                      </a:solidFill>
+                      <a:prstDash val="solid"/>
+                      <a:round/>
+                      <a:headEnd type="none" w="med" len="med"/>
+                      <a:tailEnd type="none" w="med" len="med"/>
+                    </a:lnB>
+                    <a:solidFill>
+                      <a:srgbClr val="EFF1EB"/>
+                    </a:solidFill>
+                  </a:tcPr>
+                </a:tc>
+              </a:tr>
+              <a:tr h="414463">
+                <a:tc>
+                  <a:txBody>
+                    <a:bodyPr/>
+                    <a:lstStyle/>
+                    <a:p>
+                      <a:pPr marL="0" marR="0" algn="just">
+                        <a:lnSpc>
+                          <a:spcPct val="115000"/>
+                        </a:lnSpc>
+                        <a:spcBef>
+                          <a:spcPts val="0"/>
+                        </a:spcBef>
+                        <a:spcAft>
+                          <a:spcPts val="0"/>
+                        </a:spcAft>
+                      </a:pPr>
+                      <a:r>
+                        <a:rPr lang="en-US" sz="1000" b="1" u="none">
+                          <a:solidFill>
+                            <a:srgbClr val="333333"/>
+                          </a:solidFill>
+                          <a:latin typeface="Times New Roman" pitchFamily="18" charset="0"/>
+                          <a:ea typeface="Times New Roman"/>
+                          <a:cs typeface="Times New Roman" pitchFamily="18" charset="0"/>
+                        </a:rPr>
+                        <a:t>Call by Value and Call by reference</a:t>
+                      </a:r>
+                      <a:endParaRPr lang="en-US" sz="1000" u="none">
+                        <a:latin typeface="Times New Roman" pitchFamily="18" charset="0"/>
+                        <a:ea typeface="Calibri"/>
+                        <a:cs typeface="Times New Roman" pitchFamily="18" charset="0"/>
+                      </a:endParaRPr>
+                    </a:p>
+                  </a:txBody>
+                  <a:tcPr marL="40317" marR="40317" marT="40317" marB="40317">
+                    <a:lnL w="12700" cap="flat" cmpd="sng" algn="ctr">
+                      <a:solidFill>
+                        <a:srgbClr val="C7CCBE"/>
+                      </a:solidFill>
+                      <a:prstDash val="solid"/>
+                      <a:round/>
+                      <a:headEnd type="none" w="med" len="med"/>
+                      <a:tailEnd type="none" w="med" len="med"/>
+                    </a:lnL>
+                    <a:lnR w="12700" cap="flat" cmpd="sng" algn="ctr">
+                      <a:solidFill>
+                        <a:srgbClr val="C7CCBE"/>
+                      </a:solidFill>
+                      <a:prstDash val="solid"/>
+                      <a:round/>
+                      <a:headEnd type="none" w="med" len="med"/>
+                      <a:tailEnd type="none" w="med" len="med"/>
+                    </a:lnR>
+                    <a:lnT w="12700" cap="flat" cmpd="sng" algn="ctr">
+                      <a:solidFill>
+                        <a:srgbClr val="C7CCBE"/>
+                      </a:solidFill>
+                      <a:prstDash val="solid"/>
+                      <a:round/>
+                      <a:headEnd type="none" w="med" len="med"/>
+                      <a:tailEnd type="none" w="med" len="med"/>
+                    </a:lnT>
+                    <a:lnB w="12700" cap="flat" cmpd="sng" algn="ctr">
+                      <a:solidFill>
+                        <a:srgbClr val="C7CCBE"/>
+                      </a:solidFill>
+                      <a:prstDash val="solid"/>
+                      <a:round/>
+                      <a:headEnd type="none" w="med" len="med"/>
+                      <a:tailEnd type="none" w="med" len="med"/>
+                    </a:lnB>
+                    <a:solidFill>
+                      <a:srgbClr val="FFFFFF"/>
+                    </a:solidFill>
+                  </a:tcPr>
+                </a:tc>
+                <a:tc>
+                  <a:txBody>
+                    <a:bodyPr/>
+                    <a:lstStyle/>
+                    <a:p>
+                      <a:pPr marL="0" marR="0" algn="just">
+                        <a:lnSpc>
+                          <a:spcPct val="115000"/>
+                        </a:lnSpc>
+                        <a:spcBef>
+                          <a:spcPts val="0"/>
+                        </a:spcBef>
+                        <a:spcAft>
+                          <a:spcPts val="0"/>
+                        </a:spcAft>
+                      </a:pPr>
+                      <a:r>
+                        <a:rPr lang="en-US" sz="1000" u="none">
+                          <a:solidFill>
+                            <a:srgbClr val="333333"/>
+                          </a:solidFill>
+                          <a:latin typeface="Times New Roman" pitchFamily="18" charset="0"/>
+                          <a:ea typeface="Times New Roman"/>
+                          <a:cs typeface="Times New Roman" pitchFamily="18" charset="0"/>
+                        </a:rPr>
+                        <a:t>C++ supports both call by value and call by reference.</a:t>
+                      </a:r>
+                      <a:endParaRPr lang="en-US" sz="1000" u="none">
+                        <a:latin typeface="Times New Roman" pitchFamily="18" charset="0"/>
+                        <a:ea typeface="Calibri"/>
+                        <a:cs typeface="Times New Roman" pitchFamily="18" charset="0"/>
+                      </a:endParaRPr>
+                    </a:p>
+                  </a:txBody>
+                  <a:tcPr marL="40317" marR="40317" marT="40317" marB="40317">
+                    <a:lnL w="12700" cap="flat" cmpd="sng" algn="ctr">
+                      <a:solidFill>
+                        <a:srgbClr val="C7CCBE"/>
+                      </a:solidFill>
+                      <a:prstDash val="solid"/>
+                      <a:round/>
+                      <a:headEnd type="none" w="med" len="med"/>
+                      <a:tailEnd type="none" w="med" len="med"/>
+                    </a:lnL>
+                    <a:lnR w="12700" cap="flat" cmpd="sng" algn="ctr">
+                      <a:solidFill>
+                        <a:srgbClr val="C7CCBE"/>
+                      </a:solidFill>
+                      <a:prstDash val="solid"/>
+                      <a:round/>
+                      <a:headEnd type="none" w="med" len="med"/>
+                      <a:tailEnd type="none" w="med" len="med"/>
+                    </a:lnR>
+                    <a:lnT w="12700" cap="flat" cmpd="sng" algn="ctr">
+                      <a:solidFill>
+                        <a:srgbClr val="C7CCBE"/>
+                      </a:solidFill>
+                      <a:prstDash val="solid"/>
+                      <a:round/>
+                      <a:headEnd type="none" w="med" len="med"/>
+                      <a:tailEnd type="none" w="med" len="med"/>
+                    </a:lnT>
+                    <a:lnB w="12700" cap="flat" cmpd="sng" algn="ctr">
+                      <a:solidFill>
+                        <a:srgbClr val="C7CCBE"/>
+                      </a:solidFill>
+                      <a:prstDash val="solid"/>
+                      <a:round/>
+                      <a:headEnd type="none" w="med" len="med"/>
+                      <a:tailEnd type="none" w="med" len="med"/>
+                    </a:lnB>
+                    <a:solidFill>
+                      <a:srgbClr val="FFFFFF"/>
+                    </a:solidFill>
+                  </a:tcPr>
+                </a:tc>
+                <a:tc>
+                  <a:txBody>
+                    <a:bodyPr/>
+                    <a:lstStyle/>
+                    <a:p>
+                      <a:pPr marL="0" marR="0" algn="just">
+                        <a:lnSpc>
+                          <a:spcPct val="115000"/>
+                        </a:lnSpc>
+                        <a:spcBef>
+                          <a:spcPts val="0"/>
+                        </a:spcBef>
+                        <a:spcAft>
+                          <a:spcPts val="0"/>
+                        </a:spcAft>
+                      </a:pPr>
+                      <a:r>
+                        <a:rPr lang="en-US" sz="1000" u="none">
+                          <a:solidFill>
+                            <a:srgbClr val="333333"/>
+                          </a:solidFill>
+                          <a:latin typeface="Times New Roman" pitchFamily="18" charset="0"/>
+                          <a:ea typeface="Times New Roman"/>
+                          <a:cs typeface="Times New Roman" pitchFamily="18" charset="0"/>
+                        </a:rPr>
+                        <a:t>Java supports call by value only. There is no call by reference in java.</a:t>
+                      </a:r>
+                      <a:endParaRPr lang="en-US" sz="1000" u="none">
+                        <a:latin typeface="Times New Roman" pitchFamily="18" charset="0"/>
+                        <a:ea typeface="Calibri"/>
+                        <a:cs typeface="Times New Roman" pitchFamily="18" charset="0"/>
+                      </a:endParaRPr>
+                    </a:p>
+                  </a:txBody>
+                  <a:tcPr marL="40317" marR="40317" marT="40317" marB="40317">
+                    <a:lnL w="12700" cap="flat" cmpd="sng" algn="ctr">
+                      <a:solidFill>
+                        <a:srgbClr val="C7CCBE"/>
+                      </a:solidFill>
+                      <a:prstDash val="solid"/>
+                      <a:round/>
+                      <a:headEnd type="none" w="med" len="med"/>
+                      <a:tailEnd type="none" w="med" len="med"/>
+                    </a:lnL>
+                    <a:lnR w="12700" cap="flat" cmpd="sng" algn="ctr">
+                      <a:solidFill>
+                        <a:srgbClr val="C7CCBE"/>
+                      </a:solidFill>
+                      <a:prstDash val="solid"/>
+                      <a:round/>
+                      <a:headEnd type="none" w="med" len="med"/>
+                      <a:tailEnd type="none" w="med" len="med"/>
+                    </a:lnR>
+                    <a:lnT w="12700" cap="flat" cmpd="sng" algn="ctr">
+                      <a:solidFill>
+                        <a:srgbClr val="C7CCBE"/>
+                      </a:solidFill>
+                      <a:prstDash val="solid"/>
+                      <a:round/>
+                      <a:headEnd type="none" w="med" len="med"/>
+                      <a:tailEnd type="none" w="med" len="med"/>
+                    </a:lnT>
+                    <a:lnB w="12700" cap="flat" cmpd="sng" algn="ctr">
+                      <a:solidFill>
+                        <a:srgbClr val="C7CCBE"/>
+                      </a:solidFill>
+                      <a:prstDash val="solid"/>
+                      <a:round/>
+                      <a:headEnd type="none" w="med" len="med"/>
+                      <a:tailEnd type="none" w="med" len="med"/>
+                    </a:lnB>
+                    <a:solidFill>
+                      <a:srgbClr val="FFFFFF"/>
+                    </a:solidFill>
+                  </a:tcPr>
+                </a:tc>
+              </a:tr>
+              <a:tr h="303187">
+                <a:tc>
+                  <a:txBody>
+                    <a:bodyPr/>
+                    <a:lstStyle/>
+                    <a:p>
+                      <a:pPr marL="0" marR="0" algn="just">
+                        <a:lnSpc>
+                          <a:spcPct val="115000"/>
+                        </a:lnSpc>
+                        <a:spcBef>
+                          <a:spcPts val="0"/>
+                        </a:spcBef>
+                        <a:spcAft>
+                          <a:spcPts val="0"/>
+                        </a:spcAft>
+                      </a:pPr>
+                      <a:r>
+                        <a:rPr lang="en-US" sz="1000" b="1" u="none">
+                          <a:solidFill>
+                            <a:srgbClr val="333333"/>
+                          </a:solidFill>
+                          <a:latin typeface="Times New Roman" pitchFamily="18" charset="0"/>
+                          <a:ea typeface="Times New Roman"/>
+                          <a:cs typeface="Times New Roman" pitchFamily="18" charset="0"/>
+                        </a:rPr>
+                        <a:t>Structure and Union</a:t>
+                      </a:r>
+                      <a:endParaRPr lang="en-US" sz="1000" u="none">
+                        <a:latin typeface="Times New Roman" pitchFamily="18" charset="0"/>
+                        <a:ea typeface="Calibri"/>
+                        <a:cs typeface="Times New Roman" pitchFamily="18" charset="0"/>
+                      </a:endParaRPr>
+                    </a:p>
+                  </a:txBody>
+                  <a:tcPr marL="40317" marR="40317" marT="40317" marB="40317">
+                    <a:lnL w="12700" cap="flat" cmpd="sng" algn="ctr">
+                      <a:solidFill>
+                        <a:srgbClr val="C7CCBE"/>
+                      </a:solidFill>
+                      <a:prstDash val="solid"/>
+                      <a:round/>
+                      <a:headEnd type="none" w="med" len="med"/>
+                      <a:tailEnd type="none" w="med" len="med"/>
+                    </a:lnL>
+                    <a:lnR w="12700" cap="flat" cmpd="sng" algn="ctr">
+                      <a:solidFill>
+                        <a:srgbClr val="C7CCBE"/>
+                      </a:solidFill>
+                      <a:prstDash val="solid"/>
+                      <a:round/>
+                      <a:headEnd type="none" w="med" len="med"/>
+                      <a:tailEnd type="none" w="med" len="med"/>
+                    </a:lnR>
+                    <a:lnT w="12700" cap="flat" cmpd="sng" algn="ctr">
+                      <a:solidFill>
+                        <a:srgbClr val="C7CCBE"/>
+                      </a:solidFill>
+                      <a:prstDash val="solid"/>
+                      <a:round/>
+                      <a:headEnd type="none" w="med" len="med"/>
+                      <a:tailEnd type="none" w="med" len="med"/>
+                    </a:lnT>
+                    <a:lnB w="12700" cap="flat" cmpd="sng" algn="ctr">
+                      <a:solidFill>
+                        <a:srgbClr val="C7CCBE"/>
+                      </a:solidFill>
+                      <a:prstDash val="solid"/>
+                      <a:round/>
+                      <a:headEnd type="none" w="med" len="med"/>
+                      <a:tailEnd type="none" w="med" len="med"/>
+                    </a:lnB>
+                    <a:solidFill>
+                      <a:srgbClr val="EFF1EB"/>
+                    </a:solidFill>
+                  </a:tcPr>
+                </a:tc>
+                <a:tc>
+                  <a:txBody>
+                    <a:bodyPr/>
+                    <a:lstStyle/>
+                    <a:p>
+                      <a:pPr marL="0" marR="0" algn="just">
+                        <a:lnSpc>
+                          <a:spcPct val="115000"/>
+                        </a:lnSpc>
+                        <a:spcBef>
+                          <a:spcPts val="0"/>
+                        </a:spcBef>
+                        <a:spcAft>
+                          <a:spcPts val="0"/>
+                        </a:spcAft>
+                      </a:pPr>
+                      <a:r>
+                        <a:rPr lang="en-US" sz="1000" u="none">
+                          <a:solidFill>
+                            <a:srgbClr val="333333"/>
+                          </a:solidFill>
+                          <a:latin typeface="Times New Roman" pitchFamily="18" charset="0"/>
+                          <a:ea typeface="Times New Roman"/>
+                          <a:cs typeface="Times New Roman" pitchFamily="18" charset="0"/>
+                        </a:rPr>
+                        <a:t>C++ supports structures and unions.</a:t>
+                      </a:r>
+                      <a:endParaRPr lang="en-US" sz="1000" u="none">
+                        <a:latin typeface="Times New Roman" pitchFamily="18" charset="0"/>
+                        <a:ea typeface="Calibri"/>
+                        <a:cs typeface="Times New Roman" pitchFamily="18" charset="0"/>
+                      </a:endParaRPr>
+                    </a:p>
+                  </a:txBody>
+                  <a:tcPr marL="40317" marR="40317" marT="40317" marB="40317">
+                    <a:lnL w="12700" cap="flat" cmpd="sng" algn="ctr">
+                      <a:solidFill>
+                        <a:srgbClr val="C7CCBE"/>
+                      </a:solidFill>
+                      <a:prstDash val="solid"/>
+                      <a:round/>
+                      <a:headEnd type="none" w="med" len="med"/>
+                      <a:tailEnd type="none" w="med" len="med"/>
+                    </a:lnL>
+                    <a:lnR w="12700" cap="flat" cmpd="sng" algn="ctr">
+                      <a:solidFill>
+                        <a:srgbClr val="C7CCBE"/>
+                      </a:solidFill>
+                      <a:prstDash val="solid"/>
+                      <a:round/>
+                      <a:headEnd type="none" w="med" len="med"/>
+                      <a:tailEnd type="none" w="med" len="med"/>
+                    </a:lnR>
+                    <a:lnT w="12700" cap="flat" cmpd="sng" algn="ctr">
+                      <a:solidFill>
+                        <a:srgbClr val="C7CCBE"/>
+                      </a:solidFill>
+                      <a:prstDash val="solid"/>
+                      <a:round/>
+                      <a:headEnd type="none" w="med" len="med"/>
+                      <a:tailEnd type="none" w="med" len="med"/>
+                    </a:lnT>
+                    <a:lnB w="12700" cap="flat" cmpd="sng" algn="ctr">
+                      <a:solidFill>
+                        <a:srgbClr val="C7CCBE"/>
+                      </a:solidFill>
+                      <a:prstDash val="solid"/>
+                      <a:round/>
+                      <a:headEnd type="none" w="med" len="med"/>
+                      <a:tailEnd type="none" w="med" len="med"/>
+                    </a:lnB>
+                    <a:solidFill>
+                      <a:srgbClr val="EFF1EB"/>
+                    </a:solidFill>
+                  </a:tcPr>
+                </a:tc>
+                <a:tc>
+                  <a:txBody>
+                    <a:bodyPr/>
+                    <a:lstStyle/>
+                    <a:p>
+                      <a:pPr marL="0" marR="0" algn="just">
+                        <a:lnSpc>
+                          <a:spcPct val="115000"/>
+                        </a:lnSpc>
+                        <a:spcBef>
+                          <a:spcPts val="0"/>
+                        </a:spcBef>
+                        <a:spcAft>
+                          <a:spcPts val="0"/>
+                        </a:spcAft>
+                      </a:pPr>
+                      <a:r>
+                        <a:rPr lang="en-US" sz="1000" u="none">
+                          <a:solidFill>
+                            <a:srgbClr val="333333"/>
+                          </a:solidFill>
+                          <a:latin typeface="Times New Roman" pitchFamily="18" charset="0"/>
+                          <a:ea typeface="Times New Roman"/>
+                          <a:cs typeface="Times New Roman" pitchFamily="18" charset="0"/>
+                        </a:rPr>
+                        <a:t>Java doesn't support structures and unions.</a:t>
+                      </a:r>
+                      <a:endParaRPr lang="en-US" sz="1000" u="none">
+                        <a:latin typeface="Times New Roman" pitchFamily="18" charset="0"/>
+                        <a:ea typeface="Calibri"/>
+                        <a:cs typeface="Times New Roman" pitchFamily="18" charset="0"/>
+                      </a:endParaRPr>
+                    </a:p>
+                  </a:txBody>
+                  <a:tcPr marL="40317" marR="40317" marT="40317" marB="40317">
+                    <a:lnL w="12700" cap="flat" cmpd="sng" algn="ctr">
+                      <a:solidFill>
+                        <a:srgbClr val="C7CCBE"/>
+                      </a:solidFill>
+                      <a:prstDash val="solid"/>
+                      <a:round/>
+                      <a:headEnd type="none" w="med" len="med"/>
+                      <a:tailEnd type="none" w="med" len="med"/>
+                    </a:lnL>
+                    <a:lnR w="12700" cap="flat" cmpd="sng" algn="ctr">
+                      <a:solidFill>
+                        <a:srgbClr val="C7CCBE"/>
+                      </a:solidFill>
+                      <a:prstDash val="solid"/>
+                      <a:round/>
+                      <a:headEnd type="none" w="med" len="med"/>
+                      <a:tailEnd type="none" w="med" len="med"/>
+                    </a:lnR>
+                    <a:lnT w="12700" cap="flat" cmpd="sng" algn="ctr">
+                      <a:solidFill>
+                        <a:srgbClr val="C7CCBE"/>
+                      </a:solidFill>
+                      <a:prstDash val="solid"/>
+                      <a:round/>
+                      <a:headEnd type="none" w="med" len="med"/>
+                      <a:tailEnd type="none" w="med" len="med"/>
+                    </a:lnT>
+                    <a:lnB w="12700" cap="flat" cmpd="sng" algn="ctr">
+                      <a:solidFill>
+                        <a:srgbClr val="C7CCBE"/>
+                      </a:solidFill>
+                      <a:prstDash val="solid"/>
+                      <a:round/>
+                      <a:headEnd type="none" w="med" len="med"/>
+                      <a:tailEnd type="none" w="med" len="med"/>
+                    </a:lnB>
+                    <a:solidFill>
+                      <a:srgbClr val="EFF1EB"/>
+                    </a:solidFill>
+                  </a:tcPr>
+                </a:tc>
+              </a:tr>
+              <a:tr h="525740">
+                <a:tc>
+                  <a:txBody>
+                    <a:bodyPr/>
+                    <a:lstStyle/>
+                    <a:p>
+                      <a:pPr marL="0" marR="0" algn="just">
+                        <a:lnSpc>
+                          <a:spcPct val="115000"/>
+                        </a:lnSpc>
+                        <a:spcBef>
+                          <a:spcPts val="0"/>
+                        </a:spcBef>
+                        <a:spcAft>
+                          <a:spcPts val="0"/>
+                        </a:spcAft>
+                      </a:pPr>
+                      <a:r>
+                        <a:rPr lang="en-US" sz="1000" b="1" u="none">
+                          <a:solidFill>
+                            <a:srgbClr val="333333"/>
+                          </a:solidFill>
+                          <a:latin typeface="Times New Roman" pitchFamily="18" charset="0"/>
+                          <a:ea typeface="Times New Roman"/>
+                          <a:cs typeface="Times New Roman" pitchFamily="18" charset="0"/>
+                        </a:rPr>
+                        <a:t>Thread Support</a:t>
+                      </a:r>
+                      <a:endParaRPr lang="en-US" sz="1000" u="none">
+                        <a:latin typeface="Times New Roman" pitchFamily="18" charset="0"/>
+                        <a:ea typeface="Calibri"/>
+                        <a:cs typeface="Times New Roman" pitchFamily="18" charset="0"/>
+                      </a:endParaRPr>
+                    </a:p>
+                  </a:txBody>
+                  <a:tcPr marL="40317" marR="40317" marT="40317" marB="40317">
+                    <a:lnL w="12700" cap="flat" cmpd="sng" algn="ctr">
+                      <a:solidFill>
+                        <a:srgbClr val="C7CCBE"/>
+                      </a:solidFill>
+                      <a:prstDash val="solid"/>
+                      <a:round/>
+                      <a:headEnd type="none" w="med" len="med"/>
+                      <a:tailEnd type="none" w="med" len="med"/>
+                    </a:lnL>
+                    <a:lnR w="12700" cap="flat" cmpd="sng" algn="ctr">
+                      <a:solidFill>
+                        <a:srgbClr val="C7CCBE"/>
+                      </a:solidFill>
+                      <a:prstDash val="solid"/>
+                      <a:round/>
+                      <a:headEnd type="none" w="med" len="med"/>
+                      <a:tailEnd type="none" w="med" len="med"/>
+                    </a:lnR>
+                    <a:lnT w="12700" cap="flat" cmpd="sng" algn="ctr">
+                      <a:solidFill>
+                        <a:srgbClr val="C7CCBE"/>
+                      </a:solidFill>
+                      <a:prstDash val="solid"/>
+                      <a:round/>
+                      <a:headEnd type="none" w="med" len="med"/>
+                      <a:tailEnd type="none" w="med" len="med"/>
+                    </a:lnT>
+                    <a:lnB w="12700" cap="flat" cmpd="sng" algn="ctr">
+                      <a:solidFill>
+                        <a:srgbClr val="C7CCBE"/>
+                      </a:solidFill>
+                      <a:prstDash val="solid"/>
+                      <a:round/>
+                      <a:headEnd type="none" w="med" len="med"/>
+                      <a:tailEnd type="none" w="med" len="med"/>
+                    </a:lnB>
+                    <a:solidFill>
+                      <a:srgbClr val="FFFFFF"/>
+                    </a:solidFill>
+                  </a:tcPr>
+                </a:tc>
+                <a:tc>
+                  <a:txBody>
+                    <a:bodyPr/>
+                    <a:lstStyle/>
+                    <a:p>
+                      <a:pPr marL="0" marR="0" algn="just">
+                        <a:lnSpc>
+                          <a:spcPct val="115000"/>
+                        </a:lnSpc>
+                        <a:spcBef>
+                          <a:spcPts val="0"/>
+                        </a:spcBef>
+                        <a:spcAft>
+                          <a:spcPts val="0"/>
+                        </a:spcAft>
+                      </a:pPr>
+                      <a:r>
+                        <a:rPr lang="en-US" sz="1000" u="none">
+                          <a:solidFill>
+                            <a:srgbClr val="333333"/>
+                          </a:solidFill>
+                          <a:latin typeface="Times New Roman" pitchFamily="18" charset="0"/>
+                          <a:ea typeface="Times New Roman"/>
+                          <a:cs typeface="Times New Roman" pitchFamily="18" charset="0"/>
+                        </a:rPr>
+                        <a:t>C++ doesn't have built-in support for threads. It relies on third-party libraries for thread support.</a:t>
+                      </a:r>
+                      <a:endParaRPr lang="en-US" sz="1000" u="none">
+                        <a:latin typeface="Times New Roman" pitchFamily="18" charset="0"/>
+                        <a:ea typeface="Calibri"/>
+                        <a:cs typeface="Times New Roman" pitchFamily="18" charset="0"/>
+                      </a:endParaRPr>
+                    </a:p>
+                  </a:txBody>
+                  <a:tcPr marL="40317" marR="40317" marT="40317" marB="40317">
+                    <a:lnL w="12700" cap="flat" cmpd="sng" algn="ctr">
+                      <a:solidFill>
+                        <a:srgbClr val="C7CCBE"/>
+                      </a:solidFill>
+                      <a:prstDash val="solid"/>
+                      <a:round/>
+                      <a:headEnd type="none" w="med" len="med"/>
+                      <a:tailEnd type="none" w="med" len="med"/>
+                    </a:lnL>
+                    <a:lnR w="12700" cap="flat" cmpd="sng" algn="ctr">
+                      <a:solidFill>
+                        <a:srgbClr val="C7CCBE"/>
+                      </a:solidFill>
+                      <a:prstDash val="solid"/>
+                      <a:round/>
+                      <a:headEnd type="none" w="med" len="med"/>
+                      <a:tailEnd type="none" w="med" len="med"/>
+                    </a:lnR>
+                    <a:lnT w="12700" cap="flat" cmpd="sng" algn="ctr">
+                      <a:solidFill>
+                        <a:srgbClr val="C7CCBE"/>
+                      </a:solidFill>
+                      <a:prstDash val="solid"/>
+                      <a:round/>
+                      <a:headEnd type="none" w="med" len="med"/>
+                      <a:tailEnd type="none" w="med" len="med"/>
+                    </a:lnT>
+                    <a:lnB w="12700" cap="flat" cmpd="sng" algn="ctr">
+                      <a:solidFill>
+                        <a:srgbClr val="C7CCBE"/>
+                      </a:solidFill>
+                      <a:prstDash val="solid"/>
+                      <a:round/>
+                      <a:headEnd type="none" w="med" len="med"/>
+                      <a:tailEnd type="none" w="med" len="med"/>
+                    </a:lnB>
+                    <a:solidFill>
+                      <a:srgbClr val="FFFFFF"/>
+                    </a:solidFill>
+                  </a:tcPr>
+                </a:tc>
+                <a:tc>
+                  <a:txBody>
+                    <a:bodyPr/>
+                    <a:lstStyle/>
+                    <a:p>
+                      <a:pPr marL="0" marR="0" algn="just">
+                        <a:lnSpc>
+                          <a:spcPct val="115000"/>
+                        </a:lnSpc>
+                        <a:spcBef>
+                          <a:spcPts val="0"/>
+                        </a:spcBef>
+                        <a:spcAft>
+                          <a:spcPts val="0"/>
+                        </a:spcAft>
+                      </a:pPr>
+                      <a:r>
+                        <a:rPr lang="en-US" sz="1000" u="none" dirty="0">
+                          <a:solidFill>
+                            <a:srgbClr val="333333"/>
+                          </a:solidFill>
+                          <a:latin typeface="Times New Roman" pitchFamily="18" charset="0"/>
+                          <a:ea typeface="Times New Roman"/>
+                          <a:cs typeface="Times New Roman" pitchFamily="18" charset="0"/>
+                        </a:rPr>
+                        <a:t>Java has built-in </a:t>
+                      </a:r>
+                      <a:r>
+                        <a:rPr lang="en-US" sz="1000" u="none" strike="noStrike" dirty="0" smtClean="0">
+                          <a:solidFill>
+                            <a:srgbClr val="008000"/>
+                          </a:solidFill>
+                          <a:latin typeface="Times New Roman" pitchFamily="18" charset="0"/>
+                          <a:ea typeface="Times New Roman"/>
+                          <a:cs typeface="Times New Roman" pitchFamily="18" charset="0"/>
+                        </a:rPr>
+                        <a:t>thread</a:t>
+                      </a:r>
+                      <a:r>
+                        <a:rPr lang="en-US" sz="1000" u="none" strike="noStrike" baseline="0" dirty="0" smtClean="0">
+                          <a:solidFill>
+                            <a:srgbClr val="008000"/>
+                          </a:solidFill>
+                          <a:latin typeface="Times New Roman" pitchFamily="18" charset="0"/>
+                          <a:ea typeface="Times New Roman"/>
+                          <a:cs typeface="Times New Roman" pitchFamily="18" charset="0"/>
+                        </a:rPr>
+                        <a:t>  s</a:t>
+                      </a:r>
+                      <a:r>
+                        <a:rPr lang="en-US" sz="1000" u="none" dirty="0" smtClean="0">
+                          <a:solidFill>
+                            <a:srgbClr val="333333"/>
+                          </a:solidFill>
+                          <a:latin typeface="Times New Roman" pitchFamily="18" charset="0"/>
+                          <a:ea typeface="Times New Roman"/>
+                          <a:cs typeface="Times New Roman" pitchFamily="18" charset="0"/>
+                        </a:rPr>
+                        <a:t>upport</a:t>
+                      </a:r>
+                      <a:r>
+                        <a:rPr lang="en-US" sz="1000" u="none" dirty="0">
+                          <a:solidFill>
+                            <a:srgbClr val="333333"/>
+                          </a:solidFill>
+                          <a:latin typeface="Times New Roman" pitchFamily="18" charset="0"/>
+                          <a:ea typeface="Times New Roman"/>
+                          <a:cs typeface="Times New Roman" pitchFamily="18" charset="0"/>
+                        </a:rPr>
+                        <a:t>.</a:t>
+                      </a:r>
+                      <a:endParaRPr lang="en-US" sz="1000" u="none" dirty="0">
+                        <a:latin typeface="Times New Roman" pitchFamily="18" charset="0"/>
+                        <a:ea typeface="Calibri"/>
+                        <a:cs typeface="Times New Roman" pitchFamily="18" charset="0"/>
+                      </a:endParaRPr>
+                    </a:p>
+                  </a:txBody>
+                  <a:tcPr marL="40317" marR="40317" marT="40317" marB="40317">
+                    <a:lnL w="12700" cap="flat" cmpd="sng" algn="ctr">
+                      <a:solidFill>
+                        <a:srgbClr val="C7CCBE"/>
+                      </a:solidFill>
+                      <a:prstDash val="solid"/>
+                      <a:round/>
+                      <a:headEnd type="none" w="med" len="med"/>
+                      <a:tailEnd type="none" w="med" len="med"/>
+                    </a:lnL>
+                    <a:lnR w="12700" cap="flat" cmpd="sng" algn="ctr">
+                      <a:solidFill>
+                        <a:srgbClr val="C7CCBE"/>
+                      </a:solidFill>
+                      <a:prstDash val="solid"/>
+                      <a:round/>
+                      <a:headEnd type="none" w="med" len="med"/>
+                      <a:tailEnd type="none" w="med" len="med"/>
+                    </a:lnR>
+                    <a:lnT w="12700" cap="flat" cmpd="sng" algn="ctr">
+                      <a:solidFill>
+                        <a:srgbClr val="C7CCBE"/>
+                      </a:solidFill>
+                      <a:prstDash val="solid"/>
+                      <a:round/>
+                      <a:headEnd type="none" w="med" len="med"/>
+                      <a:tailEnd type="none" w="med" len="med"/>
+                    </a:lnT>
+                    <a:lnB w="12700" cap="flat" cmpd="sng" algn="ctr">
+                      <a:solidFill>
+                        <a:srgbClr val="C7CCBE"/>
+                      </a:solidFill>
+                      <a:prstDash val="solid"/>
+                      <a:round/>
+                      <a:headEnd type="none" w="med" len="med"/>
+                      <a:tailEnd type="none" w="med" len="med"/>
+                    </a:lnB>
+                    <a:solidFill>
+                      <a:srgbClr val="FFFFFF"/>
+                    </a:solidFill>
+                  </a:tcPr>
+                </a:tc>
+              </a:tr>
+            </a:tbl>
+          </a:graphicData>
+        </a:graphic>
+      </p:graphicFrame>
+    </p:spTree>
+  </p:cSld>
+  <p:clrMapOvr>
+    <a:masterClrMapping/>
+  </p:clrMapOvr>
+</p:sld>
+</file>
+
+<file path=ppt/slides/slide14.xml><?xml version="1.0" encoding="utf-8"?>
+<p:sld xmlns:a="http://schemas.openxmlformats.org/drawingml/2006/main" xmlns:r="http://schemas.openxmlformats.org/officeDocument/2006/relationships" xmlns:p="http://schemas.openxmlformats.org/presentationml/2006/main">
+  <p:cSld>
+    <p:spTree>
+      <p:nvGrpSpPr>
+        <p:cNvPr id="1" name=""/>
+        <p:cNvGrpSpPr/>
+        <p:nvPr/>
+      </p:nvGrpSpPr>
+      <p:grpSpPr>
+        <a:xfrm>
+          <a:off x="0" y="0"/>
+          <a:ext cx="0" cy="0"/>
+          <a:chOff x="0" y="0"/>
+          <a:chExt cx="0" cy="0"/>
+        </a:xfrm>
+      </p:grpSpPr>
+      <p:sp>
+        <p:nvSpPr>
+          <p:cNvPr id="2" name="Title 1"/>
+          <p:cNvSpPr>
+            <a:spLocks noGrp="1"/>
+          </p:cNvSpPr>
+          <p:nvPr>
+            <p:ph type="title"/>
+          </p:nvPr>
+        </p:nvSpPr>
+        <p:spPr/>
+        <p:txBody>
+          <a:bodyPr/>
+          <a:lstStyle/>
+          <a:p>
+            <a:r>
+              <a:rPr lang="en-US" dirty="0" smtClean="0"/>
+              <a:t>Releases</a:t>
+            </a:r>
+            <a:endParaRPr lang="en-US" dirty="0"/>
+          </a:p>
+        </p:txBody>
+      </p:sp>
+      <p:sp>
+        <p:nvSpPr>
+          <p:cNvPr id="3" name="Content Placeholder 2"/>
+          <p:cNvSpPr>
+            <a:spLocks noGrp="1"/>
+          </p:cNvSpPr>
+          <p:nvPr>
+            <p:ph idx="1"/>
+          </p:nvPr>
+        </p:nvSpPr>
+        <p:spPr/>
+        <p:txBody>
+          <a:bodyPr>
+            <a:normAutofit lnSpcReduction="10000"/>
+          </a:bodyPr>
+          <a:lstStyle/>
+          <a:p>
+            <a:r>
+              <a:rPr lang="en-US" dirty="0"/>
+              <a:t>JDK Alpha and </a:t>
+            </a:r>
+            <a:r>
+              <a:rPr lang="en-US" dirty="0" smtClean="0"/>
+              <a:t>Beta</a:t>
+            </a:r>
+          </a:p>
+          <a:p>
+            <a:r>
+              <a:rPr lang="en-US" dirty="0"/>
+              <a:t>JDK </a:t>
+            </a:r>
+            <a:r>
+              <a:rPr lang="en-US" dirty="0" smtClean="0"/>
+              <a:t>1.0</a:t>
+            </a:r>
+          </a:p>
+          <a:p>
+            <a:r>
+              <a:rPr lang="en-US" dirty="0"/>
+              <a:t>JDK </a:t>
+            </a:r>
+            <a:r>
+              <a:rPr lang="en-US" dirty="0" smtClean="0"/>
+              <a:t>1.1</a:t>
+            </a:r>
+          </a:p>
+          <a:p>
+            <a:r>
+              <a:rPr lang="en-US" dirty="0"/>
+              <a:t>J2SE </a:t>
+            </a:r>
+            <a:r>
+              <a:rPr lang="en-US" dirty="0" smtClean="0"/>
+              <a:t>1.2</a:t>
+            </a:r>
+          </a:p>
+          <a:p>
+            <a:r>
+              <a:rPr lang="en-US" dirty="0"/>
+              <a:t>J2SE </a:t>
+            </a:r>
+            <a:r>
+              <a:rPr lang="en-US" dirty="0" smtClean="0"/>
+              <a:t>1.3</a:t>
+            </a:r>
+          </a:p>
+          <a:p>
+            <a:r>
+              <a:rPr lang="en-US" dirty="0"/>
+              <a:t>J2SE </a:t>
+            </a:r>
+            <a:r>
+              <a:rPr lang="en-US" dirty="0" smtClean="0"/>
+              <a:t>1.4</a:t>
+            </a:r>
+          </a:p>
+          <a:p>
+            <a:r>
+              <a:rPr lang="en-US" dirty="0"/>
+              <a:t>J2SE </a:t>
+            </a:r>
+            <a:r>
+              <a:rPr lang="en-US" dirty="0" smtClean="0"/>
+              <a:t>5.0</a:t>
+            </a:r>
+          </a:p>
+          <a:p>
+            <a:r>
+              <a:rPr lang="en-US" dirty="0"/>
+              <a:t>Java SE </a:t>
+            </a:r>
+            <a:r>
+              <a:rPr lang="en-US" dirty="0" smtClean="0"/>
+              <a:t>6…………18</a:t>
+            </a:r>
+            <a:endParaRPr lang="en-US" dirty="0"/>
+          </a:p>
+        </p:txBody>
+      </p:sp>
+    </p:spTree>
+  </p:cSld>
+  <p:clrMapOvr>
+    <a:masterClrMapping/>
+  </p:clrMapOvr>
+</p:sld>
+</file>
+
+<file path=ppt/slides/slide15.xml><?xml version="1.0" encoding="utf-8"?>
+<p:sld xmlns:a="http://schemas.openxmlformats.org/drawingml/2006/main" xmlns:r="http://schemas.openxmlformats.org/officeDocument/2006/relationships" xmlns:p="http://schemas.openxmlformats.org/presentationml/2006/main">
+  <p:cSld>
+    <p:spTree>
+      <p:nvGrpSpPr>
+        <p:cNvPr id="1" name=""/>
+        <p:cNvGrpSpPr/>
+        <p:nvPr/>
+      </p:nvGrpSpPr>
+      <p:grpSpPr>
+        <a:xfrm>
+          <a:off x="0" y="0"/>
+          <a:ext cx="0" cy="0"/>
+          <a:chOff x="0" y="0"/>
+          <a:chExt cx="0" cy="0"/>
+        </a:xfrm>
+      </p:grpSpPr>
+      <p:sp>
+        <p:nvSpPr>
+          <p:cNvPr id="2" name="Title 1"/>
+          <p:cNvSpPr>
+            <a:spLocks noGrp="1"/>
+          </p:cNvSpPr>
+          <p:nvPr>
+            <p:ph type="title"/>
+          </p:nvPr>
+        </p:nvSpPr>
+        <p:spPr/>
+        <p:txBody>
+          <a:bodyPr/>
+          <a:lstStyle/>
+          <a:p>
+            <a:r>
+              <a:rPr lang="en-US" dirty="0" smtClean="0"/>
+              <a:t>JDK Installation Path</a:t>
+            </a:r>
+            <a:endParaRPr lang="en-US" dirty="0"/>
+          </a:p>
+        </p:txBody>
+      </p:sp>
+      <p:sp>
+        <p:nvSpPr>
+          <p:cNvPr id="3" name="Content Placeholder 2"/>
+          <p:cNvSpPr>
+            <a:spLocks noGrp="1"/>
+          </p:cNvSpPr>
+          <p:nvPr>
+            <p:ph idx="1"/>
+          </p:nvPr>
+        </p:nvSpPr>
+        <p:spPr/>
+        <p:txBody>
+          <a:bodyPr/>
+          <a:lstStyle/>
+          <a:p>
+            <a:r>
+              <a:rPr lang="en-US" dirty="0" smtClean="0"/>
+              <a:t>https://www.oracle.com/in/java/technologies/javase/javase8-archive-downloads.html</a:t>
+            </a:r>
+            <a:endParaRPr lang="en-US" dirty="0"/>
+          </a:p>
+        </p:txBody>
+      </p:sp>
+    </p:spTree>
+  </p:cSld>
+  <p:clrMapOvr>
+    <a:masterClrMapping/>
+  </p:clrMapOvr>
+</p:sld>
+</file>
+
+<file path=ppt/slides/slide16.xml><?xml version="1.0" encoding="utf-8"?>
 <p:sld xmlns:a="http://schemas.openxmlformats.org/drawingml/2006/main" xmlns:r="http://schemas.openxmlformats.org/officeDocument/2006/relationships" xmlns:p="http://schemas.openxmlformats.org/presentationml/2006/main">
   <p:cSld>
     <p:spTree>
@@ -3378,7 +6544,7 @@
 </p:sld>
 </file>
 
-<file path=ppt/slides/slide13.xml><?xml version="1.0" encoding="utf-8"?>
+<file path=ppt/slides/slide17.xml><?xml version="1.0" encoding="utf-8"?>
 <p:sld xmlns:a="http://schemas.openxmlformats.org/drawingml/2006/main" xmlns:r="http://schemas.openxmlformats.org/officeDocument/2006/relationships" xmlns:p="http://schemas.openxmlformats.org/presentationml/2006/main">
   <p:cSld>
     <p:spTree>
@@ -3407,10 +6573,24 @@
         </p:nvSpPr>
         <p:spPr/>
         <p:txBody>
-          <a:bodyPr/>
-          <a:lstStyle/>
-          <a:p>
-            <a:endParaRPr lang="en-US"/>
+          <a:bodyPr>
+            <a:normAutofit fontScale="90000"/>
+          </a:bodyPr>
+          <a:lstStyle/>
+          <a:p>
+            <a:r>
+              <a:rPr lang="en-US" dirty="0" smtClean="0"/>
+              <a:t>To Identify </a:t>
+            </a:r>
+            <a:r>
+              <a:rPr lang="en-US" dirty="0" err="1" smtClean="0"/>
+              <a:t>Jdk</a:t>
+            </a:r>
+            <a:r>
+              <a:rPr lang="en-US" dirty="0" smtClean="0"/>
+              <a:t>, Java compiler version</a:t>
+            </a:r>
+            <a:endParaRPr lang="en-US" dirty="0"/>
           </a:p>
         </p:txBody>
       </p:sp>
@@ -3488,7 +6668,7 @@
 </p:sld>
 </file>
 
-<file path=ppt/slides/slide14.xml><?xml version="1.0" encoding="utf-8"?>
+<file path=ppt/slides/slide18.xml><?xml version="1.0" encoding="utf-8"?>
 <p:sld xmlns:a="http://schemas.openxmlformats.org/drawingml/2006/main" xmlns:r="http://schemas.openxmlformats.org/officeDocument/2006/relationships" xmlns:p="http://schemas.openxmlformats.org/presentationml/2006/main">
   <p:cSld>
     <p:spTree>
@@ -3517,10 +6697,16 @@
         </p:nvSpPr>
         <p:spPr/>
         <p:txBody>
-          <a:bodyPr/>
-          <a:lstStyle/>
-          <a:p>
-            <a:endParaRPr lang="en-US"/>
+          <a:bodyPr>
+            <a:normAutofit fontScale="90000"/>
+          </a:bodyPr>
+          <a:lstStyle/>
+          <a:p>
+            <a:r>
+              <a:rPr lang="en-US" dirty="0" smtClean="0"/>
+              <a:t>Compile the program from Terminal/Command Prompt</a:t>
+            </a:r>
+            <a:endParaRPr lang="en-US" dirty="0"/>
           </a:p>
         </p:txBody>
       </p:sp>
@@ -3567,7 +6753,7 @@
 </p:sld>
 </file>
 
-<file path=ppt/slides/slide15.xml><?xml version="1.0" encoding="utf-8"?>
+<file path=ppt/slides/slide19.xml><?xml version="1.0" encoding="utf-8"?>
 <p:sld xmlns:a="http://schemas.openxmlformats.org/drawingml/2006/main" xmlns:r="http://schemas.openxmlformats.org/officeDocument/2006/relationships" xmlns:p="http://schemas.openxmlformats.org/presentationml/2006/main">
   <p:cSld>
     <p:spTree>
@@ -3601,7 +6787,7 @@
           <a:p>
             <a:r>
               <a:rPr lang="en-US" dirty="0" smtClean="0"/>
-              <a:t>End Of Session 1</a:t>
+              <a:t>Diff ways to Initiate</a:t>
             </a:r>
             <a:endParaRPr lang="en-US" dirty="0"/>
           </a:p>
@@ -3619,211 +6805,578 @@
         </p:nvSpPr>
         <p:spPr/>
         <p:txBody>
-          <a:bodyPr/>
-          <a:lstStyle/>
-          <a:p>
-            <a:r>
-              <a:rPr lang="en-US" dirty="0" smtClean="0"/>
-              <a:t>Thank You</a:t>
-            </a:r>
-            <a:endParaRPr lang="en-US" dirty="0"/>
-          </a:p>
-        </p:txBody>
-      </p:sp>
-    </p:spTree>
-  </p:cSld>
-  <p:clrMapOvr>
-    <a:masterClrMapping/>
-  </p:clrMapOvr>
-</p:sld>
-</file>
-
-<file path=ppt/slides/slide16.xml><?xml version="1.0" encoding="utf-8"?>
-<p:sld xmlns:a="http://schemas.openxmlformats.org/drawingml/2006/main" xmlns:r="http://schemas.openxmlformats.org/officeDocument/2006/relationships" xmlns:p="http://schemas.openxmlformats.org/presentationml/2006/main">
-  <p:cSld>
-    <p:spTree>
-      <p:nvGrpSpPr>
-        <p:cNvPr id="1" name=""/>
-        <p:cNvGrpSpPr/>
-        <p:nvPr/>
-      </p:nvGrpSpPr>
-      <p:grpSpPr>
-        <a:xfrm>
-          <a:off x="0" y="0"/>
-          <a:ext cx="0" cy="0"/>
-          <a:chOff x="0" y="0"/>
-          <a:chExt cx="0" cy="0"/>
-        </a:xfrm>
-      </p:grpSpPr>
-      <p:sp>
-        <p:nvSpPr>
-          <p:cNvPr id="2" name="Title 1"/>
-          <p:cNvSpPr>
-            <a:spLocks noGrp="1"/>
-          </p:cNvSpPr>
-          <p:nvPr>
-            <p:ph type="title"/>
-          </p:nvPr>
-        </p:nvSpPr>
-        <p:spPr/>
-        <p:txBody>
-          <a:bodyPr/>
-          <a:lstStyle/>
-          <a:p>
-            <a:r>
-              <a:rPr lang="en-US" dirty="0" smtClean="0"/>
-              <a:t>End Of Session 1</a:t>
-            </a:r>
-            <a:endParaRPr lang="en-US" dirty="0"/>
-          </a:p>
-        </p:txBody>
-      </p:sp>
-      <p:sp>
-        <p:nvSpPr>
-          <p:cNvPr id="3" name="Content Placeholder 2"/>
-          <p:cNvSpPr>
-            <a:spLocks noGrp="1"/>
-          </p:cNvSpPr>
-          <p:nvPr>
-            <p:ph idx="1"/>
-          </p:nvPr>
-        </p:nvSpPr>
-        <p:spPr/>
-        <p:txBody>
-          <a:bodyPr/>
-          <a:lstStyle/>
-          <a:p>
-            <a:r>
-              <a:rPr lang="en-US" dirty="0" smtClean="0"/>
-              <a:t>Thank You</a:t>
-            </a:r>
-            <a:endParaRPr lang="en-US" dirty="0"/>
-          </a:p>
-        </p:txBody>
-      </p:sp>
-    </p:spTree>
-  </p:cSld>
-  <p:clrMapOvr>
-    <a:masterClrMapping/>
-  </p:clrMapOvr>
-</p:sld>
-</file>
-
-<file path=ppt/slides/slide17.xml><?xml version="1.0" encoding="utf-8"?>
-<p:sld xmlns:a="http://schemas.openxmlformats.org/drawingml/2006/main" xmlns:r="http://schemas.openxmlformats.org/officeDocument/2006/relationships" xmlns:p="http://schemas.openxmlformats.org/presentationml/2006/main">
-  <p:cSld>
-    <p:spTree>
-      <p:nvGrpSpPr>
-        <p:cNvPr id="1" name=""/>
-        <p:cNvGrpSpPr/>
-        <p:nvPr/>
-      </p:nvGrpSpPr>
-      <p:grpSpPr>
-        <a:xfrm>
-          <a:off x="0" y="0"/>
-          <a:ext cx="0" cy="0"/>
-          <a:chOff x="0" y="0"/>
-          <a:chExt cx="0" cy="0"/>
-        </a:xfrm>
-      </p:grpSpPr>
-      <p:sp>
-        <p:nvSpPr>
-          <p:cNvPr id="2" name="Title 1"/>
-          <p:cNvSpPr>
-            <a:spLocks noGrp="1"/>
-          </p:cNvSpPr>
-          <p:nvPr>
-            <p:ph type="title"/>
-          </p:nvPr>
-        </p:nvSpPr>
-        <p:spPr/>
-        <p:txBody>
-          <a:bodyPr/>
-          <a:lstStyle/>
-          <a:p>
-            <a:endParaRPr lang="en-US"/>
-          </a:p>
-        </p:txBody>
-      </p:sp>
-      <p:sp>
-        <p:nvSpPr>
-          <p:cNvPr id="3" name="Content Placeholder 2"/>
-          <p:cNvSpPr>
-            <a:spLocks noGrp="1"/>
-          </p:cNvSpPr>
-          <p:nvPr>
-            <p:ph idx="1"/>
-          </p:nvPr>
-        </p:nvSpPr>
-        <p:spPr/>
-        <p:txBody>
           <a:bodyPr>
-            <a:normAutofit fontScale="92500"/>
+            <a:normAutofit/>
           </a:bodyPr>
           <a:lstStyle/>
-          <a:p>
-            <a:r>
-              <a:rPr lang="en-US" dirty="0" smtClean="0"/>
-              <a:t>Install Eclipse IDE Corresponding to Java 8 Version</a:t>
-            </a:r>
-          </a:p>
-          <a:p>
-            <a:r>
-              <a:rPr lang="en-US" dirty="0" smtClean="0"/>
-              <a:t>https://www.eclipse.org/downloads/packages/release/neon/3/eclipse-ide-java-ee-developers</a:t>
-            </a:r>
-            <a:endParaRPr lang="en-US" dirty="0" smtClean="0"/>
-          </a:p>
-          <a:p>
-            <a:r>
-              <a:rPr lang="en-US" dirty="0" err="1" smtClean="0"/>
-              <a:t>Git</a:t>
-            </a:r>
-            <a:r>
-              <a:rPr lang="en-US" dirty="0" smtClean="0"/>
-              <a:t>-https://git-scm.com/</a:t>
-            </a:r>
-            <a:endParaRPr lang="en-US" dirty="0" smtClean="0"/>
-          </a:p>
-          <a:p>
-            <a:r>
-              <a:rPr lang="en-US" dirty="0" smtClean="0"/>
-              <a:t>Tortoise </a:t>
-            </a:r>
-            <a:r>
-              <a:rPr lang="en-US" dirty="0" err="1" smtClean="0"/>
-              <a:t>Git</a:t>
-            </a:r>
-            <a:r>
-              <a:rPr lang="en-US" dirty="0" smtClean="0"/>
-              <a:t> -https://tortoisegit.org/download/</a:t>
-            </a:r>
-            <a:endParaRPr lang="en-US" dirty="0" smtClean="0"/>
-          </a:p>
-          <a:p>
-            <a:r>
-              <a:rPr lang="en-US" dirty="0" err="1" smtClean="0"/>
-              <a:t>Sighn</a:t>
-            </a:r>
-            <a:r>
-              <a:rPr lang="en-US" dirty="0" smtClean="0"/>
-              <a:t> up an account in </a:t>
-            </a:r>
-            <a:r>
-              <a:rPr lang="en-US" dirty="0" err="1" smtClean="0"/>
-              <a:t>git</a:t>
-            </a:r>
-            <a:r>
-              <a:rPr lang="en-US" smtClean="0"/>
-              <a:t>-&gt; https://github.com/</a:t>
-            </a:r>
-            <a:endParaRPr lang="en-US" dirty="0" smtClean="0"/>
-          </a:p>
           <a:p>
             <a:pPr>
               <a:buNone/>
             </a:pPr>
-            <a:endParaRPr lang="en-US" dirty="0" smtClean="0"/>
+            <a:endParaRPr lang="en-US" sz="1400" b="1" dirty="0" smtClean="0">
+              <a:latin typeface="Times New Roman" pitchFamily="18" charset="0"/>
+              <a:cs typeface="Times New Roman" pitchFamily="18" charset="0"/>
+            </a:endParaRPr>
+          </a:p>
+          <a:p>
+            <a:pPr>
+              <a:buNone/>
+            </a:pPr>
+            <a:endParaRPr lang="en-US" sz="1400" b="1" dirty="0" smtClean="0">
+              <a:latin typeface="Times New Roman" pitchFamily="18" charset="0"/>
+              <a:cs typeface="Times New Roman" pitchFamily="18" charset="0"/>
+            </a:endParaRPr>
+          </a:p>
+          <a:p>
+            <a:pPr>
+              <a:buNone/>
+            </a:pPr>
+            <a:r>
+              <a:rPr lang="en-US" sz="1400" b="1" dirty="0" smtClean="0">
+                <a:latin typeface="Times New Roman" pitchFamily="18" charset="0"/>
+                <a:cs typeface="Times New Roman" pitchFamily="18" charset="0"/>
+              </a:rPr>
+              <a:t>public</a:t>
+            </a:r>
+            <a:r>
+              <a:rPr lang="en-US" sz="1400" dirty="0" smtClean="0">
+                <a:latin typeface="Times New Roman" pitchFamily="18" charset="0"/>
+                <a:cs typeface="Times New Roman" pitchFamily="18" charset="0"/>
+              </a:rPr>
+              <a:t> </a:t>
+            </a:r>
+            <a:r>
+              <a:rPr lang="en-US" sz="1400" b="1" dirty="0" smtClean="0">
+                <a:latin typeface="Times New Roman" pitchFamily="18" charset="0"/>
+                <a:cs typeface="Times New Roman" pitchFamily="18" charset="0"/>
+              </a:rPr>
+              <a:t>static</a:t>
+            </a:r>
+            <a:r>
+              <a:rPr lang="en-US" sz="1400" dirty="0" smtClean="0">
+                <a:latin typeface="Times New Roman" pitchFamily="18" charset="0"/>
+                <a:cs typeface="Times New Roman" pitchFamily="18" charset="0"/>
+              </a:rPr>
+              <a:t> </a:t>
+            </a:r>
+            <a:r>
+              <a:rPr lang="en-US" sz="1400" b="1" dirty="0" smtClean="0">
+                <a:latin typeface="Times New Roman" pitchFamily="18" charset="0"/>
+                <a:cs typeface="Times New Roman" pitchFamily="18" charset="0"/>
+              </a:rPr>
+              <a:t>void</a:t>
+            </a:r>
+            <a:r>
+              <a:rPr lang="en-US" sz="1400" dirty="0" smtClean="0">
+                <a:latin typeface="Times New Roman" pitchFamily="18" charset="0"/>
+                <a:cs typeface="Times New Roman" pitchFamily="18" charset="0"/>
+              </a:rPr>
+              <a:t> main(String[] </a:t>
+            </a:r>
+            <a:r>
+              <a:rPr lang="en-US" sz="1400" dirty="0" err="1" smtClean="0">
+                <a:latin typeface="Times New Roman" pitchFamily="18" charset="0"/>
+                <a:cs typeface="Times New Roman" pitchFamily="18" charset="0"/>
+              </a:rPr>
+              <a:t>args</a:t>
+            </a:r>
+            <a:r>
+              <a:rPr lang="en-US" sz="1400" dirty="0" smtClean="0">
+                <a:latin typeface="Times New Roman" pitchFamily="18" charset="0"/>
+                <a:cs typeface="Times New Roman" pitchFamily="18" charset="0"/>
+              </a:rPr>
+              <a:t>)  </a:t>
+            </a:r>
+          </a:p>
+          <a:p>
+            <a:pPr>
+              <a:buNone/>
+            </a:pPr>
+            <a:r>
+              <a:rPr lang="en-US" sz="1400" b="1" dirty="0" smtClean="0">
+                <a:latin typeface="Times New Roman" pitchFamily="18" charset="0"/>
+                <a:cs typeface="Times New Roman" pitchFamily="18" charset="0"/>
+              </a:rPr>
+              <a:t>public</a:t>
+            </a:r>
+            <a:r>
+              <a:rPr lang="en-US" sz="1400" dirty="0" smtClean="0">
+                <a:latin typeface="Times New Roman" pitchFamily="18" charset="0"/>
+                <a:cs typeface="Times New Roman" pitchFamily="18" charset="0"/>
+              </a:rPr>
+              <a:t> </a:t>
+            </a:r>
+            <a:r>
+              <a:rPr lang="en-US" sz="1400" b="1" dirty="0" smtClean="0">
+                <a:latin typeface="Times New Roman" pitchFamily="18" charset="0"/>
+                <a:cs typeface="Times New Roman" pitchFamily="18" charset="0"/>
+              </a:rPr>
+              <a:t>static</a:t>
+            </a:r>
+            <a:r>
+              <a:rPr lang="en-US" sz="1400" dirty="0" smtClean="0">
+                <a:latin typeface="Times New Roman" pitchFamily="18" charset="0"/>
+                <a:cs typeface="Times New Roman" pitchFamily="18" charset="0"/>
+              </a:rPr>
+              <a:t> </a:t>
+            </a:r>
+            <a:r>
+              <a:rPr lang="en-US" sz="1400" b="1" dirty="0" smtClean="0">
+                <a:latin typeface="Times New Roman" pitchFamily="18" charset="0"/>
+                <a:cs typeface="Times New Roman" pitchFamily="18" charset="0"/>
+              </a:rPr>
+              <a:t>void</a:t>
+            </a:r>
+            <a:r>
+              <a:rPr lang="en-US" sz="1400" dirty="0" smtClean="0">
+                <a:latin typeface="Times New Roman" pitchFamily="18" charset="0"/>
+                <a:cs typeface="Times New Roman" pitchFamily="18" charset="0"/>
+              </a:rPr>
+              <a:t> main(String []</a:t>
+            </a:r>
+            <a:r>
+              <a:rPr lang="en-US" sz="1400" dirty="0" err="1" smtClean="0">
+                <a:latin typeface="Times New Roman" pitchFamily="18" charset="0"/>
+                <a:cs typeface="Times New Roman" pitchFamily="18" charset="0"/>
+              </a:rPr>
+              <a:t>args</a:t>
+            </a:r>
+            <a:r>
+              <a:rPr lang="en-US" sz="1400" dirty="0" smtClean="0">
+                <a:latin typeface="Times New Roman" pitchFamily="18" charset="0"/>
+                <a:cs typeface="Times New Roman" pitchFamily="18" charset="0"/>
+              </a:rPr>
+              <a:t>)  </a:t>
+            </a:r>
+          </a:p>
+          <a:p>
+            <a:pPr>
+              <a:buNone/>
+            </a:pPr>
+            <a:r>
+              <a:rPr lang="en-US" sz="1400" b="1" dirty="0" smtClean="0">
+                <a:latin typeface="Times New Roman" pitchFamily="18" charset="0"/>
+                <a:cs typeface="Times New Roman" pitchFamily="18" charset="0"/>
+              </a:rPr>
+              <a:t>public</a:t>
+            </a:r>
+            <a:r>
+              <a:rPr lang="en-US" sz="1400" dirty="0" smtClean="0">
+                <a:latin typeface="Times New Roman" pitchFamily="18" charset="0"/>
+                <a:cs typeface="Times New Roman" pitchFamily="18" charset="0"/>
+              </a:rPr>
+              <a:t> </a:t>
+            </a:r>
+            <a:r>
+              <a:rPr lang="en-US" sz="1400" b="1" dirty="0" smtClean="0">
+                <a:latin typeface="Times New Roman" pitchFamily="18" charset="0"/>
+                <a:cs typeface="Times New Roman" pitchFamily="18" charset="0"/>
+              </a:rPr>
+              <a:t>static</a:t>
+            </a:r>
+            <a:r>
+              <a:rPr lang="en-US" sz="1400" dirty="0" smtClean="0">
+                <a:latin typeface="Times New Roman" pitchFamily="18" charset="0"/>
+                <a:cs typeface="Times New Roman" pitchFamily="18" charset="0"/>
+              </a:rPr>
+              <a:t> </a:t>
+            </a:r>
+            <a:r>
+              <a:rPr lang="en-US" sz="1400" b="1" dirty="0" smtClean="0">
+                <a:latin typeface="Times New Roman" pitchFamily="18" charset="0"/>
+                <a:cs typeface="Times New Roman" pitchFamily="18" charset="0"/>
+              </a:rPr>
+              <a:t>void</a:t>
+            </a:r>
+            <a:r>
+              <a:rPr lang="en-US" sz="1400" dirty="0" smtClean="0">
+                <a:latin typeface="Times New Roman" pitchFamily="18" charset="0"/>
+                <a:cs typeface="Times New Roman" pitchFamily="18" charset="0"/>
+              </a:rPr>
+              <a:t> main(String </a:t>
+            </a:r>
+            <a:r>
+              <a:rPr lang="en-US" sz="1400" dirty="0" err="1" smtClean="0">
+                <a:latin typeface="Times New Roman" pitchFamily="18" charset="0"/>
+                <a:cs typeface="Times New Roman" pitchFamily="18" charset="0"/>
+              </a:rPr>
+              <a:t>args</a:t>
+            </a:r>
+            <a:r>
+              <a:rPr lang="en-US" sz="1400" dirty="0" smtClean="0">
+                <a:latin typeface="Times New Roman" pitchFamily="18" charset="0"/>
+                <a:cs typeface="Times New Roman" pitchFamily="18" charset="0"/>
+              </a:rPr>
+              <a:t>[])  </a:t>
+            </a:r>
+          </a:p>
+          <a:p>
+            <a:pPr>
+              <a:buNone/>
+            </a:pPr>
+            <a:r>
+              <a:rPr lang="en-US" sz="1400" b="1" dirty="0" smtClean="0">
+                <a:latin typeface="Times New Roman" pitchFamily="18" charset="0"/>
+                <a:cs typeface="Times New Roman" pitchFamily="18" charset="0"/>
+              </a:rPr>
+              <a:t>public</a:t>
+            </a:r>
+            <a:r>
+              <a:rPr lang="en-US" sz="1400" dirty="0" smtClean="0">
+                <a:latin typeface="Times New Roman" pitchFamily="18" charset="0"/>
+                <a:cs typeface="Times New Roman" pitchFamily="18" charset="0"/>
+              </a:rPr>
+              <a:t> </a:t>
+            </a:r>
+            <a:r>
+              <a:rPr lang="en-US" sz="1400" b="1" dirty="0" smtClean="0">
+                <a:latin typeface="Times New Roman" pitchFamily="18" charset="0"/>
+                <a:cs typeface="Times New Roman" pitchFamily="18" charset="0"/>
+              </a:rPr>
+              <a:t>static</a:t>
+            </a:r>
+            <a:r>
+              <a:rPr lang="en-US" sz="1400" dirty="0" smtClean="0">
+                <a:latin typeface="Times New Roman" pitchFamily="18" charset="0"/>
+                <a:cs typeface="Times New Roman" pitchFamily="18" charset="0"/>
+              </a:rPr>
+              <a:t> </a:t>
+            </a:r>
+            <a:r>
+              <a:rPr lang="en-US" sz="1400" b="1" dirty="0" smtClean="0">
+                <a:latin typeface="Times New Roman" pitchFamily="18" charset="0"/>
+                <a:cs typeface="Times New Roman" pitchFamily="18" charset="0"/>
+              </a:rPr>
+              <a:t>void</a:t>
+            </a:r>
+            <a:r>
+              <a:rPr lang="en-US" sz="1400" dirty="0" smtClean="0">
+                <a:latin typeface="Times New Roman" pitchFamily="18" charset="0"/>
+                <a:cs typeface="Times New Roman" pitchFamily="18" charset="0"/>
+              </a:rPr>
+              <a:t> main(String... </a:t>
+            </a:r>
+            <a:r>
+              <a:rPr lang="en-US" sz="1400" dirty="0" err="1" smtClean="0">
+                <a:latin typeface="Times New Roman" pitchFamily="18" charset="0"/>
+                <a:cs typeface="Times New Roman" pitchFamily="18" charset="0"/>
+              </a:rPr>
+              <a:t>args</a:t>
+            </a:r>
+            <a:r>
+              <a:rPr lang="en-US" sz="1400" dirty="0" smtClean="0">
+                <a:latin typeface="Times New Roman" pitchFamily="18" charset="0"/>
+                <a:cs typeface="Times New Roman" pitchFamily="18" charset="0"/>
+              </a:rPr>
+              <a:t>)  </a:t>
+            </a:r>
+          </a:p>
+          <a:p>
+            <a:pPr>
+              <a:buNone/>
+            </a:pPr>
+            <a:r>
+              <a:rPr lang="en-US" sz="1400" b="1" dirty="0" smtClean="0">
+                <a:latin typeface="Times New Roman" pitchFamily="18" charset="0"/>
+                <a:cs typeface="Times New Roman" pitchFamily="18" charset="0"/>
+              </a:rPr>
+              <a:t>static</a:t>
+            </a:r>
+            <a:r>
+              <a:rPr lang="en-US" sz="1400" dirty="0" smtClean="0">
+                <a:latin typeface="Times New Roman" pitchFamily="18" charset="0"/>
+                <a:cs typeface="Times New Roman" pitchFamily="18" charset="0"/>
+              </a:rPr>
+              <a:t> </a:t>
+            </a:r>
+            <a:r>
+              <a:rPr lang="en-US" sz="1400" b="1" dirty="0" smtClean="0">
+                <a:latin typeface="Times New Roman" pitchFamily="18" charset="0"/>
+                <a:cs typeface="Times New Roman" pitchFamily="18" charset="0"/>
+              </a:rPr>
+              <a:t>public</a:t>
+            </a:r>
+            <a:r>
+              <a:rPr lang="en-US" sz="1400" dirty="0" smtClean="0">
+                <a:latin typeface="Times New Roman" pitchFamily="18" charset="0"/>
+                <a:cs typeface="Times New Roman" pitchFamily="18" charset="0"/>
+              </a:rPr>
+              <a:t> </a:t>
+            </a:r>
+            <a:r>
+              <a:rPr lang="en-US" sz="1400" b="1" dirty="0" smtClean="0">
+                <a:latin typeface="Times New Roman" pitchFamily="18" charset="0"/>
+                <a:cs typeface="Times New Roman" pitchFamily="18" charset="0"/>
+              </a:rPr>
+              <a:t>void</a:t>
+            </a:r>
+            <a:r>
+              <a:rPr lang="en-US" sz="1400" dirty="0" smtClean="0">
+                <a:latin typeface="Times New Roman" pitchFamily="18" charset="0"/>
+                <a:cs typeface="Times New Roman" pitchFamily="18" charset="0"/>
+              </a:rPr>
+              <a:t> main(String[] </a:t>
+            </a:r>
+            <a:r>
+              <a:rPr lang="en-US" sz="1400" dirty="0" err="1" smtClean="0">
+                <a:latin typeface="Times New Roman" pitchFamily="18" charset="0"/>
+                <a:cs typeface="Times New Roman" pitchFamily="18" charset="0"/>
+              </a:rPr>
+              <a:t>args</a:t>
+            </a:r>
+            <a:r>
+              <a:rPr lang="en-US" sz="1400" dirty="0" smtClean="0">
+                <a:latin typeface="Times New Roman" pitchFamily="18" charset="0"/>
+                <a:cs typeface="Times New Roman" pitchFamily="18" charset="0"/>
+              </a:rPr>
+              <a:t>)  </a:t>
+            </a:r>
+          </a:p>
+          <a:p>
+            <a:pPr>
+              <a:buNone/>
+            </a:pPr>
+            <a:r>
+              <a:rPr lang="en-US" sz="1400" b="1" dirty="0" smtClean="0">
+                <a:latin typeface="Times New Roman" pitchFamily="18" charset="0"/>
+                <a:cs typeface="Times New Roman" pitchFamily="18" charset="0"/>
+              </a:rPr>
+              <a:t>public</a:t>
+            </a:r>
+            <a:r>
+              <a:rPr lang="en-US" sz="1400" dirty="0" smtClean="0">
+                <a:latin typeface="Times New Roman" pitchFamily="18" charset="0"/>
+                <a:cs typeface="Times New Roman" pitchFamily="18" charset="0"/>
+              </a:rPr>
+              <a:t> </a:t>
+            </a:r>
+            <a:r>
+              <a:rPr lang="en-US" sz="1400" b="1" dirty="0" smtClean="0">
+                <a:latin typeface="Times New Roman" pitchFamily="18" charset="0"/>
+                <a:cs typeface="Times New Roman" pitchFamily="18" charset="0"/>
+              </a:rPr>
+              <a:t>static</a:t>
+            </a:r>
+            <a:r>
+              <a:rPr lang="en-US" sz="1400" dirty="0" smtClean="0">
+                <a:latin typeface="Times New Roman" pitchFamily="18" charset="0"/>
+                <a:cs typeface="Times New Roman" pitchFamily="18" charset="0"/>
+              </a:rPr>
+              <a:t> </a:t>
+            </a:r>
+            <a:r>
+              <a:rPr lang="en-US" sz="1400" b="1" dirty="0" smtClean="0">
+                <a:latin typeface="Times New Roman" pitchFamily="18" charset="0"/>
+                <a:cs typeface="Times New Roman" pitchFamily="18" charset="0"/>
+              </a:rPr>
+              <a:t>final</a:t>
+            </a:r>
+            <a:r>
+              <a:rPr lang="en-US" sz="1400" dirty="0" smtClean="0">
+                <a:latin typeface="Times New Roman" pitchFamily="18" charset="0"/>
+                <a:cs typeface="Times New Roman" pitchFamily="18" charset="0"/>
+              </a:rPr>
+              <a:t> </a:t>
+            </a:r>
+            <a:r>
+              <a:rPr lang="en-US" sz="1400" b="1" dirty="0" smtClean="0">
+                <a:latin typeface="Times New Roman" pitchFamily="18" charset="0"/>
+                <a:cs typeface="Times New Roman" pitchFamily="18" charset="0"/>
+              </a:rPr>
+              <a:t>void</a:t>
+            </a:r>
+            <a:r>
+              <a:rPr lang="en-US" sz="1400" dirty="0" smtClean="0">
+                <a:latin typeface="Times New Roman" pitchFamily="18" charset="0"/>
+                <a:cs typeface="Times New Roman" pitchFamily="18" charset="0"/>
+              </a:rPr>
+              <a:t> main(String[] </a:t>
+            </a:r>
+            <a:r>
+              <a:rPr lang="en-US" sz="1400" dirty="0" err="1" smtClean="0">
+                <a:latin typeface="Times New Roman" pitchFamily="18" charset="0"/>
+                <a:cs typeface="Times New Roman" pitchFamily="18" charset="0"/>
+              </a:rPr>
+              <a:t>args</a:t>
+            </a:r>
+            <a:r>
+              <a:rPr lang="en-US" sz="1400" dirty="0" smtClean="0">
+                <a:latin typeface="Times New Roman" pitchFamily="18" charset="0"/>
+                <a:cs typeface="Times New Roman" pitchFamily="18" charset="0"/>
+              </a:rPr>
+              <a:t>)  </a:t>
+            </a:r>
+          </a:p>
+          <a:p>
+            <a:pPr>
+              <a:buNone/>
+            </a:pPr>
+            <a:r>
+              <a:rPr lang="en-US" sz="1400" b="1" dirty="0" smtClean="0">
+                <a:latin typeface="Times New Roman" pitchFamily="18" charset="0"/>
+                <a:cs typeface="Times New Roman" pitchFamily="18" charset="0"/>
+              </a:rPr>
+              <a:t>final</a:t>
+            </a:r>
+            <a:r>
+              <a:rPr lang="en-US" sz="1400" dirty="0" smtClean="0">
+                <a:latin typeface="Times New Roman" pitchFamily="18" charset="0"/>
+                <a:cs typeface="Times New Roman" pitchFamily="18" charset="0"/>
+              </a:rPr>
+              <a:t> </a:t>
+            </a:r>
+            <a:r>
+              <a:rPr lang="en-US" sz="1400" b="1" dirty="0" smtClean="0">
+                <a:latin typeface="Times New Roman" pitchFamily="18" charset="0"/>
+                <a:cs typeface="Times New Roman" pitchFamily="18" charset="0"/>
+              </a:rPr>
+              <a:t>public</a:t>
+            </a:r>
+            <a:r>
+              <a:rPr lang="en-US" sz="1400" dirty="0" smtClean="0">
+                <a:latin typeface="Times New Roman" pitchFamily="18" charset="0"/>
+                <a:cs typeface="Times New Roman" pitchFamily="18" charset="0"/>
+              </a:rPr>
+              <a:t> </a:t>
+            </a:r>
+            <a:r>
+              <a:rPr lang="en-US" sz="1400" b="1" dirty="0" smtClean="0">
+                <a:latin typeface="Times New Roman" pitchFamily="18" charset="0"/>
+                <a:cs typeface="Times New Roman" pitchFamily="18" charset="0"/>
+              </a:rPr>
+              <a:t>static</a:t>
+            </a:r>
+            <a:r>
+              <a:rPr lang="en-US" sz="1400" dirty="0" smtClean="0">
+                <a:latin typeface="Times New Roman" pitchFamily="18" charset="0"/>
+                <a:cs typeface="Times New Roman" pitchFamily="18" charset="0"/>
+              </a:rPr>
+              <a:t> </a:t>
+            </a:r>
+            <a:r>
+              <a:rPr lang="en-US" sz="1400" b="1" dirty="0" smtClean="0">
+                <a:latin typeface="Times New Roman" pitchFamily="18" charset="0"/>
+                <a:cs typeface="Times New Roman" pitchFamily="18" charset="0"/>
+              </a:rPr>
+              <a:t>void</a:t>
+            </a:r>
+            <a:r>
+              <a:rPr lang="en-US" sz="1400" dirty="0" smtClean="0">
+                <a:latin typeface="Times New Roman" pitchFamily="18" charset="0"/>
+                <a:cs typeface="Times New Roman" pitchFamily="18" charset="0"/>
+              </a:rPr>
+              <a:t> main(String[] </a:t>
+            </a:r>
+            <a:r>
+              <a:rPr lang="en-US" sz="1400" dirty="0" err="1" smtClean="0">
+                <a:latin typeface="Times New Roman" pitchFamily="18" charset="0"/>
+                <a:cs typeface="Times New Roman" pitchFamily="18" charset="0"/>
+              </a:rPr>
+              <a:t>args</a:t>
+            </a:r>
+            <a:r>
+              <a:rPr lang="en-US" sz="1400" dirty="0" smtClean="0">
+                <a:latin typeface="Times New Roman" pitchFamily="18" charset="0"/>
+                <a:cs typeface="Times New Roman" pitchFamily="18" charset="0"/>
+              </a:rPr>
+              <a:t>)  </a:t>
+            </a:r>
+          </a:p>
+          <a:p>
+            <a:pPr>
+              <a:buNone/>
+            </a:pPr>
+            <a:r>
+              <a:rPr lang="en-US" sz="1400" b="1" dirty="0" smtClean="0">
+                <a:latin typeface="Times New Roman" pitchFamily="18" charset="0"/>
+                <a:cs typeface="Times New Roman" pitchFamily="18" charset="0"/>
+              </a:rPr>
+              <a:t>final</a:t>
+            </a:r>
+            <a:r>
+              <a:rPr lang="en-US" sz="1400" dirty="0" smtClean="0">
+                <a:latin typeface="Times New Roman" pitchFamily="18" charset="0"/>
+                <a:cs typeface="Times New Roman" pitchFamily="18" charset="0"/>
+              </a:rPr>
+              <a:t> </a:t>
+            </a:r>
+            <a:r>
+              <a:rPr lang="en-US" sz="1400" b="1" dirty="0" err="1" smtClean="0">
+                <a:latin typeface="Times New Roman" pitchFamily="18" charset="0"/>
+                <a:cs typeface="Times New Roman" pitchFamily="18" charset="0"/>
+              </a:rPr>
+              <a:t>strictfp</a:t>
+            </a:r>
+            <a:r>
+              <a:rPr lang="en-US" sz="1400" dirty="0" smtClean="0">
+                <a:latin typeface="Times New Roman" pitchFamily="18" charset="0"/>
+                <a:cs typeface="Times New Roman" pitchFamily="18" charset="0"/>
+              </a:rPr>
+              <a:t> </a:t>
+            </a:r>
+            <a:r>
+              <a:rPr lang="en-US" sz="1400" b="1" dirty="0" smtClean="0">
+                <a:latin typeface="Times New Roman" pitchFamily="18" charset="0"/>
+                <a:cs typeface="Times New Roman" pitchFamily="18" charset="0"/>
+              </a:rPr>
+              <a:t>public</a:t>
+            </a:r>
+            <a:r>
+              <a:rPr lang="en-US" sz="1400" dirty="0" smtClean="0">
+                <a:latin typeface="Times New Roman" pitchFamily="18" charset="0"/>
+                <a:cs typeface="Times New Roman" pitchFamily="18" charset="0"/>
+              </a:rPr>
+              <a:t> </a:t>
+            </a:r>
+            <a:r>
+              <a:rPr lang="en-US" sz="1400" b="1" dirty="0" smtClean="0">
+                <a:latin typeface="Times New Roman" pitchFamily="18" charset="0"/>
+                <a:cs typeface="Times New Roman" pitchFamily="18" charset="0"/>
+              </a:rPr>
+              <a:t>static</a:t>
+            </a:r>
+            <a:r>
+              <a:rPr lang="en-US" sz="1400" dirty="0" smtClean="0">
+                <a:latin typeface="Times New Roman" pitchFamily="18" charset="0"/>
+                <a:cs typeface="Times New Roman" pitchFamily="18" charset="0"/>
+              </a:rPr>
+              <a:t> </a:t>
+            </a:r>
+            <a:r>
+              <a:rPr lang="en-US" sz="1400" b="1" dirty="0" smtClean="0">
+                <a:latin typeface="Times New Roman" pitchFamily="18" charset="0"/>
+                <a:cs typeface="Times New Roman" pitchFamily="18" charset="0"/>
+              </a:rPr>
+              <a:t>void</a:t>
+            </a:r>
+            <a:r>
+              <a:rPr lang="en-US" sz="1400" dirty="0" smtClean="0">
+                <a:latin typeface="Times New Roman" pitchFamily="18" charset="0"/>
+                <a:cs typeface="Times New Roman" pitchFamily="18" charset="0"/>
+              </a:rPr>
+              <a:t> main(String[] </a:t>
+            </a:r>
+            <a:r>
+              <a:rPr lang="en-US" sz="1400" dirty="0" err="1" smtClean="0">
+                <a:latin typeface="Times New Roman" pitchFamily="18" charset="0"/>
+                <a:cs typeface="Times New Roman" pitchFamily="18" charset="0"/>
+              </a:rPr>
+              <a:t>args</a:t>
+            </a:r>
+            <a:r>
+              <a:rPr lang="en-US" sz="1400" dirty="0" smtClean="0">
+                <a:latin typeface="Times New Roman" pitchFamily="18" charset="0"/>
+                <a:cs typeface="Times New Roman" pitchFamily="18" charset="0"/>
+              </a:rPr>
+              <a:t>) </a:t>
+            </a:r>
+            <a:r>
+              <a:rPr lang="en-US" dirty="0" smtClean="0"/>
+              <a:t> </a:t>
+            </a:r>
+          </a:p>
+          <a:p>
+            <a:endParaRPr lang="en-US" dirty="0"/>
           </a:p>
         </p:txBody>
       </p:sp>
@@ -3913,6 +7466,566 @@
 </p:sld>
 </file>
 
+<file path=ppt/slides/slide20.xml><?xml version="1.0" encoding="utf-8"?>
+<p:sld xmlns:a="http://schemas.openxmlformats.org/drawingml/2006/main" xmlns:r="http://schemas.openxmlformats.org/officeDocument/2006/relationships" xmlns:p="http://schemas.openxmlformats.org/presentationml/2006/main">
+  <p:cSld>
+    <p:spTree>
+      <p:nvGrpSpPr>
+        <p:cNvPr id="1" name=""/>
+        <p:cNvGrpSpPr/>
+        <p:nvPr/>
+      </p:nvGrpSpPr>
+      <p:grpSpPr>
+        <a:xfrm>
+          <a:off x="0" y="0"/>
+          <a:ext cx="0" cy="0"/>
+          <a:chOff x="0" y="0"/>
+          <a:chExt cx="0" cy="0"/>
+        </a:xfrm>
+      </p:grpSpPr>
+      <p:sp>
+        <p:nvSpPr>
+          <p:cNvPr id="2" name="Title 1"/>
+          <p:cNvSpPr>
+            <a:spLocks noGrp="1"/>
+          </p:cNvSpPr>
+          <p:nvPr>
+            <p:ph type="title"/>
+          </p:nvPr>
+        </p:nvSpPr>
+        <p:spPr/>
+        <p:txBody>
+          <a:bodyPr/>
+          <a:lstStyle/>
+          <a:p>
+            <a:r>
+              <a:rPr lang="en-US" dirty="0" smtClean="0"/>
+              <a:t>JDK,JRE,JVM</a:t>
+            </a:r>
+            <a:endParaRPr lang="en-US" dirty="0"/>
+          </a:p>
+        </p:txBody>
+      </p:sp>
+      <p:sp>
+        <p:nvSpPr>
+          <p:cNvPr id="3" name="Content Placeholder 2"/>
+          <p:cNvSpPr>
+            <a:spLocks noGrp="1"/>
+          </p:cNvSpPr>
+          <p:nvPr>
+            <p:ph idx="1"/>
+          </p:nvPr>
+        </p:nvSpPr>
+        <p:spPr>
+          <a:xfrm>
+            <a:off x="457200" y="1600201"/>
+            <a:ext cx="7848600" cy="2514600"/>
+          </a:xfrm>
+        </p:spPr>
+        <p:txBody>
+          <a:bodyPr/>
+          <a:lstStyle/>
+          <a:p>
+            <a:pPr fontAlgn="base"/>
+            <a:r>
+              <a:rPr lang="en-US" sz="1200" b="1" dirty="0" smtClean="0">
+                <a:latin typeface="Times New Roman" pitchFamily="18" charset="0"/>
+                <a:cs typeface="Times New Roman" pitchFamily="18" charset="0"/>
+              </a:rPr>
+              <a:t>JDK</a:t>
+            </a:r>
+            <a:r>
+              <a:rPr lang="en-US" sz="1200" dirty="0" smtClean="0">
+                <a:latin typeface="Times New Roman" pitchFamily="18" charset="0"/>
+                <a:cs typeface="Times New Roman" pitchFamily="18" charset="0"/>
+              </a:rPr>
+              <a:t> (Java Development Kit) is a Kit that provides the environment to </a:t>
+            </a:r>
+            <a:r>
+              <a:rPr lang="en-US" sz="1200" b="1" dirty="0" smtClean="0">
+                <a:latin typeface="Times New Roman" pitchFamily="18" charset="0"/>
+                <a:cs typeface="Times New Roman" pitchFamily="18" charset="0"/>
+              </a:rPr>
+              <a:t>develop and execute(run)</a:t>
+            </a:r>
+            <a:r>
+              <a:rPr lang="en-US" sz="1200" dirty="0" smtClean="0">
+                <a:latin typeface="Times New Roman" pitchFamily="18" charset="0"/>
+                <a:cs typeface="Times New Roman" pitchFamily="18" charset="0"/>
+              </a:rPr>
+              <a:t> the Java program. JDK is a kit(or package) that includes two things</a:t>
+            </a:r>
+          </a:p>
+          <a:p>
+            <a:pPr fontAlgn="base">
+              <a:buNone/>
+            </a:pPr>
+            <a:r>
+              <a:rPr lang="en-US" sz="1200" dirty="0" smtClean="0">
+                <a:latin typeface="Times New Roman" pitchFamily="18" charset="0"/>
+                <a:cs typeface="Times New Roman" pitchFamily="18" charset="0"/>
+              </a:rPr>
+              <a:t>                                Development </a:t>
+            </a:r>
+            <a:r>
+              <a:rPr lang="en-US" sz="1200" dirty="0" smtClean="0">
+                <a:latin typeface="Times New Roman" pitchFamily="18" charset="0"/>
+                <a:cs typeface="Times New Roman" pitchFamily="18" charset="0"/>
+              </a:rPr>
+              <a:t>Tools(to provide an environment to develop your java </a:t>
+            </a:r>
+            <a:r>
+              <a:rPr lang="en-US" sz="1200" dirty="0" smtClean="0">
+                <a:latin typeface="Times New Roman" pitchFamily="18" charset="0"/>
+                <a:cs typeface="Times New Roman" pitchFamily="18" charset="0"/>
+              </a:rPr>
+              <a:t>programs)</a:t>
+            </a:r>
+          </a:p>
+          <a:p>
+            <a:pPr fontAlgn="base">
+              <a:buNone/>
+            </a:pPr>
+            <a:r>
+              <a:rPr lang="en-US" sz="1200" dirty="0" smtClean="0">
+                <a:latin typeface="Times New Roman" pitchFamily="18" charset="0"/>
+                <a:cs typeface="Times New Roman" pitchFamily="18" charset="0"/>
+              </a:rPr>
+              <a:t> </a:t>
+            </a:r>
+            <a:r>
+              <a:rPr lang="en-US" sz="1200" dirty="0" smtClean="0">
+                <a:latin typeface="Times New Roman" pitchFamily="18" charset="0"/>
+                <a:cs typeface="Times New Roman" pitchFamily="18" charset="0"/>
+              </a:rPr>
+              <a:t>                               JRE </a:t>
+            </a:r>
+            <a:r>
+              <a:rPr lang="en-US" sz="1200" dirty="0" smtClean="0">
+                <a:latin typeface="Times New Roman" pitchFamily="18" charset="0"/>
+                <a:cs typeface="Times New Roman" pitchFamily="18" charset="0"/>
+              </a:rPr>
+              <a:t>(to execute your java program</a:t>
+            </a:r>
+            <a:r>
+              <a:rPr lang="en-US" sz="1200" dirty="0" smtClean="0">
+                <a:latin typeface="Times New Roman" pitchFamily="18" charset="0"/>
+                <a:cs typeface="Times New Roman" pitchFamily="18" charset="0"/>
+              </a:rPr>
+              <a:t>)</a:t>
+            </a:r>
+          </a:p>
+          <a:p>
+            <a:pPr fontAlgn="base">
+              <a:buNone/>
+            </a:pPr>
+            <a:r>
+              <a:rPr lang="en-US" sz="1200" b="1" dirty="0" smtClean="0"/>
+              <a:t>          JRE</a:t>
+            </a:r>
+            <a:r>
+              <a:rPr lang="en-US" sz="1200" dirty="0" smtClean="0"/>
+              <a:t> (Java Runtime Environment) is an installation package that provides an environment to </a:t>
+            </a:r>
+            <a:r>
+              <a:rPr lang="en-US" sz="1200" b="1" dirty="0" smtClean="0"/>
+              <a:t>only run(not develop)</a:t>
+            </a:r>
+            <a:r>
+              <a:rPr lang="en-US" sz="1200" dirty="0" smtClean="0"/>
+              <a:t> the java program(or application)onto your machine. JRE is only used by those who only want to run Java programs that are end-users of your system</a:t>
+            </a:r>
+            <a:r>
+              <a:rPr lang="en-US" sz="1200" dirty="0" smtClean="0"/>
+              <a:t>.</a:t>
+            </a:r>
+          </a:p>
+          <a:p>
+            <a:pPr fontAlgn="base">
+              <a:buNone/>
+            </a:pPr>
+            <a:r>
+              <a:rPr lang="en-US" sz="1200" dirty="0" smtClean="0">
+                <a:latin typeface="Times New Roman" pitchFamily="18" charset="0"/>
+                <a:cs typeface="Times New Roman" pitchFamily="18" charset="0"/>
+              </a:rPr>
+              <a:t> </a:t>
+            </a:r>
+            <a:r>
+              <a:rPr lang="en-US" sz="1200" dirty="0" smtClean="0">
+                <a:latin typeface="Times New Roman" pitchFamily="18" charset="0"/>
+                <a:cs typeface="Times New Roman" pitchFamily="18" charset="0"/>
+              </a:rPr>
+              <a:t>       </a:t>
+            </a:r>
+            <a:r>
+              <a:rPr lang="en-US" sz="1200" b="1" dirty="0" smtClean="0"/>
+              <a:t> </a:t>
+            </a:r>
+            <a:r>
+              <a:rPr lang="en-US" sz="1200" b="1" u="sng" dirty="0" smtClean="0">
+                <a:hlinkClick r:id="rId2"/>
+              </a:rPr>
+              <a:t>JVM</a:t>
+            </a:r>
+            <a:r>
+              <a:rPr lang="en-US" sz="1200" u="sng" dirty="0" smtClean="0">
+                <a:hlinkClick r:id="rId2"/>
+              </a:rPr>
+              <a:t> (</a:t>
+            </a:r>
+            <a:r>
+              <a:rPr lang="en-US" sz="1200" b="1" u="sng" dirty="0" smtClean="0">
+                <a:hlinkClick r:id="rId2"/>
+              </a:rPr>
+              <a:t>Java Virtual Machine)</a:t>
+            </a:r>
+            <a:r>
+              <a:rPr lang="en-US" sz="1200" b="1" dirty="0" smtClean="0"/>
+              <a:t> </a:t>
+            </a:r>
+            <a:r>
+              <a:rPr lang="en-US" sz="1200" dirty="0" smtClean="0"/>
+              <a:t>is a very important part of both JDK and JRE because it is contained or inbuilt in both. Whatever Java program you run using JRE or JDK goes into JVM and JVM is responsible for executing the java program line by line, hence it is also known as an </a:t>
+            </a:r>
+            <a:r>
+              <a:rPr lang="en-US" sz="1200" b="1" u="sng" dirty="0" smtClean="0">
+                <a:hlinkClick r:id="rId3"/>
+              </a:rPr>
+              <a:t>i</a:t>
+            </a:r>
+            <a:r>
+              <a:rPr lang="en-US" sz="1200" b="1" i="1" u="sng" dirty="0" smtClean="0">
+                <a:hlinkClick r:id="rId3"/>
+              </a:rPr>
+              <a:t>nterpreter</a:t>
+            </a:r>
+            <a:r>
+              <a:rPr lang="en-US" sz="1200" b="1" dirty="0" smtClean="0"/>
+              <a:t>.</a:t>
+            </a:r>
+          </a:p>
+          <a:p>
+            <a:pPr fontAlgn="base">
+              <a:buNone/>
+            </a:pPr>
+            <a:r>
+              <a:rPr lang="en-US" sz="1200" b="1" dirty="0" smtClean="0"/>
+              <a:t>          JIT</a:t>
+            </a:r>
+            <a:r>
+              <a:rPr lang="en-US" sz="1200" dirty="0" smtClean="0"/>
+              <a:t> in Java is an integral part of the </a:t>
+            </a:r>
+            <a:r>
+              <a:rPr lang="en-US" sz="1200" b="1" dirty="0" smtClean="0"/>
+              <a:t>JVM</a:t>
+            </a:r>
+            <a:r>
+              <a:rPr lang="en-US" sz="1200" dirty="0" smtClean="0"/>
+              <a:t>. It accelerates execution performance many times over the previous level</a:t>
+            </a:r>
+            <a:endParaRPr lang="en-US" sz="1200" dirty="0" smtClean="0">
+              <a:latin typeface="Times New Roman" pitchFamily="18" charset="0"/>
+              <a:cs typeface="Times New Roman" pitchFamily="18" charset="0"/>
+            </a:endParaRPr>
+          </a:p>
+          <a:p>
+            <a:endParaRPr lang="en-US" dirty="0"/>
+          </a:p>
+        </p:txBody>
+      </p:sp>
+    </p:spTree>
+  </p:cSld>
+  <p:clrMapOvr>
+    <a:masterClrMapping/>
+  </p:clrMapOvr>
+</p:sld>
+</file>
+
+<file path=ppt/slides/slide21.xml><?xml version="1.0" encoding="utf-8"?>
+<p:sld xmlns:a="http://schemas.openxmlformats.org/drawingml/2006/main" xmlns:r="http://schemas.openxmlformats.org/officeDocument/2006/relationships" xmlns:p="http://schemas.openxmlformats.org/presentationml/2006/main">
+  <p:cSld>
+    <p:spTree>
+      <p:nvGrpSpPr>
+        <p:cNvPr id="1" name=""/>
+        <p:cNvGrpSpPr/>
+        <p:nvPr/>
+      </p:nvGrpSpPr>
+      <p:grpSpPr>
+        <a:xfrm>
+          <a:off x="0" y="0"/>
+          <a:ext cx="0" cy="0"/>
+          <a:chOff x="0" y="0"/>
+          <a:chExt cx="0" cy="0"/>
+        </a:xfrm>
+      </p:grpSpPr>
+      <p:sp>
+        <p:nvSpPr>
+          <p:cNvPr id="2" name="Title 1"/>
+          <p:cNvSpPr>
+            <a:spLocks noGrp="1"/>
+          </p:cNvSpPr>
+          <p:nvPr>
+            <p:ph type="title"/>
+          </p:nvPr>
+        </p:nvSpPr>
+        <p:spPr/>
+        <p:txBody>
+          <a:bodyPr/>
+          <a:lstStyle/>
+          <a:p>
+            <a:endParaRPr lang="en-US"/>
+          </a:p>
+        </p:txBody>
+      </p:sp>
+      <p:sp>
+        <p:nvSpPr>
+          <p:cNvPr id="3" name="Content Placeholder 2"/>
+          <p:cNvSpPr>
+            <a:spLocks noGrp="1"/>
+          </p:cNvSpPr>
+          <p:nvPr>
+            <p:ph idx="1"/>
+          </p:nvPr>
+        </p:nvSpPr>
+        <p:spPr/>
+        <p:txBody>
+          <a:bodyPr/>
+          <a:lstStyle/>
+          <a:p>
+            <a:endParaRPr lang="en-US"/>
+          </a:p>
+        </p:txBody>
+      </p:sp>
+      <p:pic>
+        <p:nvPicPr>
+          <p:cNvPr id="4" name="Picture 2" descr="JIT in Java"/>
+          <p:cNvPicPr>
+            <a:picLocks noChangeAspect="1" noChangeArrowheads="1"/>
+          </p:cNvPicPr>
+          <p:nvPr/>
+        </p:nvPicPr>
+        <p:blipFill>
+          <a:blip r:embed="rId2"/>
+          <a:srcRect/>
+          <a:stretch>
+            <a:fillRect/>
+          </a:stretch>
+        </p:blipFill>
+        <p:spPr bwMode="auto">
+          <a:xfrm>
+            <a:off x="1524000" y="2819400"/>
+            <a:ext cx="5562600" cy="2438400"/>
+          </a:xfrm>
+          <a:prstGeom prst="rect">
+            <a:avLst/>
+          </a:prstGeom>
+          <a:noFill/>
+        </p:spPr>
+      </p:pic>
+    </p:spTree>
+  </p:cSld>
+  <p:clrMapOvr>
+    <a:masterClrMapping/>
+  </p:clrMapOvr>
+</p:sld>
+</file>
+
+<file path=ppt/slides/slide22.xml><?xml version="1.0" encoding="utf-8"?>
+<p:sld xmlns:a="http://schemas.openxmlformats.org/drawingml/2006/main" xmlns:r="http://schemas.openxmlformats.org/officeDocument/2006/relationships" xmlns:p="http://schemas.openxmlformats.org/presentationml/2006/main">
+  <p:cSld>
+    <p:spTree>
+      <p:nvGrpSpPr>
+        <p:cNvPr id="1" name=""/>
+        <p:cNvGrpSpPr/>
+        <p:nvPr/>
+      </p:nvGrpSpPr>
+      <p:grpSpPr>
+        <a:xfrm>
+          <a:off x="0" y="0"/>
+          <a:ext cx="0" cy="0"/>
+          <a:chOff x="0" y="0"/>
+          <a:chExt cx="0" cy="0"/>
+        </a:xfrm>
+      </p:grpSpPr>
+      <p:sp>
+        <p:nvSpPr>
+          <p:cNvPr id="2" name="Title 1"/>
+          <p:cNvSpPr>
+            <a:spLocks noGrp="1"/>
+          </p:cNvSpPr>
+          <p:nvPr>
+            <p:ph type="title"/>
+          </p:nvPr>
+        </p:nvSpPr>
+        <p:spPr/>
+        <p:txBody>
+          <a:bodyPr/>
+          <a:lstStyle/>
+          <a:p>
+            <a:endParaRPr lang="en-US"/>
+          </a:p>
+        </p:txBody>
+      </p:sp>
+      <p:sp>
+        <p:nvSpPr>
+          <p:cNvPr id="3" name="Content Placeholder 2"/>
+          <p:cNvSpPr>
+            <a:spLocks noGrp="1"/>
+          </p:cNvSpPr>
+          <p:nvPr>
+            <p:ph idx="1"/>
+          </p:nvPr>
+        </p:nvSpPr>
+        <p:spPr/>
+        <p:txBody>
+          <a:bodyPr>
+            <a:normAutofit fontScale="92500"/>
+          </a:bodyPr>
+          <a:lstStyle/>
+          <a:p>
+            <a:r>
+              <a:rPr lang="en-US" dirty="0" smtClean="0"/>
+              <a:t>Install Eclipse IDE Corresponding to Java 8 Version</a:t>
+            </a:r>
+          </a:p>
+          <a:p>
+            <a:r>
+              <a:rPr lang="en-US" dirty="0" smtClean="0"/>
+              <a:t>https://www.eclipse.org/downloads/packages/release/neon/3/eclipse-ide-java-ee-developers</a:t>
+            </a:r>
+          </a:p>
+          <a:p>
+            <a:r>
+              <a:rPr lang="en-US" dirty="0" err="1" smtClean="0"/>
+              <a:t>Git</a:t>
+            </a:r>
+            <a:r>
+              <a:rPr lang="en-US" dirty="0" smtClean="0"/>
+              <a:t>-https://git-scm.com/</a:t>
+            </a:r>
+          </a:p>
+          <a:p>
+            <a:r>
+              <a:rPr lang="en-US" dirty="0" smtClean="0"/>
+              <a:t>Tortoise </a:t>
+            </a:r>
+            <a:r>
+              <a:rPr lang="en-US" dirty="0" err="1" smtClean="0"/>
+              <a:t>Git</a:t>
+            </a:r>
+            <a:r>
+              <a:rPr lang="en-US" dirty="0" smtClean="0"/>
+              <a:t> -https://tortoisegit.org/download/</a:t>
+            </a:r>
+          </a:p>
+          <a:p>
+            <a:r>
+              <a:rPr lang="en-US" dirty="0" err="1" smtClean="0"/>
+              <a:t>Sighn</a:t>
+            </a:r>
+            <a:r>
+              <a:rPr lang="en-US" dirty="0" smtClean="0"/>
+              <a:t> up an account in </a:t>
+            </a:r>
+            <a:r>
+              <a:rPr lang="en-US" dirty="0" err="1" smtClean="0"/>
+              <a:t>git</a:t>
+            </a:r>
+            <a:r>
+              <a:rPr lang="en-US" smtClean="0"/>
+              <a:t>-&gt; https://github.com/</a:t>
+            </a:r>
+            <a:endParaRPr lang="en-US" dirty="0" smtClean="0"/>
+          </a:p>
+          <a:p>
+            <a:pPr>
+              <a:buNone/>
+            </a:pPr>
+            <a:endParaRPr lang="en-US" dirty="0" smtClean="0"/>
+          </a:p>
+        </p:txBody>
+      </p:sp>
+    </p:spTree>
+  </p:cSld>
+  <p:clrMapOvr>
+    <a:masterClrMapping/>
+  </p:clrMapOvr>
+</p:sld>
+</file>
+
+<file path=ppt/slides/slide23.xml><?xml version="1.0" encoding="utf-8"?>
+<p:sld xmlns:a="http://schemas.openxmlformats.org/drawingml/2006/main" xmlns:r="http://schemas.openxmlformats.org/officeDocument/2006/relationships" xmlns:p="http://schemas.openxmlformats.org/presentationml/2006/main">
+  <p:cSld>
+    <p:spTree>
+      <p:nvGrpSpPr>
+        <p:cNvPr id="1" name=""/>
+        <p:cNvGrpSpPr/>
+        <p:nvPr/>
+      </p:nvGrpSpPr>
+      <p:grpSpPr>
+        <a:xfrm>
+          <a:off x="0" y="0"/>
+          <a:ext cx="0" cy="0"/>
+          <a:chOff x="0" y="0"/>
+          <a:chExt cx="0" cy="0"/>
+        </a:xfrm>
+      </p:grpSpPr>
+      <p:sp>
+        <p:nvSpPr>
+          <p:cNvPr id="2" name="Title 1"/>
+          <p:cNvSpPr>
+            <a:spLocks noGrp="1"/>
+          </p:cNvSpPr>
+          <p:nvPr>
+            <p:ph type="title"/>
+          </p:nvPr>
+        </p:nvSpPr>
+        <p:spPr/>
+        <p:txBody>
+          <a:bodyPr/>
+          <a:lstStyle/>
+          <a:p>
+            <a:r>
+              <a:rPr lang="en-US" dirty="0" smtClean="0"/>
+              <a:t>End Of Session 1</a:t>
+            </a:r>
+            <a:endParaRPr lang="en-US" dirty="0"/>
+          </a:p>
+        </p:txBody>
+      </p:sp>
+      <p:sp>
+        <p:nvSpPr>
+          <p:cNvPr id="3" name="Content Placeholder 2"/>
+          <p:cNvSpPr>
+            <a:spLocks noGrp="1"/>
+          </p:cNvSpPr>
+          <p:nvPr>
+            <p:ph idx="1"/>
+          </p:nvPr>
+        </p:nvSpPr>
+        <p:spPr/>
+        <p:txBody>
+          <a:bodyPr/>
+          <a:lstStyle/>
+          <a:p>
+            <a:r>
+              <a:rPr lang="en-US" dirty="0" smtClean="0"/>
+              <a:t>Thank You</a:t>
+            </a:r>
+            <a:endParaRPr lang="en-US" dirty="0"/>
+          </a:p>
+        </p:txBody>
+      </p:sp>
+    </p:spTree>
+  </p:cSld>
+  <p:clrMapOvr>
+    <a:masterClrMapping/>
+  </p:clrMapOvr>
+</p:sld>
+</file>
+
 <file path=ppt/slides/slide3.xml><?xml version="1.0" encoding="utf-8"?>
 <p:sld xmlns:a="http://schemas.openxmlformats.org/drawingml/2006/main" xmlns:r="http://schemas.openxmlformats.org/officeDocument/2006/relationships" xmlns:p="http://schemas.openxmlformats.org/presentationml/2006/main">
   <p:cSld>
@@ -4455,7 +8568,7 @@
           <a:p>
             <a:r>
               <a:rPr lang="en-US" dirty="0" smtClean="0"/>
-              <a:t>Releases</a:t>
+              <a:t>Different from Other Technology</a:t>
             </a:r>
             <a:endParaRPr lang="en-US" dirty="0"/>
           </a:p>
@@ -4473,90 +8586,36 @@
         </p:nvSpPr>
         <p:spPr/>
         <p:txBody>
-          <a:bodyPr>
-            <a:normAutofit lnSpcReduction="10000"/>
-          </a:bodyPr>
-          <a:lstStyle/>
-          <a:p>
+          <a:bodyPr/>
+          <a:lstStyle/>
+          <a:p>
+            <a:r>
+              <a:rPr lang="en-US" dirty="0" smtClean="0"/>
+              <a:t>Java is compiled into </a:t>
+            </a:r>
+            <a:r>
+              <a:rPr lang="en-US" dirty="0" err="1" smtClean="0"/>
+              <a:t>bytecode</a:t>
+            </a:r>
+            <a:r>
+              <a:rPr lang="en-US" dirty="0" smtClean="0"/>
+              <a:t> which can run on any device with the Java Virtual Machine (JVM)</a:t>
+            </a:r>
             <a:r>
               <a:rPr lang="en-US" dirty="0"/>
-              <a:t>JDK Alpha and </a:t>
-            </a:r>
+              <a:t> </a:t>
+            </a:r>
+            <a:endParaRPr lang="en-US" dirty="0" smtClean="0"/>
+          </a:p>
+          <a:p>
             <a:r>
               <a:rPr lang="en-US" dirty="0" smtClean="0"/>
-              <a:t>Beta</a:t>
-            </a:r>
-          </a:p>
-          <a:p>
+              <a:t>C++ is </a:t>
+            </a:r>
             <a:r>
               <a:rPr lang="en-US" dirty="0"/>
-              <a:t>JDK </a:t>
-            </a:r>
-            <a:r>
-              <a:rPr lang="en-US" dirty="0" smtClean="0"/>
-              <a:t>1.0</a:t>
-            </a:r>
-          </a:p>
-          <a:p>
-            <a:r>
-              <a:rPr lang="en-US" dirty="0"/>
-              <a:t>JDK </a:t>
-            </a:r>
-            <a:r>
-              <a:rPr lang="en-US" dirty="0" smtClean="0"/>
-              <a:t>1.1</a:t>
-            </a:r>
-          </a:p>
-          <a:p>
-            <a:r>
-              <a:rPr lang="en-US" dirty="0"/>
-              <a:t>J2SE </a:t>
-            </a:r>
-            <a:r>
-              <a:rPr lang="en-US" dirty="0" smtClean="0"/>
-              <a:t>1.2</a:t>
-            </a:r>
-          </a:p>
-          <a:p>
-            <a:r>
-              <a:rPr lang="en-US" dirty="0"/>
-              <a:t>J2SE </a:t>
-            </a:r>
-            <a:r>
-              <a:rPr lang="en-US" dirty="0" smtClean="0"/>
-              <a:t>1.3</a:t>
-            </a:r>
-          </a:p>
-          <a:p>
-            <a:r>
-              <a:rPr lang="en-US" dirty="0"/>
-              <a:t>J2SE </a:t>
-            </a:r>
-            <a:r>
-              <a:rPr lang="en-US" dirty="0" smtClean="0"/>
-              <a:t>1.4</a:t>
-            </a:r>
-          </a:p>
-          <a:p>
-            <a:r>
-              <a:rPr lang="en-US" dirty="0"/>
-              <a:t>J2SE </a:t>
-            </a:r>
-            <a:r>
-              <a:rPr lang="en-US" dirty="0" smtClean="0"/>
-              <a:t>5.0</a:t>
-            </a:r>
-          </a:p>
-          <a:p>
-            <a:r>
-              <a:rPr lang="en-US" dirty="0"/>
-              <a:t>Java SE </a:t>
-            </a:r>
-            <a:r>
-              <a:rPr lang="en-US" dirty="0" smtClean="0"/>
-              <a:t>6…………18</a:t>
-            </a:r>
-            <a:endParaRPr lang="en-US" dirty="0"/>
+              <a:t>compiled directly into machine code and therefore, can only run on the same platform in which it was compiled</a:t>
+            </a:r>
           </a:p>
         </p:txBody>
       </p:sp>

</xml_diff>